<commit_message>
Code samples as slides
</commit_message>
<xml_diff>
--- a/Event sourcing on Azure functions code example.pptx
+++ b/Event sourcing on Azure functions code example.pptx
@@ -5,22 +5,27 @@
     <p:sldMasterId id="2147483648" r:id="rId1"/>
   </p:sldMasterIdLst>
   <p:notesMasterIdLst>
-    <p:notesMasterId r:id="rId15"/>
+    <p:notesMasterId r:id="rId20"/>
   </p:notesMasterIdLst>
   <p:sldIdLst>
     <p:sldId id="256" r:id="rId2"/>
     <p:sldId id="257" r:id="rId3"/>
     <p:sldId id="258" r:id="rId4"/>
-    <p:sldId id="259" r:id="rId5"/>
-    <p:sldId id="260" r:id="rId6"/>
-    <p:sldId id="261" r:id="rId7"/>
-    <p:sldId id="262" r:id="rId8"/>
-    <p:sldId id="263" r:id="rId9"/>
-    <p:sldId id="264" r:id="rId10"/>
-    <p:sldId id="265" r:id="rId11"/>
-    <p:sldId id="266" r:id="rId12"/>
-    <p:sldId id="267" r:id="rId13"/>
-    <p:sldId id="268" r:id="rId14"/>
+    <p:sldId id="269" r:id="rId5"/>
+    <p:sldId id="270" r:id="rId6"/>
+    <p:sldId id="259" r:id="rId7"/>
+    <p:sldId id="260" r:id="rId8"/>
+    <p:sldId id="261" r:id="rId9"/>
+    <p:sldId id="262" r:id="rId10"/>
+    <p:sldId id="263" r:id="rId11"/>
+    <p:sldId id="264" r:id="rId12"/>
+    <p:sldId id="271" r:id="rId13"/>
+    <p:sldId id="272" r:id="rId14"/>
+    <p:sldId id="265" r:id="rId15"/>
+    <p:sldId id="266" r:id="rId16"/>
+    <p:sldId id="267" r:id="rId17"/>
+    <p:sldId id="273" r:id="rId18"/>
+    <p:sldId id="268" r:id="rId19"/>
   </p:sldIdLst>
   <p:sldSz cx="12192000" cy="6858000"/>
   <p:notesSz cx="6858000" cy="9144000"/>
@@ -119,6 +124,11 @@
       </a:defRPr>
     </a:lvl9pPr>
   </p:defaultTextStyle>
+  <p:extLst>
+    <p:ext uri="{EFAFB233-063F-42B5-8137-9DF3F51BA10A}">
+      <p15:sldGuideLst xmlns:p15="http://schemas.microsoft.com/office/powerpoint/2012/main"/>
+    </p:ext>
+  </p:extLst>
 </p:presentation>
 </file>
 
@@ -614,45 +624,10 @@
           <a:p>
             <a:r>
               <a:rPr lang="en-IE" dirty="0"/>
-              <a:t>Design / constraints</a:t>
-            </a:r>
-          </a:p>
-          <a:p>
-            <a:endParaRPr lang="en-IE" dirty="0"/>
-          </a:p>
-          <a:p>
-            <a:r>
-              <a:rPr lang="en-IE" dirty="0"/>
-              <a:t>Withdrawing money requires running the </a:t>
-            </a:r>
-            <a:r>
-              <a:rPr lang="en-IE" b="1" dirty="0"/>
-              <a:t>balance</a:t>
-            </a:r>
-            <a:r>
-              <a:rPr lang="en-IE" dirty="0"/>
-              <a:t> </a:t>
-            </a:r>
-            <a:r>
-              <a:rPr lang="en-IE" dirty="0">
-                <a:hlinkClick r:id="rId3"/>
-              </a:rPr>
-              <a:t>projection</a:t>
-            </a:r>
-            <a:r>
-              <a:rPr lang="en-IE" dirty="0"/>
-              <a:t> to make sure that the account has the funds available to withdraw and only if it does, post the withdrawal event. When posting the withdrawal event we pass in the sequence number returned by the </a:t>
-            </a:r>
-            <a:r>
-              <a:rPr lang="en-IE" dirty="0">
-                <a:hlinkClick r:id="rId3"/>
-              </a:rPr>
-              <a:t>projection</a:t>
-            </a:r>
-            <a:r>
-              <a:rPr lang="en-IE" dirty="0"/>
-              <a:t> and if any other events have been written to the event stream since then an error is thrown and our withdrawal event is not appended.</a:t>
-            </a:r>
+              <a:t>Azure function</a:t>
+            </a:r>
+          </a:p>
+          <a:p>
             <a:endParaRPr lang="en-US" dirty="0"/>
           </a:p>
         </p:txBody>
@@ -683,7 +658,7 @@
     </p:spTree>
     <p:extLst>
       <p:ext uri="{BB962C8B-B14F-4D97-AF65-F5344CB8AC3E}">
-        <p14:creationId xmlns:p14="http://schemas.microsoft.com/office/powerpoint/2010/main" val="4267662159"/>
+        <p14:creationId xmlns:p14="http://schemas.microsoft.com/office/powerpoint/2010/main" val="3753462135"/>
       </p:ext>
     </p:extLst>
   </p:cSld>
@@ -773,7 +748,7 @@
     </p:spTree>
     <p:extLst>
       <p:ext uri="{BB962C8B-B14F-4D97-AF65-F5344CB8AC3E}">
-        <p14:creationId xmlns:p14="http://schemas.microsoft.com/office/powerpoint/2010/main" val="2984912149"/>
+        <p14:creationId xmlns:p14="http://schemas.microsoft.com/office/powerpoint/2010/main" val="126256760"/>
       </p:ext>
     </p:extLst>
   </p:cSld>
@@ -829,8 +804,26 @@
           <a:p>
             <a:r>
               <a:rPr lang="en-IE" dirty="0"/>
-              <a:t>Resulting event stream</a:t>
-            </a:r>
+              <a:t>The projection is run and when it has processed all the events in the event stream the value is returned.</a:t>
+            </a:r>
+          </a:p>
+          <a:p>
+            <a:endParaRPr lang="en-IE" dirty="0"/>
+          </a:p>
+          <a:p>
+            <a:r>
+              <a:rPr lang="en-IE" dirty="0"/>
+              <a:t>1) Every projection also has a </a:t>
+            </a:r>
+            <a:r>
+              <a:rPr lang="en-IE" b="1" dirty="0"/>
+              <a:t>Current Sequence Number</a:t>
+            </a:r>
+            <a:r>
+              <a:rPr lang="en-IE" b="0" dirty="0"/>
+              <a:t> property that tells you the number of the last event in the stream that it read</a:t>
+            </a:r>
+            <a:endParaRPr lang="en-IE" dirty="0"/>
           </a:p>
           <a:p>
             <a:endParaRPr lang="en-US" dirty="0"/>
@@ -855,6 +848,491 @@
             <a:fld id="{5BBCC628-4FEB-4E9A-A626-C808C74B96E6}" type="slidenum">
               <a:rPr lang="en-US" smtClean="0"/>
               <a:t>13</a:t>
+            </a:fld>
+            <a:endParaRPr lang="en-US"/>
+          </a:p>
+        </p:txBody>
+      </p:sp>
+    </p:spTree>
+    <p:extLst>
+      <p:ext uri="{BB962C8B-B14F-4D97-AF65-F5344CB8AC3E}">
+        <p14:creationId xmlns:p14="http://schemas.microsoft.com/office/powerpoint/2010/main" val="3817045538"/>
+      </p:ext>
+    </p:extLst>
+  </p:cSld>
+  <p:clrMapOvr>
+    <a:masterClrMapping/>
+  </p:clrMapOvr>
+</p:notes>
+</file>
+
+<file path=ppt/notesSlides/notesSlide13.xml><?xml version="1.0" encoding="utf-8"?>
+<p:notes xmlns:a="http://schemas.openxmlformats.org/drawingml/2006/main" xmlns:r="http://schemas.openxmlformats.org/officeDocument/2006/relationships" xmlns:p="http://schemas.openxmlformats.org/presentationml/2006/main">
+  <p:cSld>
+    <p:spTree>
+      <p:nvGrpSpPr>
+        <p:cNvPr id="1" name=""/>
+        <p:cNvGrpSpPr/>
+        <p:nvPr/>
+      </p:nvGrpSpPr>
+      <p:grpSpPr>
+        <a:xfrm>
+          <a:off x="0" y="0"/>
+          <a:ext cx="0" cy="0"/>
+          <a:chOff x="0" y="0"/>
+          <a:chExt cx="0" cy="0"/>
+        </a:xfrm>
+      </p:grpSpPr>
+      <p:sp>
+        <p:nvSpPr>
+          <p:cNvPr id="2" name="Slide Image Placeholder 1"/>
+          <p:cNvSpPr>
+            <a:spLocks noGrp="1" noRot="1" noChangeAspect="1"/>
+          </p:cNvSpPr>
+          <p:nvPr>
+            <p:ph type="sldImg"/>
+          </p:nvPr>
+        </p:nvSpPr>
+        <p:spPr/>
+      </p:sp>
+      <p:sp>
+        <p:nvSpPr>
+          <p:cNvPr id="3" name="Notes Placeholder 2"/>
+          <p:cNvSpPr>
+            <a:spLocks noGrp="1"/>
+          </p:cNvSpPr>
+          <p:nvPr>
+            <p:ph type="body" idx="1"/>
+          </p:nvPr>
+        </p:nvSpPr>
+        <p:spPr/>
+        <p:txBody>
+          <a:bodyPr/>
+          <a:lstStyle/>
+          <a:p>
+            <a:r>
+              <a:rPr lang="en-IE" dirty="0"/>
+              <a:t>Resulting event stream</a:t>
+            </a:r>
+          </a:p>
+          <a:p>
+            <a:endParaRPr lang="en-US" dirty="0"/>
+          </a:p>
+        </p:txBody>
+      </p:sp>
+      <p:sp>
+        <p:nvSpPr>
+          <p:cNvPr id="4" name="Slide Number Placeholder 3"/>
+          <p:cNvSpPr>
+            <a:spLocks noGrp="1"/>
+          </p:cNvSpPr>
+          <p:nvPr>
+            <p:ph type="sldNum" sz="quarter" idx="5"/>
+          </p:nvPr>
+        </p:nvSpPr>
+        <p:spPr/>
+        <p:txBody>
+          <a:bodyPr/>
+          <a:lstStyle/>
+          <a:p>
+            <a:fld id="{5BBCC628-4FEB-4E9A-A626-C808C74B96E6}" type="slidenum">
+              <a:rPr lang="en-US" smtClean="0"/>
+              <a:t>14</a:t>
+            </a:fld>
+            <a:endParaRPr lang="en-US"/>
+          </a:p>
+        </p:txBody>
+      </p:sp>
+    </p:spTree>
+    <p:extLst>
+      <p:ext uri="{BB962C8B-B14F-4D97-AF65-F5344CB8AC3E}">
+        <p14:creationId xmlns:p14="http://schemas.microsoft.com/office/powerpoint/2010/main" val="1393497827"/>
+      </p:ext>
+    </p:extLst>
+  </p:cSld>
+  <p:clrMapOvr>
+    <a:masterClrMapping/>
+  </p:clrMapOvr>
+</p:notes>
+</file>
+
+<file path=ppt/notesSlides/notesSlide14.xml><?xml version="1.0" encoding="utf-8"?>
+<p:notes xmlns:a="http://schemas.openxmlformats.org/drawingml/2006/main" xmlns:r="http://schemas.openxmlformats.org/officeDocument/2006/relationships" xmlns:p="http://schemas.openxmlformats.org/presentationml/2006/main">
+  <p:cSld>
+    <p:spTree>
+      <p:nvGrpSpPr>
+        <p:cNvPr id="1" name=""/>
+        <p:cNvGrpSpPr/>
+        <p:nvPr/>
+      </p:nvGrpSpPr>
+      <p:grpSpPr>
+        <a:xfrm>
+          <a:off x="0" y="0"/>
+          <a:ext cx="0" cy="0"/>
+          <a:chOff x="0" y="0"/>
+          <a:chExt cx="0" cy="0"/>
+        </a:xfrm>
+      </p:grpSpPr>
+      <p:sp>
+        <p:nvSpPr>
+          <p:cNvPr id="2" name="Slide Image Placeholder 1"/>
+          <p:cNvSpPr>
+            <a:spLocks noGrp="1" noRot="1" noChangeAspect="1"/>
+          </p:cNvSpPr>
+          <p:nvPr>
+            <p:ph type="sldImg"/>
+          </p:nvPr>
+        </p:nvSpPr>
+        <p:spPr/>
+      </p:sp>
+      <p:sp>
+        <p:nvSpPr>
+          <p:cNvPr id="3" name="Notes Placeholder 2"/>
+          <p:cNvSpPr>
+            <a:spLocks noGrp="1"/>
+          </p:cNvSpPr>
+          <p:nvPr>
+            <p:ph type="body" idx="1"/>
+          </p:nvPr>
+        </p:nvSpPr>
+        <p:spPr/>
+        <p:txBody>
+          <a:bodyPr/>
+          <a:lstStyle/>
+          <a:p>
+            <a:r>
+              <a:rPr lang="en-IE" dirty="0"/>
+              <a:t>Design / constraints</a:t>
+            </a:r>
+          </a:p>
+          <a:p>
+            <a:endParaRPr lang="en-IE" dirty="0"/>
+          </a:p>
+          <a:p>
+            <a:r>
+              <a:rPr lang="en-IE" dirty="0"/>
+              <a:t>Withdrawing money requires running the </a:t>
+            </a:r>
+            <a:r>
+              <a:rPr lang="en-IE" b="1" dirty="0"/>
+              <a:t>balance</a:t>
+            </a:r>
+            <a:r>
+              <a:rPr lang="en-IE" dirty="0"/>
+              <a:t> </a:t>
+            </a:r>
+            <a:r>
+              <a:rPr lang="en-IE" dirty="0">
+                <a:hlinkClick r:id="rId3"/>
+              </a:rPr>
+              <a:t>projection</a:t>
+            </a:r>
+            <a:r>
+              <a:rPr lang="en-IE" dirty="0"/>
+              <a:t> to make sure that the account has the funds available to withdraw and only if it does, post the withdrawal event. When posting the withdrawal event we pass in the sequence number returned by the </a:t>
+            </a:r>
+            <a:r>
+              <a:rPr lang="en-IE" dirty="0">
+                <a:hlinkClick r:id="rId3"/>
+              </a:rPr>
+              <a:t>projection</a:t>
+            </a:r>
+            <a:r>
+              <a:rPr lang="en-IE" dirty="0"/>
+              <a:t> and if any other events have been written to the event stream since then an error is thrown and our withdrawal event is not appended.</a:t>
+            </a:r>
+            <a:endParaRPr lang="en-US" dirty="0"/>
+          </a:p>
+        </p:txBody>
+      </p:sp>
+      <p:sp>
+        <p:nvSpPr>
+          <p:cNvPr id="4" name="Slide Number Placeholder 3"/>
+          <p:cNvSpPr>
+            <a:spLocks noGrp="1"/>
+          </p:cNvSpPr>
+          <p:nvPr>
+            <p:ph type="sldNum" sz="quarter" idx="5"/>
+          </p:nvPr>
+        </p:nvSpPr>
+        <p:spPr/>
+        <p:txBody>
+          <a:bodyPr/>
+          <a:lstStyle/>
+          <a:p>
+            <a:fld id="{5BBCC628-4FEB-4E9A-A626-C808C74B96E6}" type="slidenum">
+              <a:rPr lang="en-US" smtClean="0"/>
+              <a:t>15</a:t>
+            </a:fld>
+            <a:endParaRPr lang="en-US"/>
+          </a:p>
+        </p:txBody>
+      </p:sp>
+    </p:spTree>
+    <p:extLst>
+      <p:ext uri="{BB962C8B-B14F-4D97-AF65-F5344CB8AC3E}">
+        <p14:creationId xmlns:p14="http://schemas.microsoft.com/office/powerpoint/2010/main" val="4267662159"/>
+      </p:ext>
+    </p:extLst>
+  </p:cSld>
+  <p:clrMapOvr>
+    <a:masterClrMapping/>
+  </p:clrMapOvr>
+</p:notes>
+</file>
+
+<file path=ppt/notesSlides/notesSlide15.xml><?xml version="1.0" encoding="utf-8"?>
+<p:notes xmlns:a="http://schemas.openxmlformats.org/drawingml/2006/main" xmlns:r="http://schemas.openxmlformats.org/officeDocument/2006/relationships" xmlns:p="http://schemas.openxmlformats.org/presentationml/2006/main">
+  <p:cSld>
+    <p:spTree>
+      <p:nvGrpSpPr>
+        <p:cNvPr id="1" name=""/>
+        <p:cNvGrpSpPr/>
+        <p:nvPr/>
+      </p:nvGrpSpPr>
+      <p:grpSpPr>
+        <a:xfrm>
+          <a:off x="0" y="0"/>
+          <a:ext cx="0" cy="0"/>
+          <a:chOff x="0" y="0"/>
+          <a:chExt cx="0" cy="0"/>
+        </a:xfrm>
+      </p:grpSpPr>
+      <p:sp>
+        <p:nvSpPr>
+          <p:cNvPr id="2" name="Slide Image Placeholder 1"/>
+          <p:cNvSpPr>
+            <a:spLocks noGrp="1" noRot="1" noChangeAspect="1"/>
+          </p:cNvSpPr>
+          <p:nvPr>
+            <p:ph type="sldImg"/>
+          </p:nvPr>
+        </p:nvSpPr>
+        <p:spPr/>
+      </p:sp>
+      <p:sp>
+        <p:nvSpPr>
+          <p:cNvPr id="3" name="Notes Placeholder 2"/>
+          <p:cNvSpPr>
+            <a:spLocks noGrp="1"/>
+          </p:cNvSpPr>
+          <p:nvPr>
+            <p:ph type="body" idx="1"/>
+          </p:nvPr>
+        </p:nvSpPr>
+        <p:spPr/>
+        <p:txBody>
+          <a:bodyPr/>
+          <a:lstStyle/>
+          <a:p>
+            <a:r>
+              <a:rPr lang="en-IE" dirty="0"/>
+              <a:t>Azure function</a:t>
+            </a:r>
+          </a:p>
+          <a:p>
+            <a:endParaRPr lang="en-US" dirty="0"/>
+          </a:p>
+        </p:txBody>
+      </p:sp>
+      <p:sp>
+        <p:nvSpPr>
+          <p:cNvPr id="4" name="Slide Number Placeholder 3"/>
+          <p:cNvSpPr>
+            <a:spLocks noGrp="1"/>
+          </p:cNvSpPr>
+          <p:nvPr>
+            <p:ph type="sldNum" sz="quarter" idx="5"/>
+          </p:nvPr>
+        </p:nvSpPr>
+        <p:spPr/>
+        <p:txBody>
+          <a:bodyPr/>
+          <a:lstStyle/>
+          <a:p>
+            <a:fld id="{5BBCC628-4FEB-4E9A-A626-C808C74B96E6}" type="slidenum">
+              <a:rPr lang="en-US" smtClean="0"/>
+              <a:t>16</a:t>
+            </a:fld>
+            <a:endParaRPr lang="en-US"/>
+          </a:p>
+        </p:txBody>
+      </p:sp>
+    </p:spTree>
+    <p:extLst>
+      <p:ext uri="{BB962C8B-B14F-4D97-AF65-F5344CB8AC3E}">
+        <p14:creationId xmlns:p14="http://schemas.microsoft.com/office/powerpoint/2010/main" val="2984912149"/>
+      </p:ext>
+    </p:extLst>
+  </p:cSld>
+  <p:clrMapOvr>
+    <a:masterClrMapping/>
+  </p:clrMapOvr>
+</p:notes>
+</file>
+
+<file path=ppt/notesSlides/notesSlide16.xml><?xml version="1.0" encoding="utf-8"?>
+<p:notes xmlns:a="http://schemas.openxmlformats.org/drawingml/2006/main" xmlns:r="http://schemas.openxmlformats.org/officeDocument/2006/relationships" xmlns:p="http://schemas.openxmlformats.org/presentationml/2006/main">
+  <p:cSld>
+    <p:spTree>
+      <p:nvGrpSpPr>
+        <p:cNvPr id="1" name=""/>
+        <p:cNvGrpSpPr/>
+        <p:nvPr/>
+      </p:nvGrpSpPr>
+      <p:grpSpPr>
+        <a:xfrm>
+          <a:off x="0" y="0"/>
+          <a:ext cx="0" cy="0"/>
+          <a:chOff x="0" y="0"/>
+          <a:chExt cx="0" cy="0"/>
+        </a:xfrm>
+      </p:grpSpPr>
+      <p:sp>
+        <p:nvSpPr>
+          <p:cNvPr id="2" name="Slide Image Placeholder 1"/>
+          <p:cNvSpPr>
+            <a:spLocks noGrp="1" noRot="1" noChangeAspect="1"/>
+          </p:cNvSpPr>
+          <p:nvPr>
+            <p:ph type="sldImg"/>
+          </p:nvPr>
+        </p:nvSpPr>
+        <p:spPr/>
+      </p:sp>
+      <p:sp>
+        <p:nvSpPr>
+          <p:cNvPr id="3" name="Notes Placeholder 2"/>
+          <p:cNvSpPr>
+            <a:spLocks noGrp="1"/>
+          </p:cNvSpPr>
+          <p:nvPr>
+            <p:ph type="body" idx="1"/>
+          </p:nvPr>
+        </p:nvSpPr>
+        <p:spPr/>
+        <p:txBody>
+          <a:bodyPr/>
+          <a:lstStyle/>
+          <a:p>
+            <a:r>
+              <a:rPr lang="en-IE" dirty="0"/>
+              <a:t>Azure function</a:t>
+            </a:r>
+          </a:p>
+          <a:p>
+            <a:endParaRPr lang="en-US" dirty="0"/>
+          </a:p>
+        </p:txBody>
+      </p:sp>
+      <p:sp>
+        <p:nvSpPr>
+          <p:cNvPr id="4" name="Slide Number Placeholder 3"/>
+          <p:cNvSpPr>
+            <a:spLocks noGrp="1"/>
+          </p:cNvSpPr>
+          <p:nvPr>
+            <p:ph type="sldNum" sz="quarter" idx="5"/>
+          </p:nvPr>
+        </p:nvSpPr>
+        <p:spPr/>
+        <p:txBody>
+          <a:bodyPr/>
+          <a:lstStyle/>
+          <a:p>
+            <a:fld id="{5BBCC628-4FEB-4E9A-A626-C808C74B96E6}" type="slidenum">
+              <a:rPr lang="en-US" smtClean="0"/>
+              <a:t>17</a:t>
+            </a:fld>
+            <a:endParaRPr lang="en-US"/>
+          </a:p>
+        </p:txBody>
+      </p:sp>
+    </p:spTree>
+    <p:extLst>
+      <p:ext uri="{BB962C8B-B14F-4D97-AF65-F5344CB8AC3E}">
+        <p14:creationId xmlns:p14="http://schemas.microsoft.com/office/powerpoint/2010/main" val="244752676"/>
+      </p:ext>
+    </p:extLst>
+  </p:cSld>
+  <p:clrMapOvr>
+    <a:masterClrMapping/>
+  </p:clrMapOvr>
+</p:notes>
+</file>
+
+<file path=ppt/notesSlides/notesSlide17.xml><?xml version="1.0" encoding="utf-8"?>
+<p:notes xmlns:a="http://schemas.openxmlformats.org/drawingml/2006/main" xmlns:r="http://schemas.openxmlformats.org/officeDocument/2006/relationships" xmlns:p="http://schemas.openxmlformats.org/presentationml/2006/main">
+  <p:cSld>
+    <p:spTree>
+      <p:nvGrpSpPr>
+        <p:cNvPr id="1" name=""/>
+        <p:cNvGrpSpPr/>
+        <p:nvPr/>
+      </p:nvGrpSpPr>
+      <p:grpSpPr>
+        <a:xfrm>
+          <a:off x="0" y="0"/>
+          <a:ext cx="0" cy="0"/>
+          <a:chOff x="0" y="0"/>
+          <a:chExt cx="0" cy="0"/>
+        </a:xfrm>
+      </p:grpSpPr>
+      <p:sp>
+        <p:nvSpPr>
+          <p:cNvPr id="2" name="Slide Image Placeholder 1"/>
+          <p:cNvSpPr>
+            <a:spLocks noGrp="1" noRot="1" noChangeAspect="1"/>
+          </p:cNvSpPr>
+          <p:nvPr>
+            <p:ph type="sldImg"/>
+          </p:nvPr>
+        </p:nvSpPr>
+        <p:spPr/>
+      </p:sp>
+      <p:sp>
+        <p:nvSpPr>
+          <p:cNvPr id="3" name="Notes Placeholder 2"/>
+          <p:cNvSpPr>
+            <a:spLocks noGrp="1"/>
+          </p:cNvSpPr>
+          <p:nvPr>
+            <p:ph type="body" idx="1"/>
+          </p:nvPr>
+        </p:nvSpPr>
+        <p:spPr/>
+        <p:txBody>
+          <a:bodyPr/>
+          <a:lstStyle/>
+          <a:p>
+            <a:r>
+              <a:rPr lang="en-IE" dirty="0"/>
+              <a:t>Resulting event stream</a:t>
+            </a:r>
+          </a:p>
+          <a:p>
+            <a:endParaRPr lang="en-US" dirty="0"/>
+          </a:p>
+        </p:txBody>
+      </p:sp>
+      <p:sp>
+        <p:nvSpPr>
+          <p:cNvPr id="4" name="Slide Number Placeholder 3"/>
+          <p:cNvSpPr>
+            <a:spLocks noGrp="1"/>
+          </p:cNvSpPr>
+          <p:nvPr>
+            <p:ph type="sldNum" sz="quarter" idx="5"/>
+          </p:nvPr>
+        </p:nvSpPr>
+        <p:spPr/>
+        <p:txBody>
+          <a:bodyPr/>
+          <a:lstStyle/>
+          <a:p>
+            <a:fld id="{5BBCC628-4FEB-4E9A-A626-C808C74B96E6}" type="slidenum">
+              <a:rPr lang="en-US" smtClean="0"/>
+              <a:t>18</a:t>
             </a:fld>
             <a:endParaRPr lang="en-US"/>
           </a:p>
@@ -919,8 +1397,17 @@
           <a:p>
             <a:r>
               <a:rPr lang="en-IE" dirty="0"/>
-              <a:t>Azure function</a:t>
-            </a:r>
+              <a:t>When the serverless function is triggered the account number is taken from the URL and is used to instantiate a new </a:t>
+            </a:r>
+            <a:r>
+              <a:rPr lang="en-IE" b="1" dirty="0" err="1"/>
+              <a:t>eventstream</a:t>
+            </a:r>
+            <a:r>
+              <a:rPr lang="en-IE" b="0" dirty="0"/>
+              <a:t> variable for that bank account.</a:t>
+            </a:r>
+            <a:endParaRPr lang="en-IE" dirty="0"/>
           </a:p>
           <a:p>
             <a:endParaRPr lang="en-US" dirty="0"/>
@@ -1009,7 +1496,7 @@
           <a:p>
             <a:r>
               <a:rPr lang="en-IE" dirty="0"/>
-              <a:t>Resulting event stream</a:t>
+              <a:t>Azure function</a:t>
             </a:r>
           </a:p>
           <a:p>
@@ -1043,7 +1530,7 @@
     </p:spTree>
     <p:extLst>
       <p:ext uri="{BB962C8B-B14F-4D97-AF65-F5344CB8AC3E}">
-        <p14:creationId xmlns:p14="http://schemas.microsoft.com/office/powerpoint/2010/main" val="918775975"/>
+        <p14:creationId xmlns:p14="http://schemas.microsoft.com/office/powerpoint/2010/main" val="1095400975"/>
       </p:ext>
     </p:extLst>
   </p:cSld>
@@ -1099,17 +1586,10 @@
           <a:p>
             <a:r>
               <a:rPr lang="en-IE" dirty="0"/>
-              <a:t>Design / constraints</a:t>
-            </a:r>
-          </a:p>
-          <a:p>
-            <a:endParaRPr lang="en-IE" dirty="0"/>
-          </a:p>
-          <a:p>
-            <a:r>
-              <a:rPr lang="en-IE" dirty="0"/>
-              <a:t>Depositing money is the simplest of all operations - we simply need to be sure that the account exists.</a:t>
-            </a:r>
+              <a:t>The same command is able to append more than one event onto the event stream if that makes business sense</a:t>
+            </a:r>
+          </a:p>
+          <a:p>
             <a:endParaRPr lang="en-US" dirty="0"/>
           </a:p>
         </p:txBody>
@@ -1140,7 +1620,7 @@
     </p:spTree>
     <p:extLst>
       <p:ext uri="{BB962C8B-B14F-4D97-AF65-F5344CB8AC3E}">
-        <p14:creationId xmlns:p14="http://schemas.microsoft.com/office/powerpoint/2010/main" val="1656640997"/>
+        <p14:creationId xmlns:p14="http://schemas.microsoft.com/office/powerpoint/2010/main" val="4031375984"/>
       </p:ext>
     </p:extLst>
   </p:cSld>
@@ -1196,8 +1676,47 @@
           <a:p>
             <a:r>
               <a:rPr lang="en-IE" dirty="0"/>
-              <a:t>Azure function</a:t>
-            </a:r>
+              <a:t>The event stream created is stored in the Azure blob storage under a path made of </a:t>
+            </a:r>
+            <a:r>
+              <a:rPr lang="en-IE" b="1" dirty="0"/>
+              <a:t>Domain name</a:t>
+            </a:r>
+            <a:r>
+              <a:rPr lang="en-IE" b="0" dirty="0"/>
+              <a:t> -&gt; </a:t>
+            </a:r>
+            <a:r>
+              <a:rPr lang="en-IE" b="1" dirty="0"/>
+              <a:t>Entity Type</a:t>
+            </a:r>
+            <a:endParaRPr lang="en-IE" b="0" dirty="0"/>
+          </a:p>
+          <a:p>
+            <a:endParaRPr lang="en-IE" b="0" dirty="0"/>
+          </a:p>
+          <a:p>
+            <a:pPr marL="228600" indent="-228600">
+              <a:buAutoNum type="arabicParenR"/>
+            </a:pPr>
+            <a:r>
+              <a:rPr lang="en-IE" b="0" dirty="0"/>
+              <a:t>Each blob also has metadata set for the properties of the event stream</a:t>
+            </a:r>
+          </a:p>
+          <a:p>
+            <a:pPr marL="228600" indent="-228600">
+              <a:buAutoNum type="arabicParenR"/>
+            </a:pPr>
+            <a:r>
+              <a:rPr lang="en-IE" b="0" dirty="0"/>
+              <a:t>The data for each event are in JSON and wrapped in the event </a:t>
+            </a:r>
+            <a:r>
+              <a:rPr lang="en-IE" b="1" dirty="0"/>
+              <a:t>context</a:t>
+            </a:r>
+            <a:endParaRPr lang="en-IE" dirty="0"/>
           </a:p>
           <a:p>
             <a:endParaRPr lang="en-US" dirty="0"/>
@@ -1230,7 +1749,7 @@
     </p:spTree>
     <p:extLst>
       <p:ext uri="{BB962C8B-B14F-4D97-AF65-F5344CB8AC3E}">
-        <p14:creationId xmlns:p14="http://schemas.microsoft.com/office/powerpoint/2010/main" val="2025540122"/>
+        <p14:creationId xmlns:p14="http://schemas.microsoft.com/office/powerpoint/2010/main" val="918775975"/>
       </p:ext>
     </p:extLst>
   </p:cSld>
@@ -1286,10 +1805,17 @@
           <a:p>
             <a:r>
               <a:rPr lang="en-IE" dirty="0"/>
-              <a:t>Resulting event stream</a:t>
-            </a:r>
-          </a:p>
-          <a:p>
+              <a:t>Design / constraints</a:t>
+            </a:r>
+          </a:p>
+          <a:p>
+            <a:endParaRPr lang="en-IE" dirty="0"/>
+          </a:p>
+          <a:p>
+            <a:r>
+              <a:rPr lang="en-IE" dirty="0"/>
+              <a:t>Depositing money is the simplest of all operations - we simply need to be sure that the account exists.</a:t>
+            </a:r>
             <a:endParaRPr lang="en-US" dirty="0"/>
           </a:p>
         </p:txBody>
@@ -1320,7 +1846,7 @@
     </p:spTree>
     <p:extLst>
       <p:ext uri="{BB962C8B-B14F-4D97-AF65-F5344CB8AC3E}">
-        <p14:creationId xmlns:p14="http://schemas.microsoft.com/office/powerpoint/2010/main" val="3482490530"/>
+        <p14:creationId xmlns:p14="http://schemas.microsoft.com/office/powerpoint/2010/main" val="1656640997"/>
       </p:ext>
     </p:extLst>
   </p:cSld>
@@ -1376,43 +1902,10 @@
           <a:p>
             <a:r>
               <a:rPr lang="en-IE" dirty="0"/>
-              <a:t>Design / constraints</a:t>
-            </a:r>
-          </a:p>
-          <a:p>
-            <a:endParaRPr lang="en-IE" dirty="0"/>
-          </a:p>
-          <a:p>
-            <a:r>
-              <a:rPr lang="en-IE" dirty="0"/>
-              <a:t>To get the balance of the account we need to run a </a:t>
-            </a:r>
-            <a:r>
-              <a:rPr lang="en-IE" dirty="0">
-                <a:hlinkClick r:id="rId3"/>
-              </a:rPr>
-              <a:t>projection</a:t>
-            </a:r>
-            <a:r>
-              <a:rPr lang="en-IE" dirty="0"/>
-              <a:t> over the bank account event stream which handles the </a:t>
-            </a:r>
-            <a:r>
-              <a:rPr lang="en-IE" b="1" dirty="0"/>
-              <a:t>money deposited</a:t>
-            </a:r>
-            <a:r>
-              <a:rPr lang="en-IE" dirty="0"/>
-              <a:t> event and the </a:t>
-            </a:r>
-            <a:r>
-              <a:rPr lang="en-IE" b="1" dirty="0"/>
-              <a:t>money withdrawn</a:t>
-            </a:r>
-            <a:r>
-              <a:rPr lang="en-IE" dirty="0"/>
-              <a:t> event to give the balance as at a given point.</a:t>
-            </a:r>
+              <a:t>Azure function</a:t>
+            </a:r>
+          </a:p>
+          <a:p>
             <a:endParaRPr lang="en-US" dirty="0"/>
           </a:p>
         </p:txBody>
@@ -1443,7 +1936,7 @@
     </p:spTree>
     <p:extLst>
       <p:ext uri="{BB962C8B-B14F-4D97-AF65-F5344CB8AC3E}">
-        <p14:creationId xmlns:p14="http://schemas.microsoft.com/office/powerpoint/2010/main" val="383098737"/>
+        <p14:creationId xmlns:p14="http://schemas.microsoft.com/office/powerpoint/2010/main" val="2025540122"/>
       </p:ext>
     </p:extLst>
   </p:cSld>
@@ -1499,8 +1992,23 @@
           <a:p>
             <a:r>
               <a:rPr lang="en-IE" dirty="0"/>
-              <a:t>Azure function</a:t>
-            </a:r>
+              <a:t>The deposit event is appended to the stream.</a:t>
+            </a:r>
+          </a:p>
+          <a:p>
+            <a:r>
+              <a:rPr lang="en-IE" dirty="0"/>
+              <a:t>Importantly the state (current balance etc.) of the bank account is </a:t>
+            </a:r>
+            <a:r>
+              <a:rPr lang="en-IE" b="1" dirty="0"/>
+              <a:t>not</a:t>
+            </a:r>
+            <a:r>
+              <a:rPr lang="en-IE" b="0" dirty="0"/>
+              <a:t> stored in the event</a:t>
+            </a:r>
+            <a:endParaRPr lang="en-IE" dirty="0"/>
           </a:p>
           <a:p>
             <a:endParaRPr lang="en-US" dirty="0"/>
@@ -1533,7 +2041,7 @@
     </p:spTree>
     <p:extLst>
       <p:ext uri="{BB962C8B-B14F-4D97-AF65-F5344CB8AC3E}">
-        <p14:creationId xmlns:p14="http://schemas.microsoft.com/office/powerpoint/2010/main" val="3753462135"/>
+        <p14:creationId xmlns:p14="http://schemas.microsoft.com/office/powerpoint/2010/main" val="3482490530"/>
       </p:ext>
     </p:extLst>
   </p:cSld>
@@ -1589,10 +2097,43 @@
           <a:p>
             <a:r>
               <a:rPr lang="en-IE" dirty="0"/>
-              <a:t>Resulting event stream</a:t>
-            </a:r>
-          </a:p>
-          <a:p>
+              <a:t>Design / constraints</a:t>
+            </a:r>
+          </a:p>
+          <a:p>
+            <a:endParaRPr lang="en-IE" dirty="0"/>
+          </a:p>
+          <a:p>
+            <a:r>
+              <a:rPr lang="en-IE" dirty="0"/>
+              <a:t>To get the balance of the account we need to run a </a:t>
+            </a:r>
+            <a:r>
+              <a:rPr lang="en-IE" dirty="0">
+                <a:hlinkClick r:id="rId3"/>
+              </a:rPr>
+              <a:t>projection</a:t>
+            </a:r>
+            <a:r>
+              <a:rPr lang="en-IE" dirty="0"/>
+              <a:t> over the bank account event stream which handles the </a:t>
+            </a:r>
+            <a:r>
+              <a:rPr lang="en-IE" b="1" dirty="0"/>
+              <a:t>money deposited</a:t>
+            </a:r>
+            <a:r>
+              <a:rPr lang="en-IE" dirty="0"/>
+              <a:t> event and the </a:t>
+            </a:r>
+            <a:r>
+              <a:rPr lang="en-IE" b="1" dirty="0"/>
+              <a:t>money withdrawn</a:t>
+            </a:r>
+            <a:r>
+              <a:rPr lang="en-IE" dirty="0"/>
+              <a:t> event to give the balance as at a given point.</a:t>
+            </a:r>
             <a:endParaRPr lang="en-US" dirty="0"/>
           </a:p>
         </p:txBody>
@@ -1623,7 +2164,7 @@
     </p:spTree>
     <p:extLst>
       <p:ext uri="{BB962C8B-B14F-4D97-AF65-F5344CB8AC3E}">
-        <p14:creationId xmlns:p14="http://schemas.microsoft.com/office/powerpoint/2010/main" val="1393497827"/>
+        <p14:creationId xmlns:p14="http://schemas.microsoft.com/office/powerpoint/2010/main" val="383098737"/>
       </p:ext>
     </p:extLst>
   </p:cSld>
@@ -5041,7 +5582,7 @@
           <p:cNvPr id="4" name="Picture 3">
             <a:extLst>
               <a:ext uri="{FF2B5EF4-FFF2-40B4-BE49-F238E27FC236}">
-                <a16:creationId xmlns:a16="http://schemas.microsoft.com/office/drawing/2014/main" id="{CB244C52-33DC-4B95-91CD-FC3CE83F3DD2}"/>
+                <a16:creationId xmlns:a16="http://schemas.microsoft.com/office/drawing/2014/main" id="{ECADDDDB-0834-4DB5-8FC9-55D9296D98CF}"/>
               </a:ext>
             </a:extLst>
           </p:cNvPr>
@@ -5058,18 +5599,150 @@
         </p:blipFill>
         <p:spPr>
           <a:xfrm>
-            <a:off x="10610850" y="35352"/>
-            <a:ext cx="1581150" cy="1704975"/>
+            <a:off x="11149989" y="68751"/>
+            <a:ext cx="942975" cy="1171575"/>
           </a:xfrm>
           <a:prstGeom prst="rect">
             <a:avLst/>
           </a:prstGeom>
         </p:spPr>
       </p:pic>
+      <p:pic>
+        <p:nvPicPr>
+          <p:cNvPr id="5" name="Picture 4">
+            <a:extLst>
+              <a:ext uri="{FF2B5EF4-FFF2-40B4-BE49-F238E27FC236}">
+                <a16:creationId xmlns:a16="http://schemas.microsoft.com/office/drawing/2014/main" id="{A32C7D29-34DB-4E79-A2CD-9E481D57A112}"/>
+              </a:ext>
+            </a:extLst>
+          </p:cNvPr>
+          <p:cNvPicPr>
+            <a:picLocks noChangeAspect="1"/>
+          </p:cNvPicPr>
+          <p:nvPr/>
+        </p:nvPicPr>
+        <p:blipFill>
+          <a:blip r:embed="rId4"/>
+          <a:stretch>
+            <a:fillRect/>
+          </a:stretch>
+        </p:blipFill>
+        <p:spPr>
+          <a:xfrm>
+            <a:off x="955799" y="1987062"/>
+            <a:ext cx="626511" cy="828196"/>
+          </a:xfrm>
+          <a:prstGeom prst="rect">
+            <a:avLst/>
+          </a:prstGeom>
+        </p:spPr>
+      </p:pic>
+      <p:sp>
+        <p:nvSpPr>
+          <p:cNvPr id="6" name="TextBox 5">
+            <a:extLst>
+              <a:ext uri="{FF2B5EF4-FFF2-40B4-BE49-F238E27FC236}">
+                <a16:creationId xmlns:a16="http://schemas.microsoft.com/office/drawing/2014/main" id="{05E210D5-B5D3-4D0D-B27A-1C4502FC03F7}"/>
+              </a:ext>
+            </a:extLst>
+          </p:cNvPr>
+          <p:cNvSpPr txBox="1"/>
+          <p:nvPr/>
+        </p:nvSpPr>
+        <p:spPr>
+          <a:xfrm>
+            <a:off x="1685676" y="2216494"/>
+            <a:ext cx="5391925" cy="369332"/>
+          </a:xfrm>
+          <a:prstGeom prst="rect">
+            <a:avLst/>
+          </a:prstGeom>
+          <a:noFill/>
+        </p:spPr>
+        <p:txBody>
+          <a:bodyPr wrap="none" rtlCol="0">
+            <a:spAutoFit/>
+          </a:bodyPr>
+          <a:lstStyle/>
+          <a:p>
+            <a:r>
+              <a:rPr lang="en-IE" dirty="0"/>
+              <a:t>The account number to get the balance from must exist</a:t>
+            </a:r>
+            <a:endParaRPr lang="en-GB" dirty="0"/>
+          </a:p>
+        </p:txBody>
+      </p:sp>
+      <p:pic>
+        <p:nvPicPr>
+          <p:cNvPr id="7" name="Picture 6">
+            <a:extLst>
+              <a:ext uri="{FF2B5EF4-FFF2-40B4-BE49-F238E27FC236}">
+                <a16:creationId xmlns:a16="http://schemas.microsoft.com/office/drawing/2014/main" id="{2A0F962D-913C-4D35-AA4C-208814C30878}"/>
+              </a:ext>
+            </a:extLst>
+          </p:cNvPr>
+          <p:cNvPicPr>
+            <a:picLocks noChangeAspect="1"/>
+          </p:cNvPicPr>
+          <p:nvPr/>
+        </p:nvPicPr>
+        <p:blipFill>
+          <a:blip r:embed="rId5"/>
+          <a:stretch>
+            <a:fillRect/>
+          </a:stretch>
+        </p:blipFill>
+        <p:spPr>
+          <a:xfrm>
+            <a:off x="883237" y="3429000"/>
+            <a:ext cx="771633" cy="762106"/>
+          </a:xfrm>
+          <a:prstGeom prst="rect">
+            <a:avLst/>
+          </a:prstGeom>
+        </p:spPr>
+      </p:pic>
+      <p:sp>
+        <p:nvSpPr>
+          <p:cNvPr id="8" name="TextBox 7">
+            <a:extLst>
+              <a:ext uri="{FF2B5EF4-FFF2-40B4-BE49-F238E27FC236}">
+                <a16:creationId xmlns:a16="http://schemas.microsoft.com/office/drawing/2014/main" id="{9F676E79-B265-404E-A7F4-988408308218}"/>
+              </a:ext>
+            </a:extLst>
+          </p:cNvPr>
+          <p:cNvSpPr txBox="1"/>
+          <p:nvPr/>
+        </p:nvSpPr>
+        <p:spPr>
+          <a:xfrm>
+            <a:off x="1685676" y="3625387"/>
+            <a:ext cx="2099421" cy="369332"/>
+          </a:xfrm>
+          <a:prstGeom prst="rect">
+            <a:avLst/>
+          </a:prstGeom>
+          <a:noFill/>
+        </p:spPr>
+        <p:txBody>
+          <a:bodyPr wrap="none" rtlCol="0">
+            <a:spAutoFit/>
+          </a:bodyPr>
+          <a:lstStyle/>
+          <a:p>
+            <a:r>
+              <a:rPr lang="en-IE" dirty="0"/>
+              <a:t>As of date (optional)</a:t>
+            </a:r>
+            <a:endParaRPr lang="en-GB" dirty="0"/>
+          </a:p>
+        </p:txBody>
+      </p:sp>
     </p:spTree>
     <p:extLst>
       <p:ext uri="{BB962C8B-B14F-4D97-AF65-F5344CB8AC3E}">
-        <p14:creationId xmlns:p14="http://schemas.microsoft.com/office/powerpoint/2010/main" val="1540590773"/>
+        <p14:creationId xmlns:p14="http://schemas.microsoft.com/office/powerpoint/2010/main" val="2578491145"/>
       </p:ext>
     </p:extLst>
   </p:cSld>
@@ -5119,7 +5792,7 @@
           <a:p>
             <a:r>
               <a:rPr lang="en-IE" dirty="0"/>
-              <a:t>Make a withdrawal</a:t>
+              <a:t>Get the balance</a:t>
             </a:r>
             <a:endParaRPr lang="en-US" dirty="0"/>
           </a:p>
@@ -5127,10 +5800,10 @@
       </p:sp>
       <p:pic>
         <p:nvPicPr>
-          <p:cNvPr id="4" name="Picture 3">
-            <a:extLst>
-              <a:ext uri="{FF2B5EF4-FFF2-40B4-BE49-F238E27FC236}">
-                <a16:creationId xmlns:a16="http://schemas.microsoft.com/office/drawing/2014/main" id="{ECADDDDB-0834-4DB5-8FC9-55D9296D98CF}"/>
+          <p:cNvPr id="3" name="Picture 2">
+            <a:extLst>
+              <a:ext uri="{FF2B5EF4-FFF2-40B4-BE49-F238E27FC236}">
+                <a16:creationId xmlns:a16="http://schemas.microsoft.com/office/drawing/2014/main" id="{9C2D67F8-4A34-4A96-959A-97647EF188D8}"/>
               </a:ext>
             </a:extLst>
           </p:cNvPr>
@@ -5140,31 +5813,153 @@
           <p:nvPr/>
         </p:nvPicPr>
         <p:blipFill>
-          <a:blip r:embed="rId3"/>
+          <a:blip r:embed="rId3">
+            <a:extLst>
+              <a:ext uri="{28A0092B-C50C-407E-A947-70E740481C1C}">
+                <a14:useLocalDpi xmlns:a14="http://schemas.microsoft.com/office/drawing/2010/main" val="0"/>
+              </a:ext>
+              <a:ext uri="{837473B0-CC2E-450A-ABE3-18F120FF3D39}">
+                <a1611:picAttrSrcUrl xmlns:a1611="http://schemas.microsoft.com/office/drawing/2016/11/main" r:id="rId4"/>
+              </a:ext>
+            </a:extLst>
+          </a:blip>
           <a:stretch>
             <a:fillRect/>
           </a:stretch>
         </p:blipFill>
         <p:spPr>
           <a:xfrm>
-            <a:off x="11149989" y="68751"/>
-            <a:ext cx="942975" cy="1171575"/>
+            <a:off x="10949305" y="137344"/>
+            <a:ext cx="1148189" cy="1050593"/>
           </a:xfrm>
           <a:prstGeom prst="rect">
             <a:avLst/>
           </a:prstGeom>
         </p:spPr>
       </p:pic>
+      <p:pic>
+        <p:nvPicPr>
+          <p:cNvPr id="4" name="Picture 3">
+            <a:extLst>
+              <a:ext uri="{FF2B5EF4-FFF2-40B4-BE49-F238E27FC236}">
+                <a16:creationId xmlns:a16="http://schemas.microsoft.com/office/drawing/2014/main" id="{7751211E-4C23-4CAB-A2DF-E5295DA67574}"/>
+              </a:ext>
+            </a:extLst>
+          </p:cNvPr>
+          <p:cNvPicPr>
+            <a:picLocks noChangeAspect="1"/>
+          </p:cNvPicPr>
+          <p:nvPr/>
+        </p:nvPicPr>
+        <p:blipFill>
+          <a:blip r:embed="rId5"/>
+          <a:stretch>
+            <a:fillRect/>
+          </a:stretch>
+        </p:blipFill>
+        <p:spPr>
+          <a:xfrm>
+            <a:off x="91751" y="2664674"/>
+            <a:ext cx="11760246" cy="1870003"/>
+          </a:xfrm>
+          <a:prstGeom prst="rect">
+            <a:avLst/>
+          </a:prstGeom>
+          <a:ln>
+            <a:solidFill>
+              <a:schemeClr val="tx1"/>
+            </a:solidFill>
+          </a:ln>
+        </p:spPr>
+      </p:pic>
     </p:spTree>
     <p:extLst>
       <p:ext uri="{BB962C8B-B14F-4D97-AF65-F5344CB8AC3E}">
-        <p14:creationId xmlns:p14="http://schemas.microsoft.com/office/powerpoint/2010/main" val="1026499652"/>
+        <p14:creationId xmlns:p14="http://schemas.microsoft.com/office/powerpoint/2010/main" val="309412189"/>
       </p:ext>
     </p:extLst>
   </p:cSld>
   <p:clrMapOvr>
     <a:masterClrMapping/>
   </p:clrMapOvr>
+  <p:timing>
+    <p:tnLst>
+      <p:par>
+        <p:cTn id="1" dur="indefinite" restart="never" nodeType="tmRoot">
+          <p:childTnLst>
+            <p:seq concurrent="1" nextAc="seek">
+              <p:cTn id="2" dur="indefinite" nodeType="mainSeq">
+                <p:childTnLst>
+                  <p:par>
+                    <p:cTn id="3" fill="hold">
+                      <p:stCondLst>
+                        <p:cond delay="indefinite"/>
+                        <p:cond evt="onBegin" delay="0">
+                          <p:tn val="2"/>
+                        </p:cond>
+                      </p:stCondLst>
+                      <p:childTnLst>
+                        <p:par>
+                          <p:cTn id="4" fill="hold">
+                            <p:stCondLst>
+                              <p:cond delay="0"/>
+                            </p:stCondLst>
+                            <p:childTnLst>
+                              <p:par>
+                                <p:cTn id="5" presetID="1" presetClass="entr" presetSubtype="0" fill="hold" nodeType="withEffect">
+                                  <p:stCondLst>
+                                    <p:cond delay="0"/>
+                                  </p:stCondLst>
+                                  <p:childTnLst>
+                                    <p:set>
+                                      <p:cBhvr>
+                                        <p:cTn id="6" dur="1" fill="hold">
+                                          <p:stCondLst>
+                                            <p:cond delay="0"/>
+                                          </p:stCondLst>
+                                        </p:cTn>
+                                        <p:tgtEl>
+                                          <p:spTgt spid="3"/>
+                                        </p:tgtEl>
+                                        <p:attrNameLst>
+                                          <p:attrName>style.visibility</p:attrName>
+                                        </p:attrNameLst>
+                                      </p:cBhvr>
+                                      <p:to>
+                                        <p:strVal val="visible"/>
+                                      </p:to>
+                                    </p:set>
+                                  </p:childTnLst>
+                                </p:cTn>
+                              </p:par>
+                            </p:childTnLst>
+                          </p:cTn>
+                        </p:par>
+                      </p:childTnLst>
+                    </p:cTn>
+                  </p:par>
+                </p:childTnLst>
+              </p:cTn>
+              <p:prevCondLst>
+                <p:cond evt="onPrev" delay="0">
+                  <p:tgtEl>
+                    <p:sldTgt/>
+                  </p:tgtEl>
+                </p:cond>
+              </p:prevCondLst>
+              <p:nextCondLst>
+                <p:cond evt="onNext" delay="0">
+                  <p:tgtEl>
+                    <p:sldTgt/>
+                  </p:tgtEl>
+                </p:cond>
+              </p:nextCondLst>
+            </p:seq>
+          </p:childTnLst>
+        </p:cTn>
+      </p:par>
+    </p:tnLst>
+  </p:timing>
 </p:sld>
 </file>
 
@@ -5208,7 +6003,7 @@
           <a:p>
             <a:r>
               <a:rPr lang="en-IE" dirty="0"/>
-              <a:t>Make a withdrawal</a:t>
+              <a:t>Balance projection</a:t>
             </a:r>
             <a:endParaRPr lang="en-US" dirty="0"/>
           </a:p>
@@ -5253,10 +6048,45 @@
           </a:prstGeom>
         </p:spPr>
       </p:pic>
+      <p:pic>
+        <p:nvPicPr>
+          <p:cNvPr id="5" name="Picture 4">
+            <a:extLst>
+              <a:ext uri="{FF2B5EF4-FFF2-40B4-BE49-F238E27FC236}">
+                <a16:creationId xmlns:a16="http://schemas.microsoft.com/office/drawing/2014/main" id="{1BC6AF66-DFC0-4B06-ABFD-42B1C56F5FAD}"/>
+              </a:ext>
+            </a:extLst>
+          </p:cNvPr>
+          <p:cNvPicPr>
+            <a:picLocks noChangeAspect="1"/>
+          </p:cNvPicPr>
+          <p:nvPr/>
+        </p:nvPicPr>
+        <p:blipFill>
+          <a:blip r:embed="rId5"/>
+          <a:stretch>
+            <a:fillRect/>
+          </a:stretch>
+        </p:blipFill>
+        <p:spPr>
+          <a:xfrm>
+            <a:off x="1314061" y="1379226"/>
+            <a:ext cx="8427098" cy="5478774"/>
+          </a:xfrm>
+          <a:prstGeom prst="rect">
+            <a:avLst/>
+          </a:prstGeom>
+          <a:ln>
+            <a:solidFill>
+              <a:schemeClr val="tx1"/>
+            </a:solidFill>
+          </a:ln>
+        </p:spPr>
+      </p:pic>
     </p:spTree>
     <p:extLst>
       <p:ext uri="{BB962C8B-B14F-4D97-AF65-F5344CB8AC3E}">
-        <p14:creationId xmlns:p14="http://schemas.microsoft.com/office/powerpoint/2010/main" val="2815050155"/>
+        <p14:creationId xmlns:p14="http://schemas.microsoft.com/office/powerpoint/2010/main" val="1798234859"/>
       </p:ext>
     </p:extLst>
   </p:cSld>
@@ -5384,7 +6214,218 @@
           <a:p>
             <a:r>
               <a:rPr lang="en-IE" dirty="0"/>
-              <a:t>Make a withdrawal</a:t>
+              <a:t>Get the balance</a:t>
+            </a:r>
+            <a:endParaRPr lang="en-US" dirty="0"/>
+          </a:p>
+        </p:txBody>
+      </p:sp>
+      <p:pic>
+        <p:nvPicPr>
+          <p:cNvPr id="3" name="Picture 2">
+            <a:extLst>
+              <a:ext uri="{FF2B5EF4-FFF2-40B4-BE49-F238E27FC236}">
+                <a16:creationId xmlns:a16="http://schemas.microsoft.com/office/drawing/2014/main" id="{9C2D67F8-4A34-4A96-959A-97647EF188D8}"/>
+              </a:ext>
+            </a:extLst>
+          </p:cNvPr>
+          <p:cNvPicPr>
+            <a:picLocks noChangeAspect="1"/>
+          </p:cNvPicPr>
+          <p:nvPr/>
+        </p:nvPicPr>
+        <p:blipFill>
+          <a:blip r:embed="rId3">
+            <a:extLst>
+              <a:ext uri="{28A0092B-C50C-407E-A947-70E740481C1C}">
+                <a14:useLocalDpi xmlns:a14="http://schemas.microsoft.com/office/drawing/2010/main" val="0"/>
+              </a:ext>
+              <a:ext uri="{837473B0-CC2E-450A-ABE3-18F120FF3D39}">
+                <a1611:picAttrSrcUrl xmlns:a1611="http://schemas.microsoft.com/office/drawing/2016/11/main" r:id="rId4"/>
+              </a:ext>
+            </a:extLst>
+          </a:blip>
+          <a:stretch>
+            <a:fillRect/>
+          </a:stretch>
+        </p:blipFill>
+        <p:spPr>
+          <a:xfrm>
+            <a:off x="10949305" y="137344"/>
+            <a:ext cx="1148189" cy="1050593"/>
+          </a:xfrm>
+          <a:prstGeom prst="rect">
+            <a:avLst/>
+          </a:prstGeom>
+        </p:spPr>
+      </p:pic>
+      <p:pic>
+        <p:nvPicPr>
+          <p:cNvPr id="4" name="Picture 3">
+            <a:extLst>
+              <a:ext uri="{FF2B5EF4-FFF2-40B4-BE49-F238E27FC236}">
+                <a16:creationId xmlns:a16="http://schemas.microsoft.com/office/drawing/2014/main" id="{CD1367F7-9DDA-4CD1-A0B0-E4B03627DC53}"/>
+              </a:ext>
+            </a:extLst>
+          </p:cNvPr>
+          <p:cNvPicPr>
+            <a:picLocks noChangeAspect="1"/>
+          </p:cNvPicPr>
+          <p:nvPr/>
+        </p:nvPicPr>
+        <p:blipFill>
+          <a:blip r:embed="rId5"/>
+          <a:stretch>
+            <a:fillRect/>
+          </a:stretch>
+        </p:blipFill>
+        <p:spPr>
+          <a:xfrm>
+            <a:off x="268436" y="2301482"/>
+            <a:ext cx="11655127" cy="2777675"/>
+          </a:xfrm>
+          <a:prstGeom prst="rect">
+            <a:avLst/>
+          </a:prstGeom>
+          <a:ln>
+            <a:solidFill>
+              <a:schemeClr val="tx1"/>
+            </a:solidFill>
+          </a:ln>
+        </p:spPr>
+      </p:pic>
+    </p:spTree>
+    <p:extLst>
+      <p:ext uri="{BB962C8B-B14F-4D97-AF65-F5344CB8AC3E}">
+        <p14:creationId xmlns:p14="http://schemas.microsoft.com/office/powerpoint/2010/main" val="1329295550"/>
+      </p:ext>
+    </p:extLst>
+  </p:cSld>
+  <p:clrMapOvr>
+    <a:masterClrMapping/>
+  </p:clrMapOvr>
+  <p:timing>
+    <p:tnLst>
+      <p:par>
+        <p:cTn id="1" dur="indefinite" restart="never" nodeType="tmRoot">
+          <p:childTnLst>
+            <p:seq concurrent="1" nextAc="seek">
+              <p:cTn id="2" dur="indefinite" nodeType="mainSeq">
+                <p:childTnLst>
+                  <p:par>
+                    <p:cTn id="3" fill="hold">
+                      <p:stCondLst>
+                        <p:cond delay="indefinite"/>
+                        <p:cond evt="onBegin" delay="0">
+                          <p:tn val="2"/>
+                        </p:cond>
+                      </p:stCondLst>
+                      <p:childTnLst>
+                        <p:par>
+                          <p:cTn id="4" fill="hold">
+                            <p:stCondLst>
+                              <p:cond delay="0"/>
+                            </p:stCondLst>
+                            <p:childTnLst>
+                              <p:par>
+                                <p:cTn id="5" presetID="1" presetClass="entr" presetSubtype="0" fill="hold" nodeType="withEffect">
+                                  <p:stCondLst>
+                                    <p:cond delay="0"/>
+                                  </p:stCondLst>
+                                  <p:childTnLst>
+                                    <p:set>
+                                      <p:cBhvr>
+                                        <p:cTn id="6" dur="1" fill="hold">
+                                          <p:stCondLst>
+                                            <p:cond delay="0"/>
+                                          </p:stCondLst>
+                                        </p:cTn>
+                                        <p:tgtEl>
+                                          <p:spTgt spid="3"/>
+                                        </p:tgtEl>
+                                        <p:attrNameLst>
+                                          <p:attrName>style.visibility</p:attrName>
+                                        </p:attrNameLst>
+                                      </p:cBhvr>
+                                      <p:to>
+                                        <p:strVal val="visible"/>
+                                      </p:to>
+                                    </p:set>
+                                  </p:childTnLst>
+                                </p:cTn>
+                              </p:par>
+                            </p:childTnLst>
+                          </p:cTn>
+                        </p:par>
+                      </p:childTnLst>
+                    </p:cTn>
+                  </p:par>
+                </p:childTnLst>
+              </p:cTn>
+              <p:prevCondLst>
+                <p:cond evt="onPrev" delay="0">
+                  <p:tgtEl>
+                    <p:sldTgt/>
+                  </p:tgtEl>
+                </p:cond>
+              </p:prevCondLst>
+              <p:nextCondLst>
+                <p:cond evt="onNext" delay="0">
+                  <p:tgtEl>
+                    <p:sldTgt/>
+                  </p:tgtEl>
+                </p:cond>
+              </p:nextCondLst>
+            </p:seq>
+          </p:childTnLst>
+        </p:cTn>
+      </p:par>
+    </p:tnLst>
+  </p:timing>
+</p:sld>
+</file>
+
+<file path=ppt/slides/slide14.xml><?xml version="1.0" encoding="utf-8"?>
+<p:sld xmlns:a="http://schemas.openxmlformats.org/drawingml/2006/main" xmlns:r="http://schemas.openxmlformats.org/officeDocument/2006/relationships" xmlns:p="http://schemas.openxmlformats.org/presentationml/2006/main">
+  <p:cSld>
+    <p:spTree>
+      <p:nvGrpSpPr>
+        <p:cNvPr id="1" name=""/>
+        <p:cNvGrpSpPr/>
+        <p:nvPr/>
+      </p:nvGrpSpPr>
+      <p:grpSpPr>
+        <a:xfrm>
+          <a:off x="0" y="0"/>
+          <a:ext cx="0" cy="0"/>
+          <a:chOff x="0" y="0"/>
+          <a:chExt cx="0" cy="0"/>
+        </a:xfrm>
+      </p:grpSpPr>
+      <p:sp>
+        <p:nvSpPr>
+          <p:cNvPr id="2" name="Title 1">
+            <a:extLst>
+              <a:ext uri="{FF2B5EF4-FFF2-40B4-BE49-F238E27FC236}">
+                <a16:creationId xmlns:a16="http://schemas.microsoft.com/office/drawing/2014/main" id="{E6F3015D-6EE8-4540-8606-15AAF5130827}"/>
+              </a:ext>
+            </a:extLst>
+          </p:cNvPr>
+          <p:cNvSpPr>
+            <a:spLocks noGrp="1"/>
+          </p:cNvSpPr>
+          <p:nvPr>
+            <p:ph type="title"/>
+          </p:nvPr>
+        </p:nvSpPr>
+        <p:spPr/>
+        <p:txBody>
+          <a:bodyPr/>
+          <a:lstStyle/>
+          <a:p>
+            <a:r>
+              <a:rPr lang="en-IE" dirty="0"/>
+              <a:t>Get the balance</a:t>
             </a:r>
             <a:endParaRPr lang="en-US" dirty="0"/>
           </a:p>
@@ -5418,6 +6459,1212 @@
           <a:prstGeom prst="rect">
             <a:avLst/>
           </a:prstGeom>
+        </p:spPr>
+      </p:pic>
+      <p:pic>
+        <p:nvPicPr>
+          <p:cNvPr id="3" name="Picture 2">
+            <a:extLst>
+              <a:ext uri="{FF2B5EF4-FFF2-40B4-BE49-F238E27FC236}">
+                <a16:creationId xmlns:a16="http://schemas.microsoft.com/office/drawing/2014/main" id="{DA7ED576-6230-4696-9C61-662D8394624F}"/>
+              </a:ext>
+            </a:extLst>
+          </p:cNvPr>
+          <p:cNvPicPr>
+            <a:picLocks noChangeAspect="1"/>
+          </p:cNvPicPr>
+          <p:nvPr/>
+        </p:nvPicPr>
+        <p:blipFill>
+          <a:blip r:embed="rId4"/>
+          <a:stretch>
+            <a:fillRect/>
+          </a:stretch>
+        </p:blipFill>
+        <p:spPr>
+          <a:xfrm>
+            <a:off x="364104" y="2453951"/>
+            <a:ext cx="11463791" cy="1950098"/>
+          </a:xfrm>
+          <a:prstGeom prst="rect">
+            <a:avLst/>
+          </a:prstGeom>
+          <a:ln>
+            <a:solidFill>
+              <a:schemeClr val="tx1"/>
+            </a:solidFill>
+          </a:ln>
+        </p:spPr>
+      </p:pic>
+    </p:spTree>
+    <p:extLst>
+      <p:ext uri="{BB962C8B-B14F-4D97-AF65-F5344CB8AC3E}">
+        <p14:creationId xmlns:p14="http://schemas.microsoft.com/office/powerpoint/2010/main" val="1540590773"/>
+      </p:ext>
+    </p:extLst>
+  </p:cSld>
+  <p:clrMapOvr>
+    <a:masterClrMapping/>
+  </p:clrMapOvr>
+</p:sld>
+</file>
+
+<file path=ppt/slides/slide15.xml><?xml version="1.0" encoding="utf-8"?>
+<p:sld xmlns:a="http://schemas.openxmlformats.org/drawingml/2006/main" xmlns:r="http://schemas.openxmlformats.org/officeDocument/2006/relationships" xmlns:p="http://schemas.openxmlformats.org/presentationml/2006/main">
+  <p:cSld>
+    <p:spTree>
+      <p:nvGrpSpPr>
+        <p:cNvPr id="1" name=""/>
+        <p:cNvGrpSpPr/>
+        <p:nvPr/>
+      </p:nvGrpSpPr>
+      <p:grpSpPr>
+        <a:xfrm>
+          <a:off x="0" y="0"/>
+          <a:ext cx="0" cy="0"/>
+          <a:chOff x="0" y="0"/>
+          <a:chExt cx="0" cy="0"/>
+        </a:xfrm>
+      </p:grpSpPr>
+      <p:sp>
+        <p:nvSpPr>
+          <p:cNvPr id="2" name="Title 1">
+            <a:extLst>
+              <a:ext uri="{FF2B5EF4-FFF2-40B4-BE49-F238E27FC236}">
+                <a16:creationId xmlns:a16="http://schemas.microsoft.com/office/drawing/2014/main" id="{E6F3015D-6EE8-4540-8606-15AAF5130827}"/>
+              </a:ext>
+            </a:extLst>
+          </p:cNvPr>
+          <p:cNvSpPr>
+            <a:spLocks noGrp="1"/>
+          </p:cNvSpPr>
+          <p:nvPr>
+            <p:ph type="title"/>
+          </p:nvPr>
+        </p:nvSpPr>
+        <p:spPr/>
+        <p:txBody>
+          <a:bodyPr/>
+          <a:lstStyle/>
+          <a:p>
+            <a:r>
+              <a:rPr lang="en-IE" dirty="0"/>
+              <a:t>Make a withdrawal</a:t>
+            </a:r>
+            <a:endParaRPr lang="en-US" dirty="0"/>
+          </a:p>
+        </p:txBody>
+      </p:sp>
+      <p:pic>
+        <p:nvPicPr>
+          <p:cNvPr id="4" name="Picture 3">
+            <a:extLst>
+              <a:ext uri="{FF2B5EF4-FFF2-40B4-BE49-F238E27FC236}">
+                <a16:creationId xmlns:a16="http://schemas.microsoft.com/office/drawing/2014/main" id="{ECADDDDB-0834-4DB5-8FC9-55D9296D98CF}"/>
+              </a:ext>
+            </a:extLst>
+          </p:cNvPr>
+          <p:cNvPicPr>
+            <a:picLocks noChangeAspect="1"/>
+          </p:cNvPicPr>
+          <p:nvPr/>
+        </p:nvPicPr>
+        <p:blipFill>
+          <a:blip r:embed="rId3"/>
+          <a:stretch>
+            <a:fillRect/>
+          </a:stretch>
+        </p:blipFill>
+        <p:spPr>
+          <a:xfrm>
+            <a:off x="11149989" y="68751"/>
+            <a:ext cx="942975" cy="1171575"/>
+          </a:xfrm>
+          <a:prstGeom prst="rect">
+            <a:avLst/>
+          </a:prstGeom>
+        </p:spPr>
+      </p:pic>
+      <p:pic>
+        <p:nvPicPr>
+          <p:cNvPr id="5" name="Picture 4">
+            <a:extLst>
+              <a:ext uri="{FF2B5EF4-FFF2-40B4-BE49-F238E27FC236}">
+                <a16:creationId xmlns:a16="http://schemas.microsoft.com/office/drawing/2014/main" id="{2EF70141-5317-47B9-9BF5-753F3E2DC7CF}"/>
+              </a:ext>
+            </a:extLst>
+          </p:cNvPr>
+          <p:cNvPicPr>
+            <a:picLocks noChangeAspect="1"/>
+          </p:cNvPicPr>
+          <p:nvPr/>
+        </p:nvPicPr>
+        <p:blipFill>
+          <a:blip r:embed="rId4"/>
+          <a:stretch>
+            <a:fillRect/>
+          </a:stretch>
+        </p:blipFill>
+        <p:spPr>
+          <a:xfrm>
+            <a:off x="955799" y="1987062"/>
+            <a:ext cx="626511" cy="828196"/>
+          </a:xfrm>
+          <a:prstGeom prst="rect">
+            <a:avLst/>
+          </a:prstGeom>
+        </p:spPr>
+      </p:pic>
+      <p:sp>
+        <p:nvSpPr>
+          <p:cNvPr id="6" name="TextBox 5">
+            <a:extLst>
+              <a:ext uri="{FF2B5EF4-FFF2-40B4-BE49-F238E27FC236}">
+                <a16:creationId xmlns:a16="http://schemas.microsoft.com/office/drawing/2014/main" id="{2ACD1180-1FE0-4999-B8B0-C717E2CDC791}"/>
+              </a:ext>
+            </a:extLst>
+          </p:cNvPr>
+          <p:cNvSpPr txBox="1"/>
+          <p:nvPr/>
+        </p:nvSpPr>
+        <p:spPr>
+          <a:xfrm>
+            <a:off x="1685676" y="2216494"/>
+            <a:ext cx="5154553" cy="369332"/>
+          </a:xfrm>
+          <a:prstGeom prst="rect">
+            <a:avLst/>
+          </a:prstGeom>
+          <a:noFill/>
+        </p:spPr>
+        <p:txBody>
+          <a:bodyPr wrap="none" rtlCol="0">
+            <a:spAutoFit/>
+          </a:bodyPr>
+          <a:lstStyle/>
+          <a:p>
+            <a:r>
+              <a:rPr lang="en-IE" dirty="0"/>
+              <a:t>Target account number for the withdrawal must exist</a:t>
+            </a:r>
+            <a:endParaRPr lang="en-GB" dirty="0"/>
+          </a:p>
+        </p:txBody>
+      </p:sp>
+      <p:pic>
+        <p:nvPicPr>
+          <p:cNvPr id="7" name="Picture 6">
+            <a:extLst>
+              <a:ext uri="{FF2B5EF4-FFF2-40B4-BE49-F238E27FC236}">
+                <a16:creationId xmlns:a16="http://schemas.microsoft.com/office/drawing/2014/main" id="{55147A65-0F03-4870-B202-37110447D46C}"/>
+              </a:ext>
+            </a:extLst>
+          </p:cNvPr>
+          <p:cNvPicPr>
+            <a:picLocks noChangeAspect="1"/>
+          </p:cNvPicPr>
+          <p:nvPr/>
+        </p:nvPicPr>
+        <p:blipFill>
+          <a:blip r:embed="rId4"/>
+          <a:stretch>
+            <a:fillRect/>
+          </a:stretch>
+        </p:blipFill>
+        <p:spPr>
+          <a:xfrm>
+            <a:off x="955799" y="3014902"/>
+            <a:ext cx="626511" cy="828196"/>
+          </a:xfrm>
+          <a:prstGeom prst="rect">
+            <a:avLst/>
+          </a:prstGeom>
+        </p:spPr>
+      </p:pic>
+      <p:sp>
+        <p:nvSpPr>
+          <p:cNvPr id="8" name="TextBox 7">
+            <a:extLst>
+              <a:ext uri="{FF2B5EF4-FFF2-40B4-BE49-F238E27FC236}">
+                <a16:creationId xmlns:a16="http://schemas.microsoft.com/office/drawing/2014/main" id="{D7728E13-AF35-4B74-9120-778C334F66EE}"/>
+              </a:ext>
+            </a:extLst>
+          </p:cNvPr>
+          <p:cNvSpPr txBox="1"/>
+          <p:nvPr/>
+        </p:nvSpPr>
+        <p:spPr>
+          <a:xfrm>
+            <a:off x="1685676" y="3244334"/>
+            <a:ext cx="6286273" cy="369332"/>
+          </a:xfrm>
+          <a:prstGeom prst="rect">
+            <a:avLst/>
+          </a:prstGeom>
+          <a:noFill/>
+        </p:spPr>
+        <p:txBody>
+          <a:bodyPr wrap="none" rtlCol="0">
+            <a:spAutoFit/>
+          </a:bodyPr>
+          <a:lstStyle/>
+          <a:p>
+            <a:r>
+              <a:rPr lang="en-IE" dirty="0"/>
+              <a:t>Balance must be greater than or equal to the withdrawal amount</a:t>
+            </a:r>
+            <a:endParaRPr lang="en-GB" dirty="0"/>
+          </a:p>
+        </p:txBody>
+      </p:sp>
+      <p:pic>
+        <p:nvPicPr>
+          <p:cNvPr id="9" name="Picture 8">
+            <a:extLst>
+              <a:ext uri="{FF2B5EF4-FFF2-40B4-BE49-F238E27FC236}">
+                <a16:creationId xmlns:a16="http://schemas.microsoft.com/office/drawing/2014/main" id="{16B548F9-7B89-42B2-9513-E45694AAB4C9}"/>
+              </a:ext>
+            </a:extLst>
+          </p:cNvPr>
+          <p:cNvPicPr>
+            <a:picLocks noChangeAspect="1"/>
+          </p:cNvPicPr>
+          <p:nvPr/>
+        </p:nvPicPr>
+        <p:blipFill>
+          <a:blip r:embed="rId5"/>
+          <a:stretch>
+            <a:fillRect/>
+          </a:stretch>
+        </p:blipFill>
+        <p:spPr>
+          <a:xfrm>
+            <a:off x="914043" y="4120553"/>
+            <a:ext cx="771633" cy="762106"/>
+          </a:xfrm>
+          <a:prstGeom prst="rect">
+            <a:avLst/>
+          </a:prstGeom>
+        </p:spPr>
+      </p:pic>
+      <p:sp>
+        <p:nvSpPr>
+          <p:cNvPr id="10" name="TextBox 9">
+            <a:extLst>
+              <a:ext uri="{FF2B5EF4-FFF2-40B4-BE49-F238E27FC236}">
+                <a16:creationId xmlns:a16="http://schemas.microsoft.com/office/drawing/2014/main" id="{12801F19-14FD-4970-9DAE-DC2C9CDE3D32}"/>
+              </a:ext>
+            </a:extLst>
+          </p:cNvPr>
+          <p:cNvSpPr txBox="1"/>
+          <p:nvPr/>
+        </p:nvSpPr>
+        <p:spPr>
+          <a:xfrm>
+            <a:off x="1716482" y="4316940"/>
+            <a:ext cx="2061975" cy="369332"/>
+          </a:xfrm>
+          <a:prstGeom prst="rect">
+            <a:avLst/>
+          </a:prstGeom>
+          <a:noFill/>
+        </p:spPr>
+        <p:txBody>
+          <a:bodyPr wrap="none" rtlCol="0">
+            <a:spAutoFit/>
+          </a:bodyPr>
+          <a:lstStyle/>
+          <a:p>
+            <a:r>
+              <a:rPr lang="en-IE" dirty="0"/>
+              <a:t>Withdrawal amount</a:t>
+            </a:r>
+            <a:endParaRPr lang="en-GB" dirty="0"/>
+          </a:p>
+        </p:txBody>
+      </p:sp>
+      <p:pic>
+        <p:nvPicPr>
+          <p:cNvPr id="3" name="Picture 2">
+            <a:extLst>
+              <a:ext uri="{FF2B5EF4-FFF2-40B4-BE49-F238E27FC236}">
+                <a16:creationId xmlns:a16="http://schemas.microsoft.com/office/drawing/2014/main" id="{20F77D92-DE59-437C-8B2A-364AB64D6BD0}"/>
+              </a:ext>
+            </a:extLst>
+          </p:cNvPr>
+          <p:cNvPicPr>
+            <a:picLocks noChangeAspect="1"/>
+          </p:cNvPicPr>
+          <p:nvPr/>
+        </p:nvPicPr>
+        <p:blipFill>
+          <a:blip r:embed="rId6"/>
+          <a:stretch>
+            <a:fillRect/>
+          </a:stretch>
+        </p:blipFill>
+        <p:spPr>
+          <a:xfrm>
+            <a:off x="8722127" y="2562551"/>
+            <a:ext cx="1978023" cy="1732898"/>
+          </a:xfrm>
+          <a:prstGeom prst="rect">
+            <a:avLst/>
+          </a:prstGeom>
+        </p:spPr>
+      </p:pic>
+      <p:sp>
+        <p:nvSpPr>
+          <p:cNvPr id="11" name="TextBox 10">
+            <a:extLst>
+              <a:ext uri="{FF2B5EF4-FFF2-40B4-BE49-F238E27FC236}">
+                <a16:creationId xmlns:a16="http://schemas.microsoft.com/office/drawing/2014/main" id="{365B6052-F0E5-4FBD-B9D9-38C71ADD1A66}"/>
+              </a:ext>
+            </a:extLst>
+          </p:cNvPr>
+          <p:cNvSpPr txBox="1"/>
+          <p:nvPr/>
+        </p:nvSpPr>
+        <p:spPr>
+          <a:xfrm>
+            <a:off x="8610808" y="4143138"/>
+            <a:ext cx="2352888" cy="369332"/>
+          </a:xfrm>
+          <a:prstGeom prst="rect">
+            <a:avLst/>
+          </a:prstGeom>
+          <a:noFill/>
+        </p:spPr>
+        <p:txBody>
+          <a:bodyPr wrap="none" rtlCol="0">
+            <a:spAutoFit/>
+          </a:bodyPr>
+          <a:lstStyle/>
+          <a:p>
+            <a:r>
+              <a:rPr lang="en-IE" dirty="0">
+                <a:solidFill>
+                  <a:srgbClr val="FF0000"/>
+                </a:solidFill>
+              </a:rPr>
+              <a:t>Concurrency crocodile!</a:t>
+            </a:r>
+            <a:endParaRPr lang="en-GB" dirty="0">
+              <a:solidFill>
+                <a:srgbClr val="FF0000"/>
+              </a:solidFill>
+            </a:endParaRPr>
+          </a:p>
+        </p:txBody>
+      </p:sp>
+    </p:spTree>
+    <p:extLst>
+      <p:ext uri="{BB962C8B-B14F-4D97-AF65-F5344CB8AC3E}">
+        <p14:creationId xmlns:p14="http://schemas.microsoft.com/office/powerpoint/2010/main" val="1026499652"/>
+      </p:ext>
+    </p:extLst>
+  </p:cSld>
+  <p:clrMapOvr>
+    <a:masterClrMapping/>
+  </p:clrMapOvr>
+  <p:timing>
+    <p:tnLst>
+      <p:par>
+        <p:cTn id="1" dur="indefinite" restart="never" nodeType="tmRoot">
+          <p:childTnLst>
+            <p:seq concurrent="1" nextAc="seek">
+              <p:cTn id="2" dur="indefinite" nodeType="mainSeq">
+                <p:childTnLst>
+                  <p:par>
+                    <p:cTn id="3" fill="hold">
+                      <p:stCondLst>
+                        <p:cond delay="indefinite"/>
+                      </p:stCondLst>
+                      <p:childTnLst>
+                        <p:par>
+                          <p:cTn id="4" fill="hold">
+                            <p:stCondLst>
+                              <p:cond delay="0"/>
+                            </p:stCondLst>
+                            <p:childTnLst>
+                              <p:par>
+                                <p:cTn id="5" presetID="1" presetClass="entr" presetSubtype="0" fill="hold" nodeType="clickEffect">
+                                  <p:stCondLst>
+                                    <p:cond delay="0"/>
+                                  </p:stCondLst>
+                                  <p:childTnLst>
+                                    <p:set>
+                                      <p:cBhvr>
+                                        <p:cTn id="6" dur="1" fill="hold">
+                                          <p:stCondLst>
+                                            <p:cond delay="0"/>
+                                          </p:stCondLst>
+                                        </p:cTn>
+                                        <p:tgtEl>
+                                          <p:spTgt spid="3"/>
+                                        </p:tgtEl>
+                                        <p:attrNameLst>
+                                          <p:attrName>style.visibility</p:attrName>
+                                        </p:attrNameLst>
+                                      </p:cBhvr>
+                                      <p:to>
+                                        <p:strVal val="visible"/>
+                                      </p:to>
+                                    </p:set>
+                                  </p:childTnLst>
+                                </p:cTn>
+                              </p:par>
+                              <p:par>
+                                <p:cTn id="7" presetID="1" presetClass="entr" presetSubtype="0" fill="hold" grpId="0" nodeType="withEffect">
+                                  <p:stCondLst>
+                                    <p:cond delay="0"/>
+                                  </p:stCondLst>
+                                  <p:childTnLst>
+                                    <p:set>
+                                      <p:cBhvr>
+                                        <p:cTn id="8" dur="1" fill="hold">
+                                          <p:stCondLst>
+                                            <p:cond delay="0"/>
+                                          </p:stCondLst>
+                                        </p:cTn>
+                                        <p:tgtEl>
+                                          <p:spTgt spid="11"/>
+                                        </p:tgtEl>
+                                        <p:attrNameLst>
+                                          <p:attrName>style.visibility</p:attrName>
+                                        </p:attrNameLst>
+                                      </p:cBhvr>
+                                      <p:to>
+                                        <p:strVal val="visible"/>
+                                      </p:to>
+                                    </p:set>
+                                  </p:childTnLst>
+                                </p:cTn>
+                              </p:par>
+                            </p:childTnLst>
+                          </p:cTn>
+                        </p:par>
+                      </p:childTnLst>
+                    </p:cTn>
+                  </p:par>
+                </p:childTnLst>
+              </p:cTn>
+              <p:prevCondLst>
+                <p:cond evt="onPrev" delay="0">
+                  <p:tgtEl>
+                    <p:sldTgt/>
+                  </p:tgtEl>
+                </p:cond>
+              </p:prevCondLst>
+              <p:nextCondLst>
+                <p:cond evt="onNext" delay="0">
+                  <p:tgtEl>
+                    <p:sldTgt/>
+                  </p:tgtEl>
+                </p:cond>
+              </p:nextCondLst>
+            </p:seq>
+          </p:childTnLst>
+        </p:cTn>
+      </p:par>
+    </p:tnLst>
+    <p:bldLst>
+      <p:bldP spid="11" grpId="0"/>
+    </p:bldLst>
+  </p:timing>
+</p:sld>
+</file>
+
+<file path=ppt/slides/slide16.xml><?xml version="1.0" encoding="utf-8"?>
+<p:sld xmlns:a="http://schemas.openxmlformats.org/drawingml/2006/main" xmlns:r="http://schemas.openxmlformats.org/officeDocument/2006/relationships" xmlns:p="http://schemas.openxmlformats.org/presentationml/2006/main">
+  <p:cSld>
+    <p:spTree>
+      <p:nvGrpSpPr>
+        <p:cNvPr id="1" name=""/>
+        <p:cNvGrpSpPr/>
+        <p:nvPr/>
+      </p:nvGrpSpPr>
+      <p:grpSpPr>
+        <a:xfrm>
+          <a:off x="0" y="0"/>
+          <a:ext cx="0" cy="0"/>
+          <a:chOff x="0" y="0"/>
+          <a:chExt cx="0" cy="0"/>
+        </a:xfrm>
+      </p:grpSpPr>
+      <p:sp>
+        <p:nvSpPr>
+          <p:cNvPr id="2" name="Title 1">
+            <a:extLst>
+              <a:ext uri="{FF2B5EF4-FFF2-40B4-BE49-F238E27FC236}">
+                <a16:creationId xmlns:a16="http://schemas.microsoft.com/office/drawing/2014/main" id="{E6F3015D-6EE8-4540-8606-15AAF5130827}"/>
+              </a:ext>
+            </a:extLst>
+          </p:cNvPr>
+          <p:cNvSpPr>
+            <a:spLocks noGrp="1"/>
+          </p:cNvSpPr>
+          <p:nvPr>
+            <p:ph type="title"/>
+          </p:nvPr>
+        </p:nvSpPr>
+        <p:spPr/>
+        <p:txBody>
+          <a:bodyPr/>
+          <a:lstStyle/>
+          <a:p>
+            <a:r>
+              <a:rPr lang="en-IE" dirty="0"/>
+              <a:t>Make a withdrawal</a:t>
+            </a:r>
+            <a:endParaRPr lang="en-US" dirty="0"/>
+          </a:p>
+        </p:txBody>
+      </p:sp>
+      <p:pic>
+        <p:nvPicPr>
+          <p:cNvPr id="3" name="Picture 2">
+            <a:extLst>
+              <a:ext uri="{FF2B5EF4-FFF2-40B4-BE49-F238E27FC236}">
+                <a16:creationId xmlns:a16="http://schemas.microsoft.com/office/drawing/2014/main" id="{9C2D67F8-4A34-4A96-959A-97647EF188D8}"/>
+              </a:ext>
+            </a:extLst>
+          </p:cNvPr>
+          <p:cNvPicPr>
+            <a:picLocks noChangeAspect="1"/>
+          </p:cNvPicPr>
+          <p:nvPr/>
+        </p:nvPicPr>
+        <p:blipFill>
+          <a:blip r:embed="rId3">
+            <a:extLst>
+              <a:ext uri="{28A0092B-C50C-407E-A947-70E740481C1C}">
+                <a14:useLocalDpi xmlns:a14="http://schemas.microsoft.com/office/drawing/2010/main" val="0"/>
+              </a:ext>
+              <a:ext uri="{837473B0-CC2E-450A-ABE3-18F120FF3D39}">
+                <a1611:picAttrSrcUrl xmlns:a1611="http://schemas.microsoft.com/office/drawing/2016/11/main" r:id="rId4"/>
+              </a:ext>
+            </a:extLst>
+          </a:blip>
+          <a:stretch>
+            <a:fillRect/>
+          </a:stretch>
+        </p:blipFill>
+        <p:spPr>
+          <a:xfrm>
+            <a:off x="10949305" y="137344"/>
+            <a:ext cx="1148189" cy="1050593"/>
+          </a:xfrm>
+          <a:prstGeom prst="rect">
+            <a:avLst/>
+          </a:prstGeom>
+        </p:spPr>
+      </p:pic>
+      <p:pic>
+        <p:nvPicPr>
+          <p:cNvPr id="4" name="Picture 3">
+            <a:extLst>
+              <a:ext uri="{FF2B5EF4-FFF2-40B4-BE49-F238E27FC236}">
+                <a16:creationId xmlns:a16="http://schemas.microsoft.com/office/drawing/2014/main" id="{61517D3B-E07C-4E5C-BACD-E9D15529A041}"/>
+              </a:ext>
+            </a:extLst>
+          </p:cNvPr>
+          <p:cNvPicPr>
+            <a:picLocks noChangeAspect="1"/>
+          </p:cNvPicPr>
+          <p:nvPr/>
+        </p:nvPicPr>
+        <p:blipFill>
+          <a:blip r:embed="rId5"/>
+          <a:stretch>
+            <a:fillRect/>
+          </a:stretch>
+        </p:blipFill>
+        <p:spPr>
+          <a:xfrm>
+            <a:off x="221838" y="3107184"/>
+            <a:ext cx="11875656" cy="1615736"/>
+          </a:xfrm>
+          <a:prstGeom prst="rect">
+            <a:avLst/>
+          </a:prstGeom>
+          <a:ln>
+            <a:solidFill>
+              <a:schemeClr val="tx1"/>
+            </a:solidFill>
+          </a:ln>
+        </p:spPr>
+      </p:pic>
+    </p:spTree>
+    <p:extLst>
+      <p:ext uri="{BB962C8B-B14F-4D97-AF65-F5344CB8AC3E}">
+        <p14:creationId xmlns:p14="http://schemas.microsoft.com/office/powerpoint/2010/main" val="2815050155"/>
+      </p:ext>
+    </p:extLst>
+  </p:cSld>
+  <p:clrMapOvr>
+    <a:masterClrMapping/>
+  </p:clrMapOvr>
+  <p:timing>
+    <p:tnLst>
+      <p:par>
+        <p:cTn id="1" dur="indefinite" restart="never" nodeType="tmRoot">
+          <p:childTnLst>
+            <p:seq concurrent="1" nextAc="seek">
+              <p:cTn id="2" dur="indefinite" nodeType="mainSeq">
+                <p:childTnLst>
+                  <p:par>
+                    <p:cTn id="3" fill="hold">
+                      <p:stCondLst>
+                        <p:cond delay="indefinite"/>
+                        <p:cond evt="onBegin" delay="0">
+                          <p:tn val="2"/>
+                        </p:cond>
+                      </p:stCondLst>
+                      <p:childTnLst>
+                        <p:par>
+                          <p:cTn id="4" fill="hold">
+                            <p:stCondLst>
+                              <p:cond delay="0"/>
+                            </p:stCondLst>
+                            <p:childTnLst>
+                              <p:par>
+                                <p:cTn id="5" presetID="1" presetClass="entr" presetSubtype="0" fill="hold" nodeType="withEffect">
+                                  <p:stCondLst>
+                                    <p:cond delay="0"/>
+                                  </p:stCondLst>
+                                  <p:childTnLst>
+                                    <p:set>
+                                      <p:cBhvr>
+                                        <p:cTn id="6" dur="1" fill="hold">
+                                          <p:stCondLst>
+                                            <p:cond delay="0"/>
+                                          </p:stCondLst>
+                                        </p:cTn>
+                                        <p:tgtEl>
+                                          <p:spTgt spid="3"/>
+                                        </p:tgtEl>
+                                        <p:attrNameLst>
+                                          <p:attrName>style.visibility</p:attrName>
+                                        </p:attrNameLst>
+                                      </p:cBhvr>
+                                      <p:to>
+                                        <p:strVal val="visible"/>
+                                      </p:to>
+                                    </p:set>
+                                  </p:childTnLst>
+                                </p:cTn>
+                              </p:par>
+                            </p:childTnLst>
+                          </p:cTn>
+                        </p:par>
+                      </p:childTnLst>
+                    </p:cTn>
+                  </p:par>
+                </p:childTnLst>
+              </p:cTn>
+              <p:prevCondLst>
+                <p:cond evt="onPrev" delay="0">
+                  <p:tgtEl>
+                    <p:sldTgt/>
+                  </p:tgtEl>
+                </p:cond>
+              </p:prevCondLst>
+              <p:nextCondLst>
+                <p:cond evt="onNext" delay="0">
+                  <p:tgtEl>
+                    <p:sldTgt/>
+                  </p:tgtEl>
+                </p:cond>
+              </p:nextCondLst>
+            </p:seq>
+          </p:childTnLst>
+        </p:cTn>
+      </p:par>
+    </p:tnLst>
+  </p:timing>
+</p:sld>
+</file>
+
+<file path=ppt/slides/slide17.xml><?xml version="1.0" encoding="utf-8"?>
+<p:sld xmlns:a="http://schemas.openxmlformats.org/drawingml/2006/main" xmlns:r="http://schemas.openxmlformats.org/officeDocument/2006/relationships" xmlns:p="http://schemas.openxmlformats.org/presentationml/2006/main">
+  <p:cSld>
+    <p:spTree>
+      <p:nvGrpSpPr>
+        <p:cNvPr id="1" name=""/>
+        <p:cNvGrpSpPr/>
+        <p:nvPr/>
+      </p:nvGrpSpPr>
+      <p:grpSpPr>
+        <a:xfrm>
+          <a:off x="0" y="0"/>
+          <a:ext cx="0" cy="0"/>
+          <a:chOff x="0" y="0"/>
+          <a:chExt cx="0" cy="0"/>
+        </a:xfrm>
+      </p:grpSpPr>
+      <p:sp>
+        <p:nvSpPr>
+          <p:cNvPr id="2" name="Title 1">
+            <a:extLst>
+              <a:ext uri="{FF2B5EF4-FFF2-40B4-BE49-F238E27FC236}">
+                <a16:creationId xmlns:a16="http://schemas.microsoft.com/office/drawing/2014/main" id="{E6F3015D-6EE8-4540-8606-15AAF5130827}"/>
+              </a:ext>
+            </a:extLst>
+          </p:cNvPr>
+          <p:cNvSpPr>
+            <a:spLocks noGrp="1"/>
+          </p:cNvSpPr>
+          <p:nvPr>
+            <p:ph type="title"/>
+          </p:nvPr>
+        </p:nvSpPr>
+        <p:spPr/>
+        <p:txBody>
+          <a:bodyPr/>
+          <a:lstStyle/>
+          <a:p>
+            <a:r>
+              <a:rPr lang="en-IE" dirty="0"/>
+              <a:t>Make a withdrawal</a:t>
+            </a:r>
+            <a:endParaRPr lang="en-US" dirty="0"/>
+          </a:p>
+        </p:txBody>
+      </p:sp>
+      <p:pic>
+        <p:nvPicPr>
+          <p:cNvPr id="3" name="Picture 2">
+            <a:extLst>
+              <a:ext uri="{FF2B5EF4-FFF2-40B4-BE49-F238E27FC236}">
+                <a16:creationId xmlns:a16="http://schemas.microsoft.com/office/drawing/2014/main" id="{9C2D67F8-4A34-4A96-959A-97647EF188D8}"/>
+              </a:ext>
+            </a:extLst>
+          </p:cNvPr>
+          <p:cNvPicPr>
+            <a:picLocks noChangeAspect="1"/>
+          </p:cNvPicPr>
+          <p:nvPr/>
+        </p:nvPicPr>
+        <p:blipFill>
+          <a:blip r:embed="rId3">
+            <a:extLst>
+              <a:ext uri="{28A0092B-C50C-407E-A947-70E740481C1C}">
+                <a14:useLocalDpi xmlns:a14="http://schemas.microsoft.com/office/drawing/2010/main" val="0"/>
+              </a:ext>
+              <a:ext uri="{837473B0-CC2E-450A-ABE3-18F120FF3D39}">
+                <a1611:picAttrSrcUrl xmlns:a1611="http://schemas.microsoft.com/office/drawing/2016/11/main" r:id="rId4"/>
+              </a:ext>
+            </a:extLst>
+          </a:blip>
+          <a:stretch>
+            <a:fillRect/>
+          </a:stretch>
+        </p:blipFill>
+        <p:spPr>
+          <a:xfrm>
+            <a:off x="10949305" y="137344"/>
+            <a:ext cx="1148189" cy="1050593"/>
+          </a:xfrm>
+          <a:prstGeom prst="rect">
+            <a:avLst/>
+          </a:prstGeom>
+        </p:spPr>
+      </p:pic>
+      <p:pic>
+        <p:nvPicPr>
+          <p:cNvPr id="4" name="Picture 3">
+            <a:extLst>
+              <a:ext uri="{FF2B5EF4-FFF2-40B4-BE49-F238E27FC236}">
+                <a16:creationId xmlns:a16="http://schemas.microsoft.com/office/drawing/2014/main" id="{6492EE0E-5774-45F5-B01A-054958668E4E}"/>
+              </a:ext>
+            </a:extLst>
+          </p:cNvPr>
+          <p:cNvPicPr>
+            <a:picLocks noChangeAspect="1"/>
+          </p:cNvPicPr>
+          <p:nvPr/>
+        </p:nvPicPr>
+        <p:blipFill>
+          <a:blip r:embed="rId5"/>
+          <a:stretch>
+            <a:fillRect/>
+          </a:stretch>
+        </p:blipFill>
+        <p:spPr>
+          <a:xfrm>
+            <a:off x="399661" y="1515968"/>
+            <a:ext cx="11091546" cy="4502277"/>
+          </a:xfrm>
+          <a:prstGeom prst="rect">
+            <a:avLst/>
+          </a:prstGeom>
+          <a:ln>
+            <a:solidFill>
+              <a:schemeClr val="tx1"/>
+            </a:solidFill>
+          </a:ln>
+        </p:spPr>
+      </p:pic>
+      <p:sp>
+        <p:nvSpPr>
+          <p:cNvPr id="5" name="Rectangle 4">
+            <a:extLst>
+              <a:ext uri="{FF2B5EF4-FFF2-40B4-BE49-F238E27FC236}">
+                <a16:creationId xmlns:a16="http://schemas.microsoft.com/office/drawing/2014/main" id="{7635E8EF-C31A-4C80-BF27-52BC66E7C15A}"/>
+              </a:ext>
+            </a:extLst>
+          </p:cNvPr>
+          <p:cNvSpPr/>
+          <p:nvPr/>
+        </p:nvSpPr>
+        <p:spPr>
+          <a:xfrm>
+            <a:off x="5379868" y="4509856"/>
+            <a:ext cx="3178206" cy="257453"/>
+          </a:xfrm>
+          <a:prstGeom prst="rect">
+            <a:avLst/>
+          </a:prstGeom>
+          <a:noFill/>
+          <a:ln w="28575">
+            <a:solidFill>
+              <a:schemeClr val="accent2">
+                <a:lumMod val="75000"/>
+              </a:schemeClr>
+            </a:solidFill>
+          </a:ln>
+        </p:spPr>
+        <p:style>
+          <a:lnRef idx="2">
+            <a:schemeClr val="accent1">
+              <a:shade val="50000"/>
+            </a:schemeClr>
+          </a:lnRef>
+          <a:fillRef idx="1">
+            <a:schemeClr val="accent1"/>
+          </a:fillRef>
+          <a:effectRef idx="0">
+            <a:schemeClr val="accent1"/>
+          </a:effectRef>
+          <a:fontRef idx="minor">
+            <a:schemeClr val="lt1"/>
+          </a:fontRef>
+        </p:style>
+        <p:txBody>
+          <a:bodyPr rtlCol="0" anchor="ctr"/>
+          <a:lstStyle/>
+          <a:p>
+            <a:pPr algn="ctr"/>
+            <a:endParaRPr lang="en-GB"/>
+          </a:p>
+        </p:txBody>
+      </p:sp>
+      <p:pic>
+        <p:nvPicPr>
+          <p:cNvPr id="6" name="Picture 5">
+            <a:extLst>
+              <a:ext uri="{FF2B5EF4-FFF2-40B4-BE49-F238E27FC236}">
+                <a16:creationId xmlns:a16="http://schemas.microsoft.com/office/drawing/2014/main" id="{C8861A6C-619D-4A6B-8B2F-E13C2FDD7355}"/>
+              </a:ext>
+            </a:extLst>
+          </p:cNvPr>
+          <p:cNvPicPr>
+            <a:picLocks noChangeAspect="1"/>
+          </p:cNvPicPr>
+          <p:nvPr/>
+        </p:nvPicPr>
+        <p:blipFill>
+          <a:blip r:embed="rId6"/>
+          <a:stretch>
+            <a:fillRect/>
+          </a:stretch>
+        </p:blipFill>
+        <p:spPr>
+          <a:xfrm>
+            <a:off x="8709022" y="3920834"/>
+            <a:ext cx="819276" cy="717748"/>
+          </a:xfrm>
+          <a:prstGeom prst="rect">
+            <a:avLst/>
+          </a:prstGeom>
+        </p:spPr>
+      </p:pic>
+    </p:spTree>
+    <p:extLst>
+      <p:ext uri="{BB962C8B-B14F-4D97-AF65-F5344CB8AC3E}">
+        <p14:creationId xmlns:p14="http://schemas.microsoft.com/office/powerpoint/2010/main" val="2571288014"/>
+      </p:ext>
+    </p:extLst>
+  </p:cSld>
+  <p:clrMapOvr>
+    <a:masterClrMapping/>
+  </p:clrMapOvr>
+  <p:timing>
+    <p:tnLst>
+      <p:par>
+        <p:cTn id="1" dur="indefinite" restart="never" nodeType="tmRoot">
+          <p:childTnLst>
+            <p:seq concurrent="1" nextAc="seek">
+              <p:cTn id="2" dur="indefinite" nodeType="mainSeq">
+                <p:childTnLst>
+                  <p:par>
+                    <p:cTn id="3" fill="hold">
+                      <p:stCondLst>
+                        <p:cond delay="indefinite"/>
+                        <p:cond evt="onBegin" delay="0">
+                          <p:tn val="2"/>
+                        </p:cond>
+                      </p:stCondLst>
+                      <p:childTnLst>
+                        <p:par>
+                          <p:cTn id="4" fill="hold">
+                            <p:stCondLst>
+                              <p:cond delay="0"/>
+                            </p:stCondLst>
+                            <p:childTnLst>
+                              <p:par>
+                                <p:cTn id="5" presetID="1" presetClass="entr" presetSubtype="0" fill="hold" nodeType="withEffect">
+                                  <p:stCondLst>
+                                    <p:cond delay="0"/>
+                                  </p:stCondLst>
+                                  <p:childTnLst>
+                                    <p:set>
+                                      <p:cBhvr>
+                                        <p:cTn id="6" dur="1" fill="hold">
+                                          <p:stCondLst>
+                                            <p:cond delay="0"/>
+                                          </p:stCondLst>
+                                        </p:cTn>
+                                        <p:tgtEl>
+                                          <p:spTgt spid="3"/>
+                                        </p:tgtEl>
+                                        <p:attrNameLst>
+                                          <p:attrName>style.visibility</p:attrName>
+                                        </p:attrNameLst>
+                                      </p:cBhvr>
+                                      <p:to>
+                                        <p:strVal val="visible"/>
+                                      </p:to>
+                                    </p:set>
+                                  </p:childTnLst>
+                                </p:cTn>
+                              </p:par>
+                            </p:childTnLst>
+                          </p:cTn>
+                        </p:par>
+                      </p:childTnLst>
+                    </p:cTn>
+                  </p:par>
+                  <p:par>
+                    <p:cTn id="7" fill="hold">
+                      <p:stCondLst>
+                        <p:cond delay="indefinite"/>
+                      </p:stCondLst>
+                      <p:childTnLst>
+                        <p:par>
+                          <p:cTn id="8" fill="hold">
+                            <p:stCondLst>
+                              <p:cond delay="0"/>
+                            </p:stCondLst>
+                            <p:childTnLst>
+                              <p:par>
+                                <p:cTn id="9" presetID="1" presetClass="entr" presetSubtype="0" fill="hold" grpId="0" nodeType="clickEffect">
+                                  <p:stCondLst>
+                                    <p:cond delay="0"/>
+                                  </p:stCondLst>
+                                  <p:childTnLst>
+                                    <p:set>
+                                      <p:cBhvr>
+                                        <p:cTn id="10" dur="1" fill="hold">
+                                          <p:stCondLst>
+                                            <p:cond delay="0"/>
+                                          </p:stCondLst>
+                                        </p:cTn>
+                                        <p:tgtEl>
+                                          <p:spTgt spid="5"/>
+                                        </p:tgtEl>
+                                        <p:attrNameLst>
+                                          <p:attrName>style.visibility</p:attrName>
+                                        </p:attrNameLst>
+                                      </p:cBhvr>
+                                      <p:to>
+                                        <p:strVal val="visible"/>
+                                      </p:to>
+                                    </p:set>
+                                  </p:childTnLst>
+                                </p:cTn>
+                              </p:par>
+                              <p:par>
+                                <p:cTn id="11" presetID="1" presetClass="entr" presetSubtype="0" fill="hold" nodeType="withEffect">
+                                  <p:stCondLst>
+                                    <p:cond delay="0"/>
+                                  </p:stCondLst>
+                                  <p:childTnLst>
+                                    <p:set>
+                                      <p:cBhvr>
+                                        <p:cTn id="12" dur="1" fill="hold">
+                                          <p:stCondLst>
+                                            <p:cond delay="0"/>
+                                          </p:stCondLst>
+                                        </p:cTn>
+                                        <p:tgtEl>
+                                          <p:spTgt spid="6"/>
+                                        </p:tgtEl>
+                                        <p:attrNameLst>
+                                          <p:attrName>style.visibility</p:attrName>
+                                        </p:attrNameLst>
+                                      </p:cBhvr>
+                                      <p:to>
+                                        <p:strVal val="visible"/>
+                                      </p:to>
+                                    </p:set>
+                                  </p:childTnLst>
+                                </p:cTn>
+                              </p:par>
+                            </p:childTnLst>
+                          </p:cTn>
+                        </p:par>
+                      </p:childTnLst>
+                    </p:cTn>
+                  </p:par>
+                </p:childTnLst>
+              </p:cTn>
+              <p:prevCondLst>
+                <p:cond evt="onPrev" delay="0">
+                  <p:tgtEl>
+                    <p:sldTgt/>
+                  </p:tgtEl>
+                </p:cond>
+              </p:prevCondLst>
+              <p:nextCondLst>
+                <p:cond evt="onNext" delay="0">
+                  <p:tgtEl>
+                    <p:sldTgt/>
+                  </p:tgtEl>
+                </p:cond>
+              </p:nextCondLst>
+            </p:seq>
+          </p:childTnLst>
+        </p:cTn>
+      </p:par>
+    </p:tnLst>
+    <p:bldLst>
+      <p:bldP spid="5" grpId="0" animBg="1"/>
+    </p:bldLst>
+  </p:timing>
+</p:sld>
+</file>
+
+<file path=ppt/slides/slide18.xml><?xml version="1.0" encoding="utf-8"?>
+<p:sld xmlns:a="http://schemas.openxmlformats.org/drawingml/2006/main" xmlns:r="http://schemas.openxmlformats.org/officeDocument/2006/relationships" xmlns:p="http://schemas.openxmlformats.org/presentationml/2006/main">
+  <p:cSld>
+    <p:spTree>
+      <p:nvGrpSpPr>
+        <p:cNvPr id="1" name=""/>
+        <p:cNvGrpSpPr/>
+        <p:nvPr/>
+      </p:nvGrpSpPr>
+      <p:grpSpPr>
+        <a:xfrm>
+          <a:off x="0" y="0"/>
+          <a:ext cx="0" cy="0"/>
+          <a:chOff x="0" y="0"/>
+          <a:chExt cx="0" cy="0"/>
+        </a:xfrm>
+      </p:grpSpPr>
+      <p:sp>
+        <p:nvSpPr>
+          <p:cNvPr id="2" name="Title 1">
+            <a:extLst>
+              <a:ext uri="{FF2B5EF4-FFF2-40B4-BE49-F238E27FC236}">
+                <a16:creationId xmlns:a16="http://schemas.microsoft.com/office/drawing/2014/main" id="{E6F3015D-6EE8-4540-8606-15AAF5130827}"/>
+              </a:ext>
+            </a:extLst>
+          </p:cNvPr>
+          <p:cNvSpPr>
+            <a:spLocks noGrp="1"/>
+          </p:cNvSpPr>
+          <p:nvPr>
+            <p:ph type="title"/>
+          </p:nvPr>
+        </p:nvSpPr>
+        <p:spPr/>
+        <p:txBody>
+          <a:bodyPr/>
+          <a:lstStyle/>
+          <a:p>
+            <a:r>
+              <a:rPr lang="en-IE" dirty="0"/>
+              <a:t>Make a withdrawal</a:t>
+            </a:r>
+            <a:endParaRPr lang="en-US" dirty="0"/>
+          </a:p>
+        </p:txBody>
+      </p:sp>
+      <p:pic>
+        <p:nvPicPr>
+          <p:cNvPr id="4" name="Picture 3">
+            <a:extLst>
+              <a:ext uri="{FF2B5EF4-FFF2-40B4-BE49-F238E27FC236}">
+                <a16:creationId xmlns:a16="http://schemas.microsoft.com/office/drawing/2014/main" id="{CB244C52-33DC-4B95-91CD-FC3CE83F3DD2}"/>
+              </a:ext>
+            </a:extLst>
+          </p:cNvPr>
+          <p:cNvPicPr>
+            <a:picLocks noChangeAspect="1"/>
+          </p:cNvPicPr>
+          <p:nvPr/>
+        </p:nvPicPr>
+        <p:blipFill>
+          <a:blip r:embed="rId3"/>
+          <a:stretch>
+            <a:fillRect/>
+          </a:stretch>
+        </p:blipFill>
+        <p:spPr>
+          <a:xfrm>
+            <a:off x="10610850" y="35352"/>
+            <a:ext cx="1581150" cy="1704975"/>
+          </a:xfrm>
+          <a:prstGeom prst="rect">
+            <a:avLst/>
+          </a:prstGeom>
+        </p:spPr>
+      </p:pic>
+      <p:pic>
+        <p:nvPicPr>
+          <p:cNvPr id="3" name="Picture 2">
+            <a:extLst>
+              <a:ext uri="{FF2B5EF4-FFF2-40B4-BE49-F238E27FC236}">
+                <a16:creationId xmlns:a16="http://schemas.microsoft.com/office/drawing/2014/main" id="{80F6A5BD-151B-4CA3-8C97-CBC8E590943F}"/>
+              </a:ext>
+            </a:extLst>
+          </p:cNvPr>
+          <p:cNvPicPr>
+            <a:picLocks noChangeAspect="1"/>
+          </p:cNvPicPr>
+          <p:nvPr/>
+        </p:nvPicPr>
+        <p:blipFill>
+          <a:blip r:embed="rId4"/>
+          <a:stretch>
+            <a:fillRect/>
+          </a:stretch>
+        </p:blipFill>
+        <p:spPr>
+          <a:xfrm>
+            <a:off x="319274" y="1715119"/>
+            <a:ext cx="11216515" cy="3847604"/>
+          </a:xfrm>
+          <a:prstGeom prst="rect">
+            <a:avLst/>
+          </a:prstGeom>
+          <a:ln>
+            <a:solidFill>
+              <a:schemeClr val="tx1"/>
+            </a:solidFill>
+          </a:ln>
         </p:spPr>
       </p:pic>
     </p:spTree>
@@ -5509,6 +7756,204 @@
           </a:prstGeom>
         </p:spPr>
       </p:pic>
+      <p:pic>
+        <p:nvPicPr>
+          <p:cNvPr id="3" name="Picture 2">
+            <a:extLst>
+              <a:ext uri="{FF2B5EF4-FFF2-40B4-BE49-F238E27FC236}">
+                <a16:creationId xmlns:a16="http://schemas.microsoft.com/office/drawing/2014/main" id="{540BE999-9F03-47EC-9123-2F23BCB13B18}"/>
+              </a:ext>
+            </a:extLst>
+          </p:cNvPr>
+          <p:cNvPicPr>
+            <a:picLocks noChangeAspect="1"/>
+          </p:cNvPicPr>
+          <p:nvPr/>
+        </p:nvPicPr>
+        <p:blipFill>
+          <a:blip r:embed="rId4"/>
+          <a:stretch>
+            <a:fillRect/>
+          </a:stretch>
+        </p:blipFill>
+        <p:spPr>
+          <a:xfrm>
+            <a:off x="955799" y="1987062"/>
+            <a:ext cx="626511" cy="828196"/>
+          </a:xfrm>
+          <a:prstGeom prst="rect">
+            <a:avLst/>
+          </a:prstGeom>
+        </p:spPr>
+      </p:pic>
+      <p:sp>
+        <p:nvSpPr>
+          <p:cNvPr id="5" name="TextBox 4">
+            <a:extLst>
+              <a:ext uri="{FF2B5EF4-FFF2-40B4-BE49-F238E27FC236}">
+                <a16:creationId xmlns:a16="http://schemas.microsoft.com/office/drawing/2014/main" id="{877C0F03-748E-40BC-93BC-A386E94AA041}"/>
+              </a:ext>
+            </a:extLst>
+          </p:cNvPr>
+          <p:cNvSpPr txBox="1"/>
+          <p:nvPr/>
+        </p:nvSpPr>
+        <p:spPr>
+          <a:xfrm>
+            <a:off x="1685676" y="2216494"/>
+            <a:ext cx="3740896" cy="369332"/>
+          </a:xfrm>
+          <a:prstGeom prst="rect">
+            <a:avLst/>
+          </a:prstGeom>
+          <a:noFill/>
+        </p:spPr>
+        <p:txBody>
+          <a:bodyPr wrap="none" rtlCol="0">
+            <a:spAutoFit/>
+          </a:bodyPr>
+          <a:lstStyle/>
+          <a:p>
+            <a:r>
+              <a:rPr lang="en-IE" dirty="0"/>
+              <a:t>Each account number must be unique</a:t>
+            </a:r>
+            <a:endParaRPr lang="en-GB" dirty="0"/>
+          </a:p>
+        </p:txBody>
+      </p:sp>
+      <p:pic>
+        <p:nvPicPr>
+          <p:cNvPr id="6" name="Picture 5">
+            <a:extLst>
+              <a:ext uri="{FF2B5EF4-FFF2-40B4-BE49-F238E27FC236}">
+                <a16:creationId xmlns:a16="http://schemas.microsoft.com/office/drawing/2014/main" id="{E018DBB9-173C-4791-B9A4-E6BAB57847EB}"/>
+              </a:ext>
+            </a:extLst>
+          </p:cNvPr>
+          <p:cNvPicPr>
+            <a:picLocks noChangeAspect="1"/>
+          </p:cNvPicPr>
+          <p:nvPr/>
+        </p:nvPicPr>
+        <p:blipFill>
+          <a:blip r:embed="rId5"/>
+          <a:stretch>
+            <a:fillRect/>
+          </a:stretch>
+        </p:blipFill>
+        <p:spPr>
+          <a:xfrm>
+            <a:off x="883237" y="3429000"/>
+            <a:ext cx="771633" cy="762106"/>
+          </a:xfrm>
+          <a:prstGeom prst="rect">
+            <a:avLst/>
+          </a:prstGeom>
+        </p:spPr>
+      </p:pic>
+      <p:sp>
+        <p:nvSpPr>
+          <p:cNvPr id="7" name="TextBox 6">
+            <a:extLst>
+              <a:ext uri="{FF2B5EF4-FFF2-40B4-BE49-F238E27FC236}">
+                <a16:creationId xmlns:a16="http://schemas.microsoft.com/office/drawing/2014/main" id="{573A4031-9B3E-4479-A792-1FF25F2A2F69}"/>
+              </a:ext>
+            </a:extLst>
+          </p:cNvPr>
+          <p:cNvSpPr txBox="1"/>
+          <p:nvPr/>
+        </p:nvSpPr>
+        <p:spPr>
+          <a:xfrm>
+            <a:off x="1685676" y="3625387"/>
+            <a:ext cx="3225627" cy="369332"/>
+          </a:xfrm>
+          <a:prstGeom prst="rect">
+            <a:avLst/>
+          </a:prstGeom>
+          <a:noFill/>
+        </p:spPr>
+        <p:txBody>
+          <a:bodyPr wrap="none" rtlCol="0">
+            <a:spAutoFit/>
+          </a:bodyPr>
+          <a:lstStyle/>
+          <a:p>
+            <a:r>
+              <a:rPr lang="en-IE" dirty="0"/>
+              <a:t>Initial deposit amount (optional)</a:t>
+            </a:r>
+            <a:endParaRPr lang="en-GB" dirty="0"/>
+          </a:p>
+        </p:txBody>
+      </p:sp>
+      <p:pic>
+        <p:nvPicPr>
+          <p:cNvPr id="8" name="Picture 7">
+            <a:extLst>
+              <a:ext uri="{FF2B5EF4-FFF2-40B4-BE49-F238E27FC236}">
+                <a16:creationId xmlns:a16="http://schemas.microsoft.com/office/drawing/2014/main" id="{C15B4EFD-EDA1-40FC-889C-245E52C04376}"/>
+              </a:ext>
+            </a:extLst>
+          </p:cNvPr>
+          <p:cNvPicPr>
+            <a:picLocks noChangeAspect="1"/>
+          </p:cNvPicPr>
+          <p:nvPr/>
+        </p:nvPicPr>
+        <p:blipFill>
+          <a:blip r:embed="rId5"/>
+          <a:stretch>
+            <a:fillRect/>
+          </a:stretch>
+        </p:blipFill>
+        <p:spPr>
+          <a:xfrm>
+            <a:off x="883237" y="4305357"/>
+            <a:ext cx="771633" cy="762106"/>
+          </a:xfrm>
+          <a:prstGeom prst="rect">
+            <a:avLst/>
+          </a:prstGeom>
+        </p:spPr>
+      </p:pic>
+      <p:sp>
+        <p:nvSpPr>
+          <p:cNvPr id="9" name="TextBox 8">
+            <a:extLst>
+              <a:ext uri="{FF2B5EF4-FFF2-40B4-BE49-F238E27FC236}">
+                <a16:creationId xmlns:a16="http://schemas.microsoft.com/office/drawing/2014/main" id="{038ED28D-B52A-43F2-8BF7-63F51A54E050}"/>
+              </a:ext>
+            </a:extLst>
+          </p:cNvPr>
+          <p:cNvSpPr txBox="1"/>
+          <p:nvPr/>
+        </p:nvSpPr>
+        <p:spPr>
+          <a:xfrm>
+            <a:off x="1685676" y="4501744"/>
+            <a:ext cx="2789225" cy="369332"/>
+          </a:xfrm>
+          <a:prstGeom prst="rect">
+            <a:avLst/>
+          </a:prstGeom>
+          <a:noFill/>
+        </p:spPr>
+        <p:txBody>
+          <a:bodyPr wrap="none" rtlCol="0">
+            <a:spAutoFit/>
+          </a:bodyPr>
+          <a:lstStyle/>
+          <a:p>
+            <a:r>
+              <a:rPr lang="en-IE" dirty="0"/>
+              <a:t>Beneficiary name (optional)</a:t>
+            </a:r>
+            <a:endParaRPr lang="en-GB" dirty="0"/>
+          </a:p>
+        </p:txBody>
+      </p:sp>
     </p:spTree>
     <p:extLst>
       <p:ext uri="{BB962C8B-B14F-4D97-AF65-F5344CB8AC3E}">
@@ -5607,6 +8052,98 @@
           </a:prstGeom>
         </p:spPr>
       </p:pic>
+      <p:pic>
+        <p:nvPicPr>
+          <p:cNvPr id="4" name="Picture 3">
+            <a:extLst>
+              <a:ext uri="{FF2B5EF4-FFF2-40B4-BE49-F238E27FC236}">
+                <a16:creationId xmlns:a16="http://schemas.microsoft.com/office/drawing/2014/main" id="{3A849700-E6C5-4C09-9FF3-2356D8A884E1}"/>
+              </a:ext>
+            </a:extLst>
+          </p:cNvPr>
+          <p:cNvPicPr>
+            <a:picLocks noChangeAspect="1"/>
+          </p:cNvPicPr>
+          <p:nvPr/>
+        </p:nvPicPr>
+        <p:blipFill>
+          <a:blip r:embed="rId5"/>
+          <a:stretch>
+            <a:fillRect/>
+          </a:stretch>
+        </p:blipFill>
+        <p:spPr>
+          <a:xfrm>
+            <a:off x="589293" y="2811076"/>
+            <a:ext cx="11013413" cy="2476249"/>
+          </a:xfrm>
+          <a:prstGeom prst="rect">
+            <a:avLst/>
+          </a:prstGeom>
+          <a:ln>
+            <a:solidFill>
+              <a:schemeClr val="tx1"/>
+            </a:solidFill>
+          </a:ln>
+        </p:spPr>
+      </p:pic>
+      <p:sp>
+        <p:nvSpPr>
+          <p:cNvPr id="5" name="Rectangle 4">
+            <a:extLst>
+              <a:ext uri="{FF2B5EF4-FFF2-40B4-BE49-F238E27FC236}">
+                <a16:creationId xmlns:a16="http://schemas.microsoft.com/office/drawing/2014/main" id="{9B2812DC-FDC9-4407-8EDE-46E03F7820E3}"/>
+              </a:ext>
+            </a:extLst>
+          </p:cNvPr>
+          <p:cNvSpPr/>
+          <p:nvPr/>
+        </p:nvSpPr>
+        <p:spPr>
+          <a:xfrm>
+            <a:off x="1441836" y="1814841"/>
+            <a:ext cx="9149301" cy="369332"/>
+          </a:xfrm>
+          <a:prstGeom prst="rect">
+            <a:avLst/>
+          </a:prstGeom>
+        </p:spPr>
+        <p:txBody>
+          <a:bodyPr wrap="square">
+            <a:spAutoFit/>
+          </a:bodyPr>
+          <a:lstStyle/>
+          <a:p>
+            <a:r>
+              <a:rPr lang="en-GB" b="1" dirty="0">
+                <a:solidFill>
+                  <a:srgbClr val="505050"/>
+                </a:solidFill>
+                <a:latin typeface="OpenSans"/>
+              </a:rPr>
+              <a:t>https://retailbankazurefunctionapp.azurewebsites.net/api/OpenAccount/</a:t>
+            </a:r>
+            <a:r>
+              <a:rPr lang="en-GB" b="1" dirty="0">
+                <a:solidFill>
+                  <a:schemeClr val="accent5">
+                    <a:lumMod val="75000"/>
+                  </a:schemeClr>
+                </a:solidFill>
+                <a:latin typeface="OpenSans"/>
+              </a:rPr>
+              <a:t>A001B123456C</a:t>
+            </a:r>
+            <a:endParaRPr lang="en-GB" b="1" dirty="0">
+              <a:solidFill>
+                <a:schemeClr val="accent5">
+                  <a:lumMod val="75000"/>
+                </a:schemeClr>
+              </a:solidFill>
+            </a:endParaRPr>
+          </a:p>
+        </p:txBody>
+      </p:sp>
     </p:spTree>
     <p:extLst>
       <p:ext uri="{BB962C8B-B14F-4D97-AF65-F5344CB8AC3E}">
@@ -5746,6 +8283,642 @@
       </p:sp>
       <p:pic>
         <p:nvPicPr>
+          <p:cNvPr id="3" name="Picture 2">
+            <a:extLst>
+              <a:ext uri="{FF2B5EF4-FFF2-40B4-BE49-F238E27FC236}">
+                <a16:creationId xmlns:a16="http://schemas.microsoft.com/office/drawing/2014/main" id="{9C2D67F8-4A34-4A96-959A-97647EF188D8}"/>
+              </a:ext>
+            </a:extLst>
+          </p:cNvPr>
+          <p:cNvPicPr>
+            <a:picLocks noChangeAspect="1"/>
+          </p:cNvPicPr>
+          <p:nvPr/>
+        </p:nvPicPr>
+        <p:blipFill>
+          <a:blip r:embed="rId3">
+            <a:extLst>
+              <a:ext uri="{28A0092B-C50C-407E-A947-70E740481C1C}">
+                <a14:useLocalDpi xmlns:a14="http://schemas.microsoft.com/office/drawing/2010/main" val="0"/>
+              </a:ext>
+              <a:ext uri="{837473B0-CC2E-450A-ABE3-18F120FF3D39}">
+                <a1611:picAttrSrcUrl xmlns:a1611="http://schemas.microsoft.com/office/drawing/2016/11/main" r:id="rId4"/>
+              </a:ext>
+            </a:extLst>
+          </a:blip>
+          <a:stretch>
+            <a:fillRect/>
+          </a:stretch>
+        </p:blipFill>
+        <p:spPr>
+          <a:xfrm>
+            <a:off x="10949305" y="137344"/>
+            <a:ext cx="1148189" cy="1050593"/>
+          </a:xfrm>
+          <a:prstGeom prst="rect">
+            <a:avLst/>
+          </a:prstGeom>
+        </p:spPr>
+      </p:pic>
+      <p:pic>
+        <p:nvPicPr>
+          <p:cNvPr id="5" name="Picture 4">
+            <a:extLst>
+              <a:ext uri="{FF2B5EF4-FFF2-40B4-BE49-F238E27FC236}">
+                <a16:creationId xmlns:a16="http://schemas.microsoft.com/office/drawing/2014/main" id="{8806F530-BBDB-41F1-966A-FA87B67AB11D}"/>
+              </a:ext>
+            </a:extLst>
+          </p:cNvPr>
+          <p:cNvPicPr>
+            <a:picLocks noChangeAspect="1"/>
+          </p:cNvPicPr>
+          <p:nvPr/>
+        </p:nvPicPr>
+        <p:blipFill>
+          <a:blip r:embed="rId5"/>
+          <a:stretch>
+            <a:fillRect/>
+          </a:stretch>
+        </p:blipFill>
+        <p:spPr>
+          <a:xfrm>
+            <a:off x="332550" y="1488630"/>
+            <a:ext cx="11526899" cy="4604259"/>
+          </a:xfrm>
+          <a:prstGeom prst="rect">
+            <a:avLst/>
+          </a:prstGeom>
+          <a:ln>
+            <a:solidFill>
+              <a:schemeClr val="tx1"/>
+            </a:solidFill>
+          </a:ln>
+        </p:spPr>
+      </p:pic>
+      <p:sp>
+        <p:nvSpPr>
+          <p:cNvPr id="9" name="Rectangle 8">
+            <a:extLst>
+              <a:ext uri="{FF2B5EF4-FFF2-40B4-BE49-F238E27FC236}">
+                <a16:creationId xmlns:a16="http://schemas.microsoft.com/office/drawing/2014/main" id="{B0F8A680-6D58-4532-8396-F83BD24D3827}"/>
+              </a:ext>
+            </a:extLst>
+          </p:cNvPr>
+          <p:cNvSpPr/>
+          <p:nvPr/>
+        </p:nvSpPr>
+        <p:spPr>
+          <a:xfrm>
+            <a:off x="1233996" y="4802819"/>
+            <a:ext cx="4536489" cy="195309"/>
+          </a:xfrm>
+          <a:prstGeom prst="rect">
+            <a:avLst/>
+          </a:prstGeom>
+          <a:noFill/>
+          <a:ln w="38100">
+            <a:solidFill>
+              <a:srgbClr val="FF0000"/>
+            </a:solidFill>
+          </a:ln>
+        </p:spPr>
+        <p:style>
+          <a:lnRef idx="2">
+            <a:schemeClr val="accent1">
+              <a:shade val="50000"/>
+            </a:schemeClr>
+          </a:lnRef>
+          <a:fillRef idx="1">
+            <a:schemeClr val="accent1"/>
+          </a:fillRef>
+          <a:effectRef idx="0">
+            <a:schemeClr val="accent1"/>
+          </a:effectRef>
+          <a:fontRef idx="minor">
+            <a:schemeClr val="lt1"/>
+          </a:fontRef>
+        </p:style>
+        <p:txBody>
+          <a:bodyPr rtlCol="0" anchor="ctr"/>
+          <a:lstStyle/>
+          <a:p>
+            <a:pPr algn="ctr"/>
+            <a:endParaRPr lang="en-GB"/>
+          </a:p>
+        </p:txBody>
+      </p:sp>
+      <p:pic>
+        <p:nvPicPr>
+          <p:cNvPr id="10" name="Picture 9">
+            <a:extLst>
+              <a:ext uri="{FF2B5EF4-FFF2-40B4-BE49-F238E27FC236}">
+                <a16:creationId xmlns:a16="http://schemas.microsoft.com/office/drawing/2014/main" id="{0ADEA6AF-00C8-431F-B9E8-64BCF25DBEB9}"/>
+              </a:ext>
+            </a:extLst>
+          </p:cNvPr>
+          <p:cNvPicPr>
+            <a:picLocks noChangeAspect="1"/>
+          </p:cNvPicPr>
+          <p:nvPr/>
+        </p:nvPicPr>
+        <p:blipFill>
+          <a:blip r:embed="rId6"/>
+          <a:stretch>
+            <a:fillRect/>
+          </a:stretch>
+        </p:blipFill>
+        <p:spPr>
+          <a:xfrm>
+            <a:off x="5868842" y="4588720"/>
+            <a:ext cx="329856" cy="436042"/>
+          </a:xfrm>
+          <a:prstGeom prst="rect">
+            <a:avLst/>
+          </a:prstGeom>
+        </p:spPr>
+      </p:pic>
+      <p:pic>
+        <p:nvPicPr>
+          <p:cNvPr id="11" name="Picture 10">
+            <a:extLst>
+              <a:ext uri="{FF2B5EF4-FFF2-40B4-BE49-F238E27FC236}">
+                <a16:creationId xmlns:a16="http://schemas.microsoft.com/office/drawing/2014/main" id="{AF0B2A95-ACD1-46C7-BD2A-875183CF19B3}"/>
+              </a:ext>
+            </a:extLst>
+          </p:cNvPr>
+          <p:cNvPicPr>
+            <a:picLocks noChangeAspect="1"/>
+          </p:cNvPicPr>
+          <p:nvPr/>
+        </p:nvPicPr>
+        <p:blipFill>
+          <a:blip r:embed="rId6"/>
+          <a:stretch>
+            <a:fillRect/>
+          </a:stretch>
+        </p:blipFill>
+        <p:spPr>
+          <a:xfrm>
+            <a:off x="8844341" y="1690688"/>
+            <a:ext cx="329856" cy="436042"/>
+          </a:xfrm>
+          <a:prstGeom prst="rect">
+            <a:avLst/>
+          </a:prstGeom>
+        </p:spPr>
+      </p:pic>
+    </p:spTree>
+    <p:extLst>
+      <p:ext uri="{BB962C8B-B14F-4D97-AF65-F5344CB8AC3E}">
+        <p14:creationId xmlns:p14="http://schemas.microsoft.com/office/powerpoint/2010/main" val="1800961499"/>
+      </p:ext>
+    </p:extLst>
+  </p:cSld>
+  <p:clrMapOvr>
+    <a:masterClrMapping/>
+  </p:clrMapOvr>
+  <p:timing>
+    <p:tnLst>
+      <p:par>
+        <p:cTn id="1" dur="indefinite" restart="never" nodeType="tmRoot">
+          <p:childTnLst>
+            <p:seq concurrent="1" nextAc="seek">
+              <p:cTn id="2" dur="indefinite" nodeType="mainSeq">
+                <p:childTnLst>
+                  <p:par>
+                    <p:cTn id="3" fill="hold">
+                      <p:stCondLst>
+                        <p:cond delay="indefinite"/>
+                        <p:cond evt="onBegin" delay="0">
+                          <p:tn val="2"/>
+                        </p:cond>
+                      </p:stCondLst>
+                      <p:childTnLst>
+                        <p:par>
+                          <p:cTn id="4" fill="hold">
+                            <p:stCondLst>
+                              <p:cond delay="0"/>
+                            </p:stCondLst>
+                            <p:childTnLst>
+                              <p:par>
+                                <p:cTn id="5" presetID="1" presetClass="entr" presetSubtype="0" fill="hold" nodeType="withEffect">
+                                  <p:stCondLst>
+                                    <p:cond delay="0"/>
+                                  </p:stCondLst>
+                                  <p:childTnLst>
+                                    <p:set>
+                                      <p:cBhvr>
+                                        <p:cTn id="6" dur="1" fill="hold">
+                                          <p:stCondLst>
+                                            <p:cond delay="0"/>
+                                          </p:stCondLst>
+                                        </p:cTn>
+                                        <p:tgtEl>
+                                          <p:spTgt spid="3"/>
+                                        </p:tgtEl>
+                                        <p:attrNameLst>
+                                          <p:attrName>style.visibility</p:attrName>
+                                        </p:attrNameLst>
+                                      </p:cBhvr>
+                                      <p:to>
+                                        <p:strVal val="visible"/>
+                                      </p:to>
+                                    </p:set>
+                                  </p:childTnLst>
+                                </p:cTn>
+                              </p:par>
+                            </p:childTnLst>
+                          </p:cTn>
+                        </p:par>
+                      </p:childTnLst>
+                    </p:cTn>
+                  </p:par>
+                  <p:par>
+                    <p:cTn id="7" fill="hold">
+                      <p:stCondLst>
+                        <p:cond delay="indefinite"/>
+                      </p:stCondLst>
+                      <p:childTnLst>
+                        <p:par>
+                          <p:cTn id="8" fill="hold">
+                            <p:stCondLst>
+                              <p:cond delay="0"/>
+                            </p:stCondLst>
+                            <p:childTnLst>
+                              <p:par>
+                                <p:cTn id="9" presetID="1" presetClass="entr" presetSubtype="0" fill="hold" grpId="0" nodeType="clickEffect">
+                                  <p:stCondLst>
+                                    <p:cond delay="0"/>
+                                  </p:stCondLst>
+                                  <p:childTnLst>
+                                    <p:set>
+                                      <p:cBhvr>
+                                        <p:cTn id="10" dur="1" fill="hold">
+                                          <p:stCondLst>
+                                            <p:cond delay="0"/>
+                                          </p:stCondLst>
+                                        </p:cTn>
+                                        <p:tgtEl>
+                                          <p:spTgt spid="9"/>
+                                        </p:tgtEl>
+                                        <p:attrNameLst>
+                                          <p:attrName>style.visibility</p:attrName>
+                                        </p:attrNameLst>
+                                      </p:cBhvr>
+                                      <p:to>
+                                        <p:strVal val="visible"/>
+                                      </p:to>
+                                    </p:set>
+                                  </p:childTnLst>
+                                </p:cTn>
+                              </p:par>
+                              <p:par>
+                                <p:cTn id="11" presetID="1" presetClass="entr" presetSubtype="0" fill="hold" nodeType="withEffect">
+                                  <p:stCondLst>
+                                    <p:cond delay="0"/>
+                                  </p:stCondLst>
+                                  <p:childTnLst>
+                                    <p:set>
+                                      <p:cBhvr>
+                                        <p:cTn id="12" dur="1" fill="hold">
+                                          <p:stCondLst>
+                                            <p:cond delay="0"/>
+                                          </p:stCondLst>
+                                        </p:cTn>
+                                        <p:tgtEl>
+                                          <p:spTgt spid="11"/>
+                                        </p:tgtEl>
+                                        <p:attrNameLst>
+                                          <p:attrName>style.visibility</p:attrName>
+                                        </p:attrNameLst>
+                                      </p:cBhvr>
+                                      <p:to>
+                                        <p:strVal val="visible"/>
+                                      </p:to>
+                                    </p:set>
+                                  </p:childTnLst>
+                                </p:cTn>
+                              </p:par>
+                              <p:par>
+                                <p:cTn id="13" presetID="1" presetClass="entr" presetSubtype="0" fill="hold" nodeType="withEffect">
+                                  <p:stCondLst>
+                                    <p:cond delay="0"/>
+                                  </p:stCondLst>
+                                  <p:childTnLst>
+                                    <p:set>
+                                      <p:cBhvr>
+                                        <p:cTn id="14" dur="1" fill="hold">
+                                          <p:stCondLst>
+                                            <p:cond delay="0"/>
+                                          </p:stCondLst>
+                                        </p:cTn>
+                                        <p:tgtEl>
+                                          <p:spTgt spid="10"/>
+                                        </p:tgtEl>
+                                        <p:attrNameLst>
+                                          <p:attrName>style.visibility</p:attrName>
+                                        </p:attrNameLst>
+                                      </p:cBhvr>
+                                      <p:to>
+                                        <p:strVal val="visible"/>
+                                      </p:to>
+                                    </p:set>
+                                  </p:childTnLst>
+                                </p:cTn>
+                              </p:par>
+                            </p:childTnLst>
+                          </p:cTn>
+                        </p:par>
+                      </p:childTnLst>
+                    </p:cTn>
+                  </p:par>
+                </p:childTnLst>
+              </p:cTn>
+              <p:prevCondLst>
+                <p:cond evt="onPrev" delay="0">
+                  <p:tgtEl>
+                    <p:sldTgt/>
+                  </p:tgtEl>
+                </p:cond>
+              </p:prevCondLst>
+              <p:nextCondLst>
+                <p:cond evt="onNext" delay="0">
+                  <p:tgtEl>
+                    <p:sldTgt/>
+                  </p:tgtEl>
+                </p:cond>
+              </p:nextCondLst>
+            </p:seq>
+          </p:childTnLst>
+        </p:cTn>
+      </p:par>
+    </p:tnLst>
+    <p:bldLst>
+      <p:bldP spid="9" grpId="0" animBg="1"/>
+    </p:bldLst>
+  </p:timing>
+</p:sld>
+</file>
+
+<file path=ppt/slides/slide5.xml><?xml version="1.0" encoding="utf-8"?>
+<p:sld xmlns:a="http://schemas.openxmlformats.org/drawingml/2006/main" xmlns:r="http://schemas.openxmlformats.org/officeDocument/2006/relationships" xmlns:p="http://schemas.openxmlformats.org/presentationml/2006/main">
+  <p:cSld>
+    <p:spTree>
+      <p:nvGrpSpPr>
+        <p:cNvPr id="1" name=""/>
+        <p:cNvGrpSpPr/>
+        <p:nvPr/>
+      </p:nvGrpSpPr>
+      <p:grpSpPr>
+        <a:xfrm>
+          <a:off x="0" y="0"/>
+          <a:ext cx="0" cy="0"/>
+          <a:chOff x="0" y="0"/>
+          <a:chExt cx="0" cy="0"/>
+        </a:xfrm>
+      </p:grpSpPr>
+      <p:sp>
+        <p:nvSpPr>
+          <p:cNvPr id="2" name="Title 1">
+            <a:extLst>
+              <a:ext uri="{FF2B5EF4-FFF2-40B4-BE49-F238E27FC236}">
+                <a16:creationId xmlns:a16="http://schemas.microsoft.com/office/drawing/2014/main" id="{E6F3015D-6EE8-4540-8606-15AAF5130827}"/>
+              </a:ext>
+            </a:extLst>
+          </p:cNvPr>
+          <p:cNvSpPr>
+            <a:spLocks noGrp="1"/>
+          </p:cNvSpPr>
+          <p:nvPr>
+            <p:ph type="title"/>
+          </p:nvPr>
+        </p:nvSpPr>
+        <p:spPr/>
+        <p:txBody>
+          <a:bodyPr/>
+          <a:lstStyle/>
+          <a:p>
+            <a:r>
+              <a:rPr lang="en-IE" dirty="0"/>
+              <a:t>Open a new account</a:t>
+            </a:r>
+            <a:endParaRPr lang="en-US" dirty="0"/>
+          </a:p>
+        </p:txBody>
+      </p:sp>
+      <p:pic>
+        <p:nvPicPr>
+          <p:cNvPr id="3" name="Picture 2">
+            <a:extLst>
+              <a:ext uri="{FF2B5EF4-FFF2-40B4-BE49-F238E27FC236}">
+                <a16:creationId xmlns:a16="http://schemas.microsoft.com/office/drawing/2014/main" id="{9C2D67F8-4A34-4A96-959A-97647EF188D8}"/>
+              </a:ext>
+            </a:extLst>
+          </p:cNvPr>
+          <p:cNvPicPr>
+            <a:picLocks noChangeAspect="1"/>
+          </p:cNvPicPr>
+          <p:nvPr/>
+        </p:nvPicPr>
+        <p:blipFill>
+          <a:blip r:embed="rId3">
+            <a:extLst>
+              <a:ext uri="{28A0092B-C50C-407E-A947-70E740481C1C}">
+                <a14:useLocalDpi xmlns:a14="http://schemas.microsoft.com/office/drawing/2010/main" val="0"/>
+              </a:ext>
+              <a:ext uri="{837473B0-CC2E-450A-ABE3-18F120FF3D39}">
+                <a1611:picAttrSrcUrl xmlns:a1611="http://schemas.microsoft.com/office/drawing/2016/11/main" r:id="rId4"/>
+              </a:ext>
+            </a:extLst>
+          </a:blip>
+          <a:stretch>
+            <a:fillRect/>
+          </a:stretch>
+        </p:blipFill>
+        <p:spPr>
+          <a:xfrm>
+            <a:off x="10949305" y="137344"/>
+            <a:ext cx="1148189" cy="1050593"/>
+          </a:xfrm>
+          <a:prstGeom prst="rect">
+            <a:avLst/>
+          </a:prstGeom>
+        </p:spPr>
+      </p:pic>
+      <p:pic>
+        <p:nvPicPr>
+          <p:cNvPr id="4" name="Picture 3">
+            <a:extLst>
+              <a:ext uri="{FF2B5EF4-FFF2-40B4-BE49-F238E27FC236}">
+                <a16:creationId xmlns:a16="http://schemas.microsoft.com/office/drawing/2014/main" id="{74D423CE-3475-4F8E-ADE0-F5C5CE8E88CA}"/>
+              </a:ext>
+            </a:extLst>
+          </p:cNvPr>
+          <p:cNvPicPr>
+            <a:picLocks noChangeAspect="1"/>
+          </p:cNvPicPr>
+          <p:nvPr/>
+        </p:nvPicPr>
+        <p:blipFill>
+          <a:blip r:embed="rId5"/>
+          <a:stretch>
+            <a:fillRect/>
+          </a:stretch>
+        </p:blipFill>
+        <p:spPr>
+          <a:xfrm>
+            <a:off x="985602" y="1690688"/>
+            <a:ext cx="9099431" cy="4523791"/>
+          </a:xfrm>
+          <a:prstGeom prst="rect">
+            <a:avLst/>
+          </a:prstGeom>
+          <a:ln w="12700">
+            <a:solidFill>
+              <a:schemeClr val="tx1"/>
+            </a:solidFill>
+          </a:ln>
+        </p:spPr>
+      </p:pic>
+    </p:spTree>
+    <p:extLst>
+      <p:ext uri="{BB962C8B-B14F-4D97-AF65-F5344CB8AC3E}">
+        <p14:creationId xmlns:p14="http://schemas.microsoft.com/office/powerpoint/2010/main" val="3060333063"/>
+      </p:ext>
+    </p:extLst>
+  </p:cSld>
+  <p:clrMapOvr>
+    <a:masterClrMapping/>
+  </p:clrMapOvr>
+  <p:timing>
+    <p:tnLst>
+      <p:par>
+        <p:cTn id="1" dur="indefinite" restart="never" nodeType="tmRoot">
+          <p:childTnLst>
+            <p:seq concurrent="1" nextAc="seek">
+              <p:cTn id="2" dur="indefinite" nodeType="mainSeq">
+                <p:childTnLst>
+                  <p:par>
+                    <p:cTn id="3" fill="hold">
+                      <p:stCondLst>
+                        <p:cond delay="indefinite"/>
+                        <p:cond evt="onBegin" delay="0">
+                          <p:tn val="2"/>
+                        </p:cond>
+                      </p:stCondLst>
+                      <p:childTnLst>
+                        <p:par>
+                          <p:cTn id="4" fill="hold">
+                            <p:stCondLst>
+                              <p:cond delay="0"/>
+                            </p:stCondLst>
+                            <p:childTnLst>
+                              <p:par>
+                                <p:cTn id="5" presetID="1" presetClass="entr" presetSubtype="0" fill="hold" nodeType="withEffect">
+                                  <p:stCondLst>
+                                    <p:cond delay="0"/>
+                                  </p:stCondLst>
+                                  <p:childTnLst>
+                                    <p:set>
+                                      <p:cBhvr>
+                                        <p:cTn id="6" dur="1" fill="hold">
+                                          <p:stCondLst>
+                                            <p:cond delay="0"/>
+                                          </p:stCondLst>
+                                        </p:cTn>
+                                        <p:tgtEl>
+                                          <p:spTgt spid="3"/>
+                                        </p:tgtEl>
+                                        <p:attrNameLst>
+                                          <p:attrName>style.visibility</p:attrName>
+                                        </p:attrNameLst>
+                                      </p:cBhvr>
+                                      <p:to>
+                                        <p:strVal val="visible"/>
+                                      </p:to>
+                                    </p:set>
+                                  </p:childTnLst>
+                                </p:cTn>
+                              </p:par>
+                            </p:childTnLst>
+                          </p:cTn>
+                        </p:par>
+                      </p:childTnLst>
+                    </p:cTn>
+                  </p:par>
+                </p:childTnLst>
+              </p:cTn>
+              <p:prevCondLst>
+                <p:cond evt="onPrev" delay="0">
+                  <p:tgtEl>
+                    <p:sldTgt/>
+                  </p:tgtEl>
+                </p:cond>
+              </p:prevCondLst>
+              <p:nextCondLst>
+                <p:cond evt="onNext" delay="0">
+                  <p:tgtEl>
+                    <p:sldTgt/>
+                  </p:tgtEl>
+                </p:cond>
+              </p:nextCondLst>
+            </p:seq>
+          </p:childTnLst>
+        </p:cTn>
+      </p:par>
+    </p:tnLst>
+  </p:timing>
+</p:sld>
+</file>
+
+<file path=ppt/slides/slide6.xml><?xml version="1.0" encoding="utf-8"?>
+<p:sld xmlns:a="http://schemas.openxmlformats.org/drawingml/2006/main" xmlns:r="http://schemas.openxmlformats.org/officeDocument/2006/relationships" xmlns:p="http://schemas.openxmlformats.org/presentationml/2006/main">
+  <p:cSld>
+    <p:spTree>
+      <p:nvGrpSpPr>
+        <p:cNvPr id="1" name=""/>
+        <p:cNvGrpSpPr/>
+        <p:nvPr/>
+      </p:nvGrpSpPr>
+      <p:grpSpPr>
+        <a:xfrm>
+          <a:off x="0" y="0"/>
+          <a:ext cx="0" cy="0"/>
+          <a:chOff x="0" y="0"/>
+          <a:chExt cx="0" cy="0"/>
+        </a:xfrm>
+      </p:grpSpPr>
+      <p:sp>
+        <p:nvSpPr>
+          <p:cNvPr id="2" name="Title 1">
+            <a:extLst>
+              <a:ext uri="{FF2B5EF4-FFF2-40B4-BE49-F238E27FC236}">
+                <a16:creationId xmlns:a16="http://schemas.microsoft.com/office/drawing/2014/main" id="{E6F3015D-6EE8-4540-8606-15AAF5130827}"/>
+              </a:ext>
+            </a:extLst>
+          </p:cNvPr>
+          <p:cNvSpPr>
+            <a:spLocks noGrp="1"/>
+          </p:cNvSpPr>
+          <p:nvPr>
+            <p:ph type="title"/>
+          </p:nvPr>
+        </p:nvSpPr>
+        <p:spPr/>
+        <p:txBody>
+          <a:bodyPr/>
+          <a:lstStyle/>
+          <a:p>
+            <a:r>
+              <a:rPr lang="en-IE" dirty="0"/>
+              <a:t>Open a new account</a:t>
+            </a:r>
+            <a:endParaRPr lang="en-US" dirty="0"/>
+          </a:p>
+        </p:txBody>
+      </p:sp>
+      <p:pic>
+        <p:nvPicPr>
           <p:cNvPr id="4" name="Picture 3">
             <a:extLst>
               <a:ext uri="{FF2B5EF4-FFF2-40B4-BE49-F238E27FC236}">
@@ -5774,6 +8947,111 @@
           </a:prstGeom>
         </p:spPr>
       </p:pic>
+      <p:pic>
+        <p:nvPicPr>
+          <p:cNvPr id="3" name="Picture 2">
+            <a:extLst>
+              <a:ext uri="{FF2B5EF4-FFF2-40B4-BE49-F238E27FC236}">
+                <a16:creationId xmlns:a16="http://schemas.microsoft.com/office/drawing/2014/main" id="{B53C1333-EE80-4635-B13A-8E1DF0C463C1}"/>
+              </a:ext>
+            </a:extLst>
+          </p:cNvPr>
+          <p:cNvPicPr>
+            <a:picLocks noChangeAspect="1"/>
+          </p:cNvPicPr>
+          <p:nvPr/>
+        </p:nvPicPr>
+        <p:blipFill>
+          <a:blip r:embed="rId4"/>
+          <a:stretch>
+            <a:fillRect/>
+          </a:stretch>
+        </p:blipFill>
+        <p:spPr>
+          <a:xfrm>
+            <a:off x="88776" y="1916778"/>
+            <a:ext cx="11683014" cy="2898182"/>
+          </a:xfrm>
+          <a:prstGeom prst="rect">
+            <a:avLst/>
+          </a:prstGeom>
+          <a:ln>
+            <a:solidFill>
+              <a:schemeClr val="tx1"/>
+            </a:solidFill>
+          </a:ln>
+        </p:spPr>
+      </p:pic>
+      <p:pic>
+        <p:nvPicPr>
+          <p:cNvPr id="5" name="Picture 4">
+            <a:extLst>
+              <a:ext uri="{FF2B5EF4-FFF2-40B4-BE49-F238E27FC236}">
+                <a16:creationId xmlns:a16="http://schemas.microsoft.com/office/drawing/2014/main" id="{47F19F31-6216-43F0-901C-0AF5AC6CB0B2}"/>
+              </a:ext>
+            </a:extLst>
+          </p:cNvPr>
+          <p:cNvPicPr>
+            <a:picLocks noChangeAspect="1"/>
+          </p:cNvPicPr>
+          <p:nvPr/>
+        </p:nvPicPr>
+        <p:blipFill>
+          <a:blip r:embed="rId5"/>
+          <a:stretch>
+            <a:fillRect/>
+          </a:stretch>
+        </p:blipFill>
+        <p:spPr>
+          <a:xfrm>
+            <a:off x="1770914" y="2570588"/>
+            <a:ext cx="7754432" cy="2724530"/>
+          </a:xfrm>
+          <a:prstGeom prst="rect">
+            <a:avLst/>
+          </a:prstGeom>
+          <a:ln>
+            <a:solidFill>
+              <a:schemeClr val="tx1"/>
+            </a:solidFill>
+          </a:ln>
+        </p:spPr>
+      </p:pic>
+      <p:pic>
+        <p:nvPicPr>
+          <p:cNvPr id="7" name="Picture 6">
+            <a:extLst>
+              <a:ext uri="{FF2B5EF4-FFF2-40B4-BE49-F238E27FC236}">
+                <a16:creationId xmlns:a16="http://schemas.microsoft.com/office/drawing/2014/main" id="{16CFE587-767C-43C0-A908-2A2287FA1782}"/>
+              </a:ext>
+            </a:extLst>
+          </p:cNvPr>
+          <p:cNvPicPr>
+            <a:picLocks noChangeAspect="1"/>
+          </p:cNvPicPr>
+          <p:nvPr/>
+        </p:nvPicPr>
+        <p:blipFill>
+          <a:blip r:embed="rId6"/>
+          <a:stretch>
+            <a:fillRect/>
+          </a:stretch>
+        </p:blipFill>
+        <p:spPr>
+          <a:xfrm>
+            <a:off x="420210" y="1690688"/>
+            <a:ext cx="10753029" cy="4562963"/>
+          </a:xfrm>
+          <a:prstGeom prst="rect">
+            <a:avLst/>
+          </a:prstGeom>
+          <a:ln>
+            <a:solidFill>
+              <a:schemeClr val="tx1"/>
+            </a:solidFill>
+          </a:ln>
+        </p:spPr>
+      </p:pic>
     </p:spTree>
     <p:extLst>
       <p:ext uri="{BB962C8B-B14F-4D97-AF65-F5344CB8AC3E}">
@@ -5784,10 +9062,130 @@
   <p:clrMapOvr>
     <a:masterClrMapping/>
   </p:clrMapOvr>
+  <p:timing>
+    <p:tnLst>
+      <p:par>
+        <p:cTn id="1" dur="indefinite" restart="never" nodeType="tmRoot">
+          <p:childTnLst>
+            <p:seq concurrent="1" nextAc="seek">
+              <p:cTn id="2" dur="indefinite" nodeType="mainSeq">
+                <p:childTnLst>
+                  <p:par>
+                    <p:cTn id="3" fill="hold">
+                      <p:stCondLst>
+                        <p:cond delay="indefinite"/>
+                      </p:stCondLst>
+                      <p:childTnLst>
+                        <p:par>
+                          <p:cTn id="4" fill="hold">
+                            <p:stCondLst>
+                              <p:cond delay="0"/>
+                            </p:stCondLst>
+                            <p:childTnLst>
+                              <p:par>
+                                <p:cTn id="5" presetID="1" presetClass="entr" presetSubtype="0" fill="hold" nodeType="clickEffect">
+                                  <p:stCondLst>
+                                    <p:cond delay="0"/>
+                                  </p:stCondLst>
+                                  <p:childTnLst>
+                                    <p:set>
+                                      <p:cBhvr>
+                                        <p:cTn id="6" dur="1" fill="hold">
+                                          <p:stCondLst>
+                                            <p:cond delay="0"/>
+                                          </p:stCondLst>
+                                        </p:cTn>
+                                        <p:tgtEl>
+                                          <p:spTgt spid="5"/>
+                                        </p:tgtEl>
+                                        <p:attrNameLst>
+                                          <p:attrName>style.visibility</p:attrName>
+                                        </p:attrNameLst>
+                                      </p:cBhvr>
+                                      <p:to>
+                                        <p:strVal val="visible"/>
+                                      </p:to>
+                                    </p:set>
+                                  </p:childTnLst>
+                                </p:cTn>
+                              </p:par>
+                            </p:childTnLst>
+                          </p:cTn>
+                        </p:par>
+                      </p:childTnLst>
+                    </p:cTn>
+                  </p:par>
+                  <p:par>
+                    <p:cTn id="7" fill="hold">
+                      <p:stCondLst>
+                        <p:cond delay="indefinite"/>
+                      </p:stCondLst>
+                      <p:childTnLst>
+                        <p:par>
+                          <p:cTn id="8" fill="hold">
+                            <p:stCondLst>
+                              <p:cond delay="0"/>
+                            </p:stCondLst>
+                            <p:childTnLst>
+                              <p:par>
+                                <p:cTn id="9" presetID="1" presetClass="entr" presetSubtype="0" fill="hold" nodeType="clickEffect">
+                                  <p:stCondLst>
+                                    <p:cond delay="0"/>
+                                  </p:stCondLst>
+                                  <p:childTnLst>
+                                    <p:set>
+                                      <p:cBhvr>
+                                        <p:cTn id="10" dur="1" fill="hold">
+                                          <p:stCondLst>
+                                            <p:cond delay="0"/>
+                                          </p:stCondLst>
+                                        </p:cTn>
+                                        <p:tgtEl>
+                                          <p:spTgt spid="7"/>
+                                        </p:tgtEl>
+                                        <p:attrNameLst>
+                                          <p:attrName>style.visibility</p:attrName>
+                                        </p:attrNameLst>
+                                      </p:cBhvr>
+                                      <p:to>
+                                        <p:strVal val="visible"/>
+                                      </p:to>
+                                    </p:set>
+                                  </p:childTnLst>
+                                </p:cTn>
+                              </p:par>
+                            </p:childTnLst>
+                          </p:cTn>
+                        </p:par>
+                      </p:childTnLst>
+                    </p:cTn>
+                  </p:par>
+                </p:childTnLst>
+              </p:cTn>
+              <p:prevCondLst>
+                <p:cond evt="onPrev" delay="0">
+                  <p:tgtEl>
+                    <p:sldTgt/>
+                  </p:tgtEl>
+                </p:cond>
+              </p:prevCondLst>
+              <p:nextCondLst>
+                <p:cond evt="onNext" delay="0">
+                  <p:tgtEl>
+                    <p:sldTgt/>
+                  </p:tgtEl>
+                </p:cond>
+              </p:nextCondLst>
+            </p:seq>
+          </p:childTnLst>
+        </p:cTn>
+      </p:par>
+    </p:tnLst>
+  </p:timing>
 </p:sld>
 </file>
 
-<file path=ppt/slides/slide5.xml><?xml version="1.0" encoding="utf-8"?>
+<file path=ppt/slides/slide7.xml><?xml version="1.0" encoding="utf-8"?>
 <p:sld xmlns:a="http://schemas.openxmlformats.org/drawingml/2006/main" xmlns:r="http://schemas.openxmlformats.org/officeDocument/2006/relationships" xmlns:p="http://schemas.openxmlformats.org/presentationml/2006/main">
   <p:cSld>
     <p:spTree>
@@ -5863,6 +9261,204 @@
           </a:prstGeom>
         </p:spPr>
       </p:pic>
+      <p:pic>
+        <p:nvPicPr>
+          <p:cNvPr id="5" name="Picture 4">
+            <a:extLst>
+              <a:ext uri="{FF2B5EF4-FFF2-40B4-BE49-F238E27FC236}">
+                <a16:creationId xmlns:a16="http://schemas.microsoft.com/office/drawing/2014/main" id="{D03CFB2F-930B-4128-948C-EF9FB357F0E2}"/>
+              </a:ext>
+            </a:extLst>
+          </p:cNvPr>
+          <p:cNvPicPr>
+            <a:picLocks noChangeAspect="1"/>
+          </p:cNvPicPr>
+          <p:nvPr/>
+        </p:nvPicPr>
+        <p:blipFill>
+          <a:blip r:embed="rId4"/>
+          <a:stretch>
+            <a:fillRect/>
+          </a:stretch>
+        </p:blipFill>
+        <p:spPr>
+          <a:xfrm>
+            <a:off x="955799" y="1987062"/>
+            <a:ext cx="626511" cy="828196"/>
+          </a:xfrm>
+          <a:prstGeom prst="rect">
+            <a:avLst/>
+          </a:prstGeom>
+        </p:spPr>
+      </p:pic>
+      <p:sp>
+        <p:nvSpPr>
+          <p:cNvPr id="6" name="TextBox 5">
+            <a:extLst>
+              <a:ext uri="{FF2B5EF4-FFF2-40B4-BE49-F238E27FC236}">
+                <a16:creationId xmlns:a16="http://schemas.microsoft.com/office/drawing/2014/main" id="{819D8E7B-1D9C-48EC-9FD7-4B64C17A6DC3}"/>
+              </a:ext>
+            </a:extLst>
+          </p:cNvPr>
+          <p:cNvSpPr txBox="1"/>
+          <p:nvPr/>
+        </p:nvSpPr>
+        <p:spPr>
+          <a:xfrm>
+            <a:off x="1685676" y="2216494"/>
+            <a:ext cx="4007700" cy="369332"/>
+          </a:xfrm>
+          <a:prstGeom prst="rect">
+            <a:avLst/>
+          </a:prstGeom>
+          <a:noFill/>
+        </p:spPr>
+        <p:txBody>
+          <a:bodyPr wrap="none" rtlCol="0">
+            <a:spAutoFit/>
+          </a:bodyPr>
+          <a:lstStyle/>
+          <a:p>
+            <a:r>
+              <a:rPr lang="en-IE" dirty="0"/>
+              <a:t>Target account for the deposit must exist</a:t>
+            </a:r>
+            <a:endParaRPr lang="en-GB" dirty="0"/>
+          </a:p>
+        </p:txBody>
+      </p:sp>
+      <p:pic>
+        <p:nvPicPr>
+          <p:cNvPr id="7" name="Picture 6">
+            <a:extLst>
+              <a:ext uri="{FF2B5EF4-FFF2-40B4-BE49-F238E27FC236}">
+                <a16:creationId xmlns:a16="http://schemas.microsoft.com/office/drawing/2014/main" id="{2619EF60-19E8-48B5-B55A-A59FC8796C59}"/>
+              </a:ext>
+            </a:extLst>
+          </p:cNvPr>
+          <p:cNvPicPr>
+            <a:picLocks noChangeAspect="1"/>
+          </p:cNvPicPr>
+          <p:nvPr/>
+        </p:nvPicPr>
+        <p:blipFill>
+          <a:blip r:embed="rId5"/>
+          <a:stretch>
+            <a:fillRect/>
+          </a:stretch>
+        </p:blipFill>
+        <p:spPr>
+          <a:xfrm>
+            <a:off x="883237" y="3429000"/>
+            <a:ext cx="771633" cy="762106"/>
+          </a:xfrm>
+          <a:prstGeom prst="rect">
+            <a:avLst/>
+          </a:prstGeom>
+        </p:spPr>
+      </p:pic>
+      <p:sp>
+        <p:nvSpPr>
+          <p:cNvPr id="8" name="TextBox 7">
+            <a:extLst>
+              <a:ext uri="{FF2B5EF4-FFF2-40B4-BE49-F238E27FC236}">
+                <a16:creationId xmlns:a16="http://schemas.microsoft.com/office/drawing/2014/main" id="{10F8AE99-7F51-4892-8909-D638947736D7}"/>
+              </a:ext>
+            </a:extLst>
+          </p:cNvPr>
+          <p:cNvSpPr txBox="1"/>
+          <p:nvPr/>
+        </p:nvSpPr>
+        <p:spPr>
+          <a:xfrm>
+            <a:off x="1685676" y="3625387"/>
+            <a:ext cx="1747081" cy="369332"/>
+          </a:xfrm>
+          <a:prstGeom prst="rect">
+            <a:avLst/>
+          </a:prstGeom>
+          <a:noFill/>
+        </p:spPr>
+        <p:txBody>
+          <a:bodyPr wrap="none" rtlCol="0">
+            <a:spAutoFit/>
+          </a:bodyPr>
+          <a:lstStyle/>
+          <a:p>
+            <a:r>
+              <a:rPr lang="en-IE" dirty="0"/>
+              <a:t>Deposit amount</a:t>
+            </a:r>
+            <a:endParaRPr lang="en-GB" dirty="0"/>
+          </a:p>
+        </p:txBody>
+      </p:sp>
+      <p:pic>
+        <p:nvPicPr>
+          <p:cNvPr id="9" name="Picture 8">
+            <a:extLst>
+              <a:ext uri="{FF2B5EF4-FFF2-40B4-BE49-F238E27FC236}">
+                <a16:creationId xmlns:a16="http://schemas.microsoft.com/office/drawing/2014/main" id="{1FE41DB3-0965-492A-81C4-566B9D04FAF2}"/>
+              </a:ext>
+            </a:extLst>
+          </p:cNvPr>
+          <p:cNvPicPr>
+            <a:picLocks noChangeAspect="1"/>
+          </p:cNvPicPr>
+          <p:nvPr/>
+        </p:nvPicPr>
+        <p:blipFill>
+          <a:blip r:embed="rId5"/>
+          <a:stretch>
+            <a:fillRect/>
+          </a:stretch>
+        </p:blipFill>
+        <p:spPr>
+          <a:xfrm>
+            <a:off x="883237" y="4553570"/>
+            <a:ext cx="771633" cy="762106"/>
+          </a:xfrm>
+          <a:prstGeom prst="rect">
+            <a:avLst/>
+          </a:prstGeom>
+        </p:spPr>
+      </p:pic>
+      <p:sp>
+        <p:nvSpPr>
+          <p:cNvPr id="10" name="TextBox 9">
+            <a:extLst>
+              <a:ext uri="{FF2B5EF4-FFF2-40B4-BE49-F238E27FC236}">
+                <a16:creationId xmlns:a16="http://schemas.microsoft.com/office/drawing/2014/main" id="{C36F8906-27A3-46CB-A755-61BDDAD44B27}"/>
+              </a:ext>
+            </a:extLst>
+          </p:cNvPr>
+          <p:cNvSpPr txBox="1"/>
+          <p:nvPr/>
+        </p:nvSpPr>
+        <p:spPr>
+          <a:xfrm>
+            <a:off x="1685676" y="4749957"/>
+            <a:ext cx="3163430" cy="369332"/>
+          </a:xfrm>
+          <a:prstGeom prst="rect">
+            <a:avLst/>
+          </a:prstGeom>
+          <a:noFill/>
+        </p:spPr>
+        <p:txBody>
+          <a:bodyPr wrap="none" rtlCol="0">
+            <a:spAutoFit/>
+          </a:bodyPr>
+          <a:lstStyle/>
+          <a:p>
+            <a:r>
+              <a:rPr lang="en-IE" dirty="0"/>
+              <a:t>Source of the deposit (optional)</a:t>
+            </a:r>
+            <a:endParaRPr lang="en-GB" dirty="0"/>
+          </a:p>
+        </p:txBody>
+      </p:sp>
     </p:spTree>
     <p:extLst>
       <p:ext uri="{BB962C8B-B14F-4D97-AF65-F5344CB8AC3E}">
@@ -5876,7 +9472,7 @@
 </p:sld>
 </file>
 
-<file path=ppt/slides/slide6.xml><?xml version="1.0" encoding="utf-8"?>
+<file path=ppt/slides/slide8.xml><?xml version="1.0" encoding="utf-8"?>
 <p:sld xmlns:a="http://schemas.openxmlformats.org/drawingml/2006/main" xmlns:r="http://schemas.openxmlformats.org/officeDocument/2006/relationships" xmlns:p="http://schemas.openxmlformats.org/presentationml/2006/main">
   <p:cSld>
     <p:spTree>
@@ -5959,6 +9555,41 @@
           <a:prstGeom prst="rect">
             <a:avLst/>
           </a:prstGeom>
+        </p:spPr>
+      </p:pic>
+      <p:pic>
+        <p:nvPicPr>
+          <p:cNvPr id="4" name="Picture 3">
+            <a:extLst>
+              <a:ext uri="{FF2B5EF4-FFF2-40B4-BE49-F238E27FC236}">
+                <a16:creationId xmlns:a16="http://schemas.microsoft.com/office/drawing/2014/main" id="{29830141-D514-4A20-87F1-3DEED16DA445}"/>
+              </a:ext>
+            </a:extLst>
+          </p:cNvPr>
+          <p:cNvPicPr>
+            <a:picLocks noChangeAspect="1"/>
+          </p:cNvPicPr>
+          <p:nvPr/>
+        </p:nvPicPr>
+        <p:blipFill>
+          <a:blip r:embed="rId5"/>
+          <a:stretch>
+            <a:fillRect/>
+          </a:stretch>
+        </p:blipFill>
+        <p:spPr>
+          <a:xfrm>
+            <a:off x="838200" y="1338527"/>
+            <a:ext cx="9882692" cy="5519473"/>
+          </a:xfrm>
+          <a:prstGeom prst="rect">
+            <a:avLst/>
+          </a:prstGeom>
+          <a:ln>
+            <a:solidFill>
+              <a:schemeClr val="tx1"/>
+            </a:solidFill>
+          </a:ln>
         </p:spPr>
       </p:pic>
     </p:spTree>
@@ -6052,7 +9683,7 @@
 </p:sld>
 </file>
 
-<file path=ppt/slides/slide7.xml><?xml version="1.0" encoding="utf-8"?>
+<file path=ppt/slides/slide9.xml><?xml version="1.0" encoding="utf-8"?>
 <p:sld xmlns:a="http://schemas.openxmlformats.org/drawingml/2006/main" xmlns:r="http://schemas.openxmlformats.org/officeDocument/2006/relationships" xmlns:p="http://schemas.openxmlformats.org/presentationml/2006/main">
   <p:cSld>
     <p:spTree>
@@ -6128,6 +9759,41 @@
           </a:prstGeom>
         </p:spPr>
       </p:pic>
+      <p:pic>
+        <p:nvPicPr>
+          <p:cNvPr id="3" name="Picture 2">
+            <a:extLst>
+              <a:ext uri="{FF2B5EF4-FFF2-40B4-BE49-F238E27FC236}">
+                <a16:creationId xmlns:a16="http://schemas.microsoft.com/office/drawing/2014/main" id="{1F634144-EADA-4D84-85D7-E91C17F3FAE0}"/>
+              </a:ext>
+            </a:extLst>
+          </p:cNvPr>
+          <p:cNvPicPr>
+            <a:picLocks noChangeAspect="1"/>
+          </p:cNvPicPr>
+          <p:nvPr/>
+        </p:nvPicPr>
+        <p:blipFill>
+          <a:blip r:embed="rId4"/>
+          <a:stretch>
+            <a:fillRect/>
+          </a:stretch>
+        </p:blipFill>
+        <p:spPr>
+          <a:xfrm>
+            <a:off x="2085060" y="1484910"/>
+            <a:ext cx="7600116" cy="5077321"/>
+          </a:xfrm>
+          <a:prstGeom prst="rect">
+            <a:avLst/>
+          </a:prstGeom>
+          <a:ln>
+            <a:solidFill>
+              <a:schemeClr val="tx1"/>
+            </a:solidFill>
+          </a:ln>
+        </p:spPr>
+      </p:pic>
     </p:spTree>
     <p:extLst>
       <p:ext uri="{BB962C8B-B14F-4D97-AF65-F5344CB8AC3E}">
@@ -6138,271 +9804,6 @@
   <p:clrMapOvr>
     <a:masterClrMapping/>
   </p:clrMapOvr>
-</p:sld>
-</file>
-
-<file path=ppt/slides/slide8.xml><?xml version="1.0" encoding="utf-8"?>
-<p:sld xmlns:a="http://schemas.openxmlformats.org/drawingml/2006/main" xmlns:r="http://schemas.openxmlformats.org/officeDocument/2006/relationships" xmlns:p="http://schemas.openxmlformats.org/presentationml/2006/main">
-  <p:cSld>
-    <p:spTree>
-      <p:nvGrpSpPr>
-        <p:cNvPr id="1" name=""/>
-        <p:cNvGrpSpPr/>
-        <p:nvPr/>
-      </p:nvGrpSpPr>
-      <p:grpSpPr>
-        <a:xfrm>
-          <a:off x="0" y="0"/>
-          <a:ext cx="0" cy="0"/>
-          <a:chOff x="0" y="0"/>
-          <a:chExt cx="0" cy="0"/>
-        </a:xfrm>
-      </p:grpSpPr>
-      <p:sp>
-        <p:nvSpPr>
-          <p:cNvPr id="2" name="Title 1">
-            <a:extLst>
-              <a:ext uri="{FF2B5EF4-FFF2-40B4-BE49-F238E27FC236}">
-                <a16:creationId xmlns:a16="http://schemas.microsoft.com/office/drawing/2014/main" id="{E6F3015D-6EE8-4540-8606-15AAF5130827}"/>
-              </a:ext>
-            </a:extLst>
-          </p:cNvPr>
-          <p:cNvSpPr>
-            <a:spLocks noGrp="1"/>
-          </p:cNvSpPr>
-          <p:nvPr>
-            <p:ph type="title"/>
-          </p:nvPr>
-        </p:nvSpPr>
-        <p:spPr/>
-        <p:txBody>
-          <a:bodyPr/>
-          <a:lstStyle/>
-          <a:p>
-            <a:r>
-              <a:rPr lang="en-IE" dirty="0"/>
-              <a:t>Get the balance</a:t>
-            </a:r>
-            <a:endParaRPr lang="en-US" dirty="0"/>
-          </a:p>
-        </p:txBody>
-      </p:sp>
-      <p:pic>
-        <p:nvPicPr>
-          <p:cNvPr id="4" name="Picture 3">
-            <a:extLst>
-              <a:ext uri="{FF2B5EF4-FFF2-40B4-BE49-F238E27FC236}">
-                <a16:creationId xmlns:a16="http://schemas.microsoft.com/office/drawing/2014/main" id="{ECADDDDB-0834-4DB5-8FC9-55D9296D98CF}"/>
-              </a:ext>
-            </a:extLst>
-          </p:cNvPr>
-          <p:cNvPicPr>
-            <a:picLocks noChangeAspect="1"/>
-          </p:cNvPicPr>
-          <p:nvPr/>
-        </p:nvPicPr>
-        <p:blipFill>
-          <a:blip r:embed="rId3"/>
-          <a:stretch>
-            <a:fillRect/>
-          </a:stretch>
-        </p:blipFill>
-        <p:spPr>
-          <a:xfrm>
-            <a:off x="11149989" y="68751"/>
-            <a:ext cx="942975" cy="1171575"/>
-          </a:xfrm>
-          <a:prstGeom prst="rect">
-            <a:avLst/>
-          </a:prstGeom>
-        </p:spPr>
-      </p:pic>
-    </p:spTree>
-    <p:extLst>
-      <p:ext uri="{BB962C8B-B14F-4D97-AF65-F5344CB8AC3E}">
-        <p14:creationId xmlns:p14="http://schemas.microsoft.com/office/powerpoint/2010/main" val="2578491145"/>
-      </p:ext>
-    </p:extLst>
-  </p:cSld>
-  <p:clrMapOvr>
-    <a:masterClrMapping/>
-  </p:clrMapOvr>
-</p:sld>
-</file>
-
-<file path=ppt/slides/slide9.xml><?xml version="1.0" encoding="utf-8"?>
-<p:sld xmlns:a="http://schemas.openxmlformats.org/drawingml/2006/main" xmlns:r="http://schemas.openxmlformats.org/officeDocument/2006/relationships" xmlns:p="http://schemas.openxmlformats.org/presentationml/2006/main">
-  <p:cSld>
-    <p:spTree>
-      <p:nvGrpSpPr>
-        <p:cNvPr id="1" name=""/>
-        <p:cNvGrpSpPr/>
-        <p:nvPr/>
-      </p:nvGrpSpPr>
-      <p:grpSpPr>
-        <a:xfrm>
-          <a:off x="0" y="0"/>
-          <a:ext cx="0" cy="0"/>
-          <a:chOff x="0" y="0"/>
-          <a:chExt cx="0" cy="0"/>
-        </a:xfrm>
-      </p:grpSpPr>
-      <p:sp>
-        <p:nvSpPr>
-          <p:cNvPr id="2" name="Title 1">
-            <a:extLst>
-              <a:ext uri="{FF2B5EF4-FFF2-40B4-BE49-F238E27FC236}">
-                <a16:creationId xmlns:a16="http://schemas.microsoft.com/office/drawing/2014/main" id="{E6F3015D-6EE8-4540-8606-15AAF5130827}"/>
-              </a:ext>
-            </a:extLst>
-          </p:cNvPr>
-          <p:cNvSpPr>
-            <a:spLocks noGrp="1"/>
-          </p:cNvSpPr>
-          <p:nvPr>
-            <p:ph type="title"/>
-          </p:nvPr>
-        </p:nvSpPr>
-        <p:spPr/>
-        <p:txBody>
-          <a:bodyPr/>
-          <a:lstStyle/>
-          <a:p>
-            <a:r>
-              <a:rPr lang="en-IE" dirty="0"/>
-              <a:t>Get the balance</a:t>
-            </a:r>
-            <a:endParaRPr lang="en-US" dirty="0"/>
-          </a:p>
-        </p:txBody>
-      </p:sp>
-      <p:pic>
-        <p:nvPicPr>
-          <p:cNvPr id="3" name="Picture 2">
-            <a:extLst>
-              <a:ext uri="{FF2B5EF4-FFF2-40B4-BE49-F238E27FC236}">
-                <a16:creationId xmlns:a16="http://schemas.microsoft.com/office/drawing/2014/main" id="{9C2D67F8-4A34-4A96-959A-97647EF188D8}"/>
-              </a:ext>
-            </a:extLst>
-          </p:cNvPr>
-          <p:cNvPicPr>
-            <a:picLocks noChangeAspect="1"/>
-          </p:cNvPicPr>
-          <p:nvPr/>
-        </p:nvPicPr>
-        <p:blipFill>
-          <a:blip r:embed="rId3">
-            <a:extLst>
-              <a:ext uri="{28A0092B-C50C-407E-A947-70E740481C1C}">
-                <a14:useLocalDpi xmlns:a14="http://schemas.microsoft.com/office/drawing/2010/main" val="0"/>
-              </a:ext>
-              <a:ext uri="{837473B0-CC2E-450A-ABE3-18F120FF3D39}">
-                <a1611:picAttrSrcUrl xmlns:a1611="http://schemas.microsoft.com/office/drawing/2016/11/main" r:id="rId4"/>
-              </a:ext>
-            </a:extLst>
-          </a:blip>
-          <a:stretch>
-            <a:fillRect/>
-          </a:stretch>
-        </p:blipFill>
-        <p:spPr>
-          <a:xfrm>
-            <a:off x="10949305" y="137344"/>
-            <a:ext cx="1148189" cy="1050593"/>
-          </a:xfrm>
-          <a:prstGeom prst="rect">
-            <a:avLst/>
-          </a:prstGeom>
-        </p:spPr>
-      </p:pic>
-    </p:spTree>
-    <p:extLst>
-      <p:ext uri="{BB962C8B-B14F-4D97-AF65-F5344CB8AC3E}">
-        <p14:creationId xmlns:p14="http://schemas.microsoft.com/office/powerpoint/2010/main" val="309412189"/>
-      </p:ext>
-    </p:extLst>
-  </p:cSld>
-  <p:clrMapOvr>
-    <a:masterClrMapping/>
-  </p:clrMapOvr>
-  <p:timing>
-    <p:tnLst>
-      <p:par>
-        <p:cTn id="1" dur="indefinite" restart="never" nodeType="tmRoot">
-          <p:childTnLst>
-            <p:seq concurrent="1" nextAc="seek">
-              <p:cTn id="2" dur="indefinite" nodeType="mainSeq">
-                <p:childTnLst>
-                  <p:par>
-                    <p:cTn id="3" fill="hold">
-                      <p:stCondLst>
-                        <p:cond delay="indefinite"/>
-                        <p:cond evt="onBegin" delay="0">
-                          <p:tn val="2"/>
-                        </p:cond>
-                      </p:stCondLst>
-                      <p:childTnLst>
-                        <p:par>
-                          <p:cTn id="4" fill="hold">
-                            <p:stCondLst>
-                              <p:cond delay="0"/>
-                            </p:stCondLst>
-                            <p:childTnLst>
-                              <p:par>
-                                <p:cTn id="5" presetID="1" presetClass="entr" presetSubtype="0" fill="hold" nodeType="withEffect">
-                                  <p:stCondLst>
-                                    <p:cond delay="0"/>
-                                  </p:stCondLst>
-                                  <p:childTnLst>
-                                    <p:set>
-                                      <p:cBhvr>
-                                        <p:cTn id="6" dur="1" fill="hold">
-                                          <p:stCondLst>
-                                            <p:cond delay="0"/>
-                                          </p:stCondLst>
-                                        </p:cTn>
-                                        <p:tgtEl>
-                                          <p:spTgt spid="3"/>
-                                        </p:tgtEl>
-                                        <p:attrNameLst>
-                                          <p:attrName>style.visibility</p:attrName>
-                                        </p:attrNameLst>
-                                      </p:cBhvr>
-                                      <p:to>
-                                        <p:strVal val="visible"/>
-                                      </p:to>
-                                    </p:set>
-                                  </p:childTnLst>
-                                </p:cTn>
-                              </p:par>
-                            </p:childTnLst>
-                          </p:cTn>
-                        </p:par>
-                      </p:childTnLst>
-                    </p:cTn>
-                  </p:par>
-                </p:childTnLst>
-              </p:cTn>
-              <p:prevCondLst>
-                <p:cond evt="onPrev" delay="0">
-                  <p:tgtEl>
-                    <p:sldTgt/>
-                  </p:tgtEl>
-                </p:cond>
-              </p:prevCondLst>
-              <p:nextCondLst>
-                <p:cond evt="onNext" delay="0">
-                  <p:tgtEl>
-                    <p:sldTgt/>
-                  </p:tgtEl>
-                </p:cond>
-              </p:nextCondLst>
-            </p:seq>
-          </p:childTnLst>
-        </p:cTn>
-      </p:par>
-    </p:tnLst>
-  </p:timing>
 </p:sld>
 </file>
 

</xml_diff>

<commit_message>
Split slides as animations don't work on slideshare
</commit_message>
<xml_diff>
--- a/Event sourcing on Azure functions code example.pptx
+++ b/Event sourcing on Azure functions code example.pptx
@@ -5,7 +5,7 @@
     <p:sldMasterId id="2147483648" r:id="rId1"/>
   </p:sldMasterIdLst>
   <p:notesMasterIdLst>
-    <p:notesMasterId r:id="rId20"/>
+    <p:notesMasterId r:id="rId22"/>
   </p:notesMasterIdLst>
   <p:sldIdLst>
     <p:sldId id="256" r:id="rId2"/>
@@ -14,18 +14,20 @@
     <p:sldId id="269" r:id="rId5"/>
     <p:sldId id="270" r:id="rId6"/>
     <p:sldId id="259" r:id="rId7"/>
-    <p:sldId id="260" r:id="rId8"/>
-    <p:sldId id="261" r:id="rId9"/>
-    <p:sldId id="262" r:id="rId10"/>
-    <p:sldId id="263" r:id="rId11"/>
-    <p:sldId id="264" r:id="rId12"/>
-    <p:sldId id="271" r:id="rId13"/>
-    <p:sldId id="272" r:id="rId14"/>
-    <p:sldId id="265" r:id="rId15"/>
-    <p:sldId id="266" r:id="rId16"/>
-    <p:sldId id="267" r:id="rId17"/>
-    <p:sldId id="273" r:id="rId18"/>
-    <p:sldId id="268" r:id="rId19"/>
+    <p:sldId id="274" r:id="rId8"/>
+    <p:sldId id="275" r:id="rId9"/>
+    <p:sldId id="260" r:id="rId10"/>
+    <p:sldId id="261" r:id="rId11"/>
+    <p:sldId id="262" r:id="rId12"/>
+    <p:sldId id="263" r:id="rId13"/>
+    <p:sldId id="264" r:id="rId14"/>
+    <p:sldId id="271" r:id="rId15"/>
+    <p:sldId id="272" r:id="rId16"/>
+    <p:sldId id="265" r:id="rId17"/>
+    <p:sldId id="266" r:id="rId18"/>
+    <p:sldId id="267" r:id="rId19"/>
+    <p:sldId id="273" r:id="rId20"/>
+    <p:sldId id="268" r:id="rId21"/>
   </p:sldIdLst>
   <p:sldSz cx="12192000" cy="6858000"/>
   <p:notesSz cx="6858000" cy="9144000"/>
@@ -214,7 +216,7 @@
           <a:p>
             <a:fld id="{D70517CA-646E-4F92-BC77-FB90659F3FBD}" type="datetimeFigureOut">
               <a:rPr lang="en-US" smtClean="0"/>
-              <a:t>6/19/2019</a:t>
+              <a:t>6/20/2019</a:t>
             </a:fld>
             <a:endParaRPr lang="en-US"/>
           </a:p>
@@ -624,8 +626,23 @@
           <a:p>
             <a:r>
               <a:rPr lang="en-IE" dirty="0"/>
-              <a:t>Azure function</a:t>
-            </a:r>
+              <a:t>The deposit event is appended to the stream.</a:t>
+            </a:r>
+          </a:p>
+          <a:p>
+            <a:r>
+              <a:rPr lang="en-IE" dirty="0"/>
+              <a:t>Importantly the state (current balance etc.) of the bank account is </a:t>
+            </a:r>
+            <a:r>
+              <a:rPr lang="en-IE" b="1" dirty="0"/>
+              <a:t>not</a:t>
+            </a:r>
+            <a:r>
+              <a:rPr lang="en-IE" b="0" dirty="0"/>
+              <a:t> stored in the event</a:t>
+            </a:r>
+            <a:endParaRPr lang="en-IE" dirty="0"/>
           </a:p>
           <a:p>
             <a:endParaRPr lang="en-US" dirty="0"/>
@@ -658,7 +675,7 @@
     </p:spTree>
     <p:extLst>
       <p:ext uri="{BB962C8B-B14F-4D97-AF65-F5344CB8AC3E}">
-        <p14:creationId xmlns:p14="http://schemas.microsoft.com/office/powerpoint/2010/main" val="3753462135"/>
+        <p14:creationId xmlns:p14="http://schemas.microsoft.com/office/powerpoint/2010/main" val="3482490530"/>
       </p:ext>
     </p:extLst>
   </p:cSld>
@@ -714,10 +731,43 @@
           <a:p>
             <a:r>
               <a:rPr lang="en-IE" dirty="0"/>
-              <a:t>Azure function</a:t>
-            </a:r>
-          </a:p>
-          <a:p>
+              <a:t>Design / constraints</a:t>
+            </a:r>
+          </a:p>
+          <a:p>
+            <a:endParaRPr lang="en-IE" dirty="0"/>
+          </a:p>
+          <a:p>
+            <a:r>
+              <a:rPr lang="en-IE" dirty="0"/>
+              <a:t>To get the balance of the account we need to run a </a:t>
+            </a:r>
+            <a:r>
+              <a:rPr lang="en-IE" dirty="0">
+                <a:hlinkClick r:id="rId3"/>
+              </a:rPr>
+              <a:t>projection</a:t>
+            </a:r>
+            <a:r>
+              <a:rPr lang="en-IE" dirty="0"/>
+              <a:t> over the bank account event stream which handles the </a:t>
+            </a:r>
+            <a:r>
+              <a:rPr lang="en-IE" b="1" dirty="0"/>
+              <a:t>money deposited</a:t>
+            </a:r>
+            <a:r>
+              <a:rPr lang="en-IE" dirty="0"/>
+              <a:t> event and the </a:t>
+            </a:r>
+            <a:r>
+              <a:rPr lang="en-IE" b="1" dirty="0"/>
+              <a:t>money withdrawn</a:t>
+            </a:r>
+            <a:r>
+              <a:rPr lang="en-IE" dirty="0"/>
+              <a:t> event to give the balance as at a given point.</a:t>
+            </a:r>
             <a:endParaRPr lang="en-US" dirty="0"/>
           </a:p>
         </p:txBody>
@@ -748,7 +798,7 @@
     </p:spTree>
     <p:extLst>
       <p:ext uri="{BB962C8B-B14F-4D97-AF65-F5344CB8AC3E}">
-        <p14:creationId xmlns:p14="http://schemas.microsoft.com/office/powerpoint/2010/main" val="126256760"/>
+        <p14:creationId xmlns:p14="http://schemas.microsoft.com/office/powerpoint/2010/main" val="383098737"/>
       </p:ext>
     </p:extLst>
   </p:cSld>
@@ -804,26 +854,8 @@
           <a:p>
             <a:r>
               <a:rPr lang="en-IE" dirty="0"/>
-              <a:t>The projection is run and when it has processed all the events in the event stream the value is returned.</a:t>
-            </a:r>
-          </a:p>
-          <a:p>
-            <a:endParaRPr lang="en-IE" dirty="0"/>
-          </a:p>
-          <a:p>
-            <a:r>
-              <a:rPr lang="en-IE" dirty="0"/>
-              <a:t>1) Every projection also has a </a:t>
-            </a:r>
-            <a:r>
-              <a:rPr lang="en-IE" b="1" dirty="0"/>
-              <a:t>Current Sequence Number</a:t>
-            </a:r>
-            <a:r>
-              <a:rPr lang="en-IE" b="0" dirty="0"/>
-              <a:t> property that tells you the number of the last event in the stream that it read</a:t>
-            </a:r>
-            <a:endParaRPr lang="en-IE" dirty="0"/>
+              <a:t>Azure function</a:t>
+            </a:r>
           </a:p>
           <a:p>
             <a:endParaRPr lang="en-US" dirty="0"/>
@@ -856,7 +888,7 @@
     </p:spTree>
     <p:extLst>
       <p:ext uri="{BB962C8B-B14F-4D97-AF65-F5344CB8AC3E}">
-        <p14:creationId xmlns:p14="http://schemas.microsoft.com/office/powerpoint/2010/main" val="3817045538"/>
+        <p14:creationId xmlns:p14="http://schemas.microsoft.com/office/powerpoint/2010/main" val="3753462135"/>
       </p:ext>
     </p:extLst>
   </p:cSld>
@@ -912,7 +944,7 @@
           <a:p>
             <a:r>
               <a:rPr lang="en-IE" dirty="0"/>
-              <a:t>Resulting event stream</a:t>
+              <a:t>Azure function</a:t>
             </a:r>
           </a:p>
           <a:p>
@@ -946,7 +978,7 @@
     </p:spTree>
     <p:extLst>
       <p:ext uri="{BB962C8B-B14F-4D97-AF65-F5344CB8AC3E}">
-        <p14:creationId xmlns:p14="http://schemas.microsoft.com/office/powerpoint/2010/main" val="1393497827"/>
+        <p14:creationId xmlns:p14="http://schemas.microsoft.com/office/powerpoint/2010/main" val="126256760"/>
       </p:ext>
     </p:extLst>
   </p:cSld>
@@ -1002,7 +1034,7 @@
           <a:p>
             <a:r>
               <a:rPr lang="en-IE" dirty="0"/>
-              <a:t>Design / constraints</a:t>
+              <a:t>The projection is run and when it has processed all the events in the event stream the value is returned.</a:t>
             </a:r>
           </a:p>
           <a:p>
@@ -1011,36 +1043,19 @@
           <a:p>
             <a:r>
               <a:rPr lang="en-IE" dirty="0"/>
-              <a:t>Withdrawing money requires running the </a:t>
+              <a:t>1) Every projection also has a </a:t>
             </a:r>
             <a:r>
               <a:rPr lang="en-IE" b="1" dirty="0"/>
-              <a:t>balance</a:t>
-            </a:r>
-            <a:r>
-              <a:rPr lang="en-IE" dirty="0"/>
-              <a:t> </a:t>
-            </a:r>
-            <a:r>
-              <a:rPr lang="en-IE" dirty="0">
-                <a:hlinkClick r:id="rId3"/>
-              </a:rPr>
-              <a:t>projection</a:t>
-            </a:r>
-            <a:r>
-              <a:rPr lang="en-IE" dirty="0"/>
-              <a:t> to make sure that the account has the funds available to withdraw and only if it does, post the withdrawal event. When posting the withdrawal event we pass in the sequence number returned by the </a:t>
-            </a:r>
-            <a:r>
-              <a:rPr lang="en-IE" dirty="0">
-                <a:hlinkClick r:id="rId3"/>
-              </a:rPr>
-              <a:t>projection</a:t>
-            </a:r>
-            <a:r>
-              <a:rPr lang="en-IE" dirty="0"/>
-              <a:t> and if any other events have been written to the event stream since then an error is thrown and our withdrawal event is not appended.</a:t>
-            </a:r>
+              <a:t>Current Sequence Number</a:t>
+            </a:r>
+            <a:r>
+              <a:rPr lang="en-IE" b="0" dirty="0"/>
+              <a:t> property that tells you the number of the last event in the stream that it read</a:t>
+            </a:r>
+            <a:endParaRPr lang="en-IE" dirty="0"/>
+          </a:p>
+          <a:p>
             <a:endParaRPr lang="en-US" dirty="0"/>
           </a:p>
         </p:txBody>
@@ -1071,7 +1086,7 @@
     </p:spTree>
     <p:extLst>
       <p:ext uri="{BB962C8B-B14F-4D97-AF65-F5344CB8AC3E}">
-        <p14:creationId xmlns:p14="http://schemas.microsoft.com/office/powerpoint/2010/main" val="4267662159"/>
+        <p14:creationId xmlns:p14="http://schemas.microsoft.com/office/powerpoint/2010/main" val="3817045538"/>
       </p:ext>
     </p:extLst>
   </p:cSld>
@@ -1127,7 +1142,7 @@
           <a:p>
             <a:r>
               <a:rPr lang="en-IE" dirty="0"/>
-              <a:t>Azure function</a:t>
+              <a:t>Resulting event stream</a:t>
             </a:r>
           </a:p>
           <a:p>
@@ -1161,7 +1176,7 @@
     </p:spTree>
     <p:extLst>
       <p:ext uri="{BB962C8B-B14F-4D97-AF65-F5344CB8AC3E}">
-        <p14:creationId xmlns:p14="http://schemas.microsoft.com/office/powerpoint/2010/main" val="2984912149"/>
+        <p14:creationId xmlns:p14="http://schemas.microsoft.com/office/powerpoint/2010/main" val="1393497827"/>
       </p:ext>
     </p:extLst>
   </p:cSld>
@@ -1217,10 +1232,45 @@
           <a:p>
             <a:r>
               <a:rPr lang="en-IE" dirty="0"/>
-              <a:t>Azure function</a:t>
-            </a:r>
-          </a:p>
-          <a:p>
+              <a:t>Design / constraints</a:t>
+            </a:r>
+          </a:p>
+          <a:p>
+            <a:endParaRPr lang="en-IE" dirty="0"/>
+          </a:p>
+          <a:p>
+            <a:r>
+              <a:rPr lang="en-IE" dirty="0"/>
+              <a:t>Withdrawing money requires running the </a:t>
+            </a:r>
+            <a:r>
+              <a:rPr lang="en-IE" b="1" dirty="0"/>
+              <a:t>balance</a:t>
+            </a:r>
+            <a:r>
+              <a:rPr lang="en-IE" dirty="0"/>
+              <a:t> </a:t>
+            </a:r>
+            <a:r>
+              <a:rPr lang="en-IE" dirty="0">
+                <a:hlinkClick r:id="rId3"/>
+              </a:rPr>
+              <a:t>projection</a:t>
+            </a:r>
+            <a:r>
+              <a:rPr lang="en-IE" dirty="0"/>
+              <a:t> to make sure that the account has the funds available to withdraw and only if it does, post the withdrawal event. When posting the withdrawal event we pass in the sequence number returned by the </a:t>
+            </a:r>
+            <a:r>
+              <a:rPr lang="en-IE" dirty="0">
+                <a:hlinkClick r:id="rId3"/>
+              </a:rPr>
+              <a:t>projection</a:t>
+            </a:r>
+            <a:r>
+              <a:rPr lang="en-IE" dirty="0"/>
+              <a:t> and if any other events have been written to the event stream since then an error is thrown and our withdrawal event is not appended.</a:t>
+            </a:r>
             <a:endParaRPr lang="en-US" dirty="0"/>
           </a:p>
         </p:txBody>
@@ -1251,7 +1301,7 @@
     </p:spTree>
     <p:extLst>
       <p:ext uri="{BB962C8B-B14F-4D97-AF65-F5344CB8AC3E}">
-        <p14:creationId xmlns:p14="http://schemas.microsoft.com/office/powerpoint/2010/main" val="244752676"/>
+        <p14:creationId xmlns:p14="http://schemas.microsoft.com/office/powerpoint/2010/main" val="4267662159"/>
       </p:ext>
     </p:extLst>
   </p:cSld>
@@ -1307,7 +1357,7 @@
           <a:p>
             <a:r>
               <a:rPr lang="en-IE" dirty="0"/>
-              <a:t>Resulting event stream</a:t>
+              <a:t>Azure function</a:t>
             </a:r>
           </a:p>
           <a:p>
@@ -1333,6 +1383,186 @@
             <a:fld id="{5BBCC628-4FEB-4E9A-A626-C808C74B96E6}" type="slidenum">
               <a:rPr lang="en-US" smtClean="0"/>
               <a:t>18</a:t>
+            </a:fld>
+            <a:endParaRPr lang="en-US"/>
+          </a:p>
+        </p:txBody>
+      </p:sp>
+    </p:spTree>
+    <p:extLst>
+      <p:ext uri="{BB962C8B-B14F-4D97-AF65-F5344CB8AC3E}">
+        <p14:creationId xmlns:p14="http://schemas.microsoft.com/office/powerpoint/2010/main" val="2984912149"/>
+      </p:ext>
+    </p:extLst>
+  </p:cSld>
+  <p:clrMapOvr>
+    <a:masterClrMapping/>
+  </p:clrMapOvr>
+</p:notes>
+</file>
+
+<file path=ppt/notesSlides/notesSlide18.xml><?xml version="1.0" encoding="utf-8"?>
+<p:notes xmlns:a="http://schemas.openxmlformats.org/drawingml/2006/main" xmlns:r="http://schemas.openxmlformats.org/officeDocument/2006/relationships" xmlns:p="http://schemas.openxmlformats.org/presentationml/2006/main">
+  <p:cSld>
+    <p:spTree>
+      <p:nvGrpSpPr>
+        <p:cNvPr id="1" name=""/>
+        <p:cNvGrpSpPr/>
+        <p:nvPr/>
+      </p:nvGrpSpPr>
+      <p:grpSpPr>
+        <a:xfrm>
+          <a:off x="0" y="0"/>
+          <a:ext cx="0" cy="0"/>
+          <a:chOff x="0" y="0"/>
+          <a:chExt cx="0" cy="0"/>
+        </a:xfrm>
+      </p:grpSpPr>
+      <p:sp>
+        <p:nvSpPr>
+          <p:cNvPr id="2" name="Slide Image Placeholder 1"/>
+          <p:cNvSpPr>
+            <a:spLocks noGrp="1" noRot="1" noChangeAspect="1"/>
+          </p:cNvSpPr>
+          <p:nvPr>
+            <p:ph type="sldImg"/>
+          </p:nvPr>
+        </p:nvSpPr>
+        <p:spPr/>
+      </p:sp>
+      <p:sp>
+        <p:nvSpPr>
+          <p:cNvPr id="3" name="Notes Placeholder 2"/>
+          <p:cNvSpPr>
+            <a:spLocks noGrp="1"/>
+          </p:cNvSpPr>
+          <p:nvPr>
+            <p:ph type="body" idx="1"/>
+          </p:nvPr>
+        </p:nvSpPr>
+        <p:spPr/>
+        <p:txBody>
+          <a:bodyPr/>
+          <a:lstStyle/>
+          <a:p>
+            <a:r>
+              <a:rPr lang="en-IE" dirty="0"/>
+              <a:t>Azure function</a:t>
+            </a:r>
+          </a:p>
+          <a:p>
+            <a:endParaRPr lang="en-US" dirty="0"/>
+          </a:p>
+        </p:txBody>
+      </p:sp>
+      <p:sp>
+        <p:nvSpPr>
+          <p:cNvPr id="4" name="Slide Number Placeholder 3"/>
+          <p:cNvSpPr>
+            <a:spLocks noGrp="1"/>
+          </p:cNvSpPr>
+          <p:nvPr>
+            <p:ph type="sldNum" sz="quarter" idx="5"/>
+          </p:nvPr>
+        </p:nvSpPr>
+        <p:spPr/>
+        <p:txBody>
+          <a:bodyPr/>
+          <a:lstStyle/>
+          <a:p>
+            <a:fld id="{5BBCC628-4FEB-4E9A-A626-C808C74B96E6}" type="slidenum">
+              <a:rPr lang="en-US" smtClean="0"/>
+              <a:t>19</a:t>
+            </a:fld>
+            <a:endParaRPr lang="en-US"/>
+          </a:p>
+        </p:txBody>
+      </p:sp>
+    </p:spTree>
+    <p:extLst>
+      <p:ext uri="{BB962C8B-B14F-4D97-AF65-F5344CB8AC3E}">
+        <p14:creationId xmlns:p14="http://schemas.microsoft.com/office/powerpoint/2010/main" val="244752676"/>
+      </p:ext>
+    </p:extLst>
+  </p:cSld>
+  <p:clrMapOvr>
+    <a:masterClrMapping/>
+  </p:clrMapOvr>
+</p:notes>
+</file>
+
+<file path=ppt/notesSlides/notesSlide19.xml><?xml version="1.0" encoding="utf-8"?>
+<p:notes xmlns:a="http://schemas.openxmlformats.org/drawingml/2006/main" xmlns:r="http://schemas.openxmlformats.org/officeDocument/2006/relationships" xmlns:p="http://schemas.openxmlformats.org/presentationml/2006/main">
+  <p:cSld>
+    <p:spTree>
+      <p:nvGrpSpPr>
+        <p:cNvPr id="1" name=""/>
+        <p:cNvGrpSpPr/>
+        <p:nvPr/>
+      </p:nvGrpSpPr>
+      <p:grpSpPr>
+        <a:xfrm>
+          <a:off x="0" y="0"/>
+          <a:ext cx="0" cy="0"/>
+          <a:chOff x="0" y="0"/>
+          <a:chExt cx="0" cy="0"/>
+        </a:xfrm>
+      </p:grpSpPr>
+      <p:sp>
+        <p:nvSpPr>
+          <p:cNvPr id="2" name="Slide Image Placeholder 1"/>
+          <p:cNvSpPr>
+            <a:spLocks noGrp="1" noRot="1" noChangeAspect="1"/>
+          </p:cNvSpPr>
+          <p:nvPr>
+            <p:ph type="sldImg"/>
+          </p:nvPr>
+        </p:nvSpPr>
+        <p:spPr/>
+      </p:sp>
+      <p:sp>
+        <p:nvSpPr>
+          <p:cNvPr id="3" name="Notes Placeholder 2"/>
+          <p:cNvSpPr>
+            <a:spLocks noGrp="1"/>
+          </p:cNvSpPr>
+          <p:nvPr>
+            <p:ph type="body" idx="1"/>
+          </p:nvPr>
+        </p:nvSpPr>
+        <p:spPr/>
+        <p:txBody>
+          <a:bodyPr/>
+          <a:lstStyle/>
+          <a:p>
+            <a:r>
+              <a:rPr lang="en-IE" dirty="0"/>
+              <a:t>Resulting event stream</a:t>
+            </a:r>
+          </a:p>
+          <a:p>
+            <a:endParaRPr lang="en-US" dirty="0"/>
+          </a:p>
+        </p:txBody>
+      </p:sp>
+      <p:sp>
+        <p:nvSpPr>
+          <p:cNvPr id="4" name="Slide Number Placeholder 3"/>
+          <p:cNvSpPr>
+            <a:spLocks noGrp="1"/>
+          </p:cNvSpPr>
+          <p:nvPr>
+            <p:ph type="sldNum" sz="quarter" idx="5"/>
+          </p:nvPr>
+        </p:nvSpPr>
+        <p:spPr/>
+        <p:txBody>
+          <a:bodyPr/>
+          <a:lstStyle/>
+          <a:p>
+            <a:fld id="{5BBCC628-4FEB-4E9A-A626-C808C74B96E6}" type="slidenum">
+              <a:rPr lang="en-US" smtClean="0"/>
+              <a:t>20</a:t>
             </a:fld>
             <a:endParaRPr lang="en-US"/>
           </a:p>
@@ -1693,32 +1923,6 @@
             <a:endParaRPr lang="en-IE" b="0" dirty="0"/>
           </a:p>
           <a:p>
-            <a:endParaRPr lang="en-IE" b="0" dirty="0"/>
-          </a:p>
-          <a:p>
-            <a:pPr marL="228600" indent="-228600">
-              <a:buAutoNum type="arabicParenR"/>
-            </a:pPr>
-            <a:r>
-              <a:rPr lang="en-IE" b="0" dirty="0"/>
-              <a:t>Each blob also has metadata set for the properties of the event stream</a:t>
-            </a:r>
-          </a:p>
-          <a:p>
-            <a:pPr marL="228600" indent="-228600">
-              <a:buAutoNum type="arabicParenR"/>
-            </a:pPr>
-            <a:r>
-              <a:rPr lang="en-IE" b="0" dirty="0"/>
-              <a:t>The data for each event are in JSON and wrapped in the event </a:t>
-            </a:r>
-            <a:r>
-              <a:rPr lang="en-IE" b="1" dirty="0"/>
-              <a:t>context</a:t>
-            </a:r>
-            <a:endParaRPr lang="en-IE" dirty="0"/>
-          </a:p>
-          <a:p>
             <a:endParaRPr lang="en-US" dirty="0"/>
           </a:p>
         </p:txBody>
@@ -1803,19 +2007,15 @@
           <a:bodyPr/>
           <a:lstStyle/>
           <a:p>
-            <a:r>
-              <a:rPr lang="en-IE" dirty="0"/>
-              <a:t>Design / constraints</a:t>
-            </a:r>
-          </a:p>
-          <a:p>
-            <a:endParaRPr lang="en-IE" dirty="0"/>
-          </a:p>
-          <a:p>
-            <a:r>
-              <a:rPr lang="en-IE" dirty="0"/>
-              <a:t>Depositing money is the simplest of all operations - we simply need to be sure that the account exists.</a:t>
-            </a:r>
+            <a:pPr marL="0" indent="0">
+              <a:buNone/>
+            </a:pPr>
+            <a:r>
+              <a:rPr lang="en-IE" b="0" dirty="0"/>
+              <a:t>Each blob also has metadata set for the properties of the event stream</a:t>
+            </a:r>
+          </a:p>
+          <a:p>
             <a:endParaRPr lang="en-US" dirty="0"/>
           </a:p>
         </p:txBody>
@@ -1846,7 +2046,7 @@
     </p:spTree>
     <p:extLst>
       <p:ext uri="{BB962C8B-B14F-4D97-AF65-F5344CB8AC3E}">
-        <p14:creationId xmlns:p14="http://schemas.microsoft.com/office/powerpoint/2010/main" val="1656640997"/>
+        <p14:creationId xmlns:p14="http://schemas.microsoft.com/office/powerpoint/2010/main" val="869349061"/>
       </p:ext>
     </p:extLst>
   </p:cSld>
@@ -1900,9 +2100,25 @@
           <a:bodyPr/>
           <a:lstStyle/>
           <a:p>
-            <a:r>
-              <a:rPr lang="en-IE" dirty="0"/>
-              <a:t>Azure function</a:t>
+            <a:pPr marL="0" indent="0">
+              <a:buNone/>
+            </a:pPr>
+            <a:r>
+              <a:rPr lang="en-IE" b="0" dirty="0"/>
+              <a:t>The data for each event are in JSON and wrapped in the event </a:t>
+            </a:r>
+            <a:r>
+              <a:rPr lang="en-IE" b="1" dirty="0"/>
+              <a:t>context</a:t>
+            </a:r>
+          </a:p>
+          <a:p>
+            <a:pPr marL="0" indent="0">
+              <a:buNone/>
+            </a:pPr>
+            <a:r>
+              <a:rPr lang="en-IE" b="0" dirty="0"/>
+              <a:t>(Projections only access the data inside the event instance but the outer wrapper is useful for debugging etc)</a:t>
             </a:r>
           </a:p>
           <a:p>
@@ -1936,7 +2152,7 @@
     </p:spTree>
     <p:extLst>
       <p:ext uri="{BB962C8B-B14F-4D97-AF65-F5344CB8AC3E}">
-        <p14:creationId xmlns:p14="http://schemas.microsoft.com/office/powerpoint/2010/main" val="2025540122"/>
+        <p14:creationId xmlns:p14="http://schemas.microsoft.com/office/powerpoint/2010/main" val="697147481"/>
       </p:ext>
     </p:extLst>
   </p:cSld>
@@ -1992,25 +2208,17 @@
           <a:p>
             <a:r>
               <a:rPr lang="en-IE" dirty="0"/>
-              <a:t>The deposit event is appended to the stream.</a:t>
-            </a:r>
+              <a:t>Design / constraints</a:t>
+            </a:r>
+          </a:p>
+          <a:p>
+            <a:endParaRPr lang="en-IE" dirty="0"/>
           </a:p>
           <a:p>
             <a:r>
               <a:rPr lang="en-IE" dirty="0"/>
-              <a:t>Importantly the state (current balance etc.) of the bank account is </a:t>
-            </a:r>
-            <a:r>
-              <a:rPr lang="en-IE" b="1" dirty="0"/>
-              <a:t>not</a:t>
-            </a:r>
-            <a:r>
-              <a:rPr lang="en-IE" b="0" dirty="0"/>
-              <a:t> stored in the event</a:t>
-            </a:r>
-            <a:endParaRPr lang="en-IE" dirty="0"/>
-          </a:p>
-          <a:p>
+              <a:t>Depositing money is the simplest of all operations - we simply need to be sure that the account exists.</a:t>
+            </a:r>
             <a:endParaRPr lang="en-US" dirty="0"/>
           </a:p>
         </p:txBody>
@@ -2041,7 +2249,7 @@
     </p:spTree>
     <p:extLst>
       <p:ext uri="{BB962C8B-B14F-4D97-AF65-F5344CB8AC3E}">
-        <p14:creationId xmlns:p14="http://schemas.microsoft.com/office/powerpoint/2010/main" val="3482490530"/>
+        <p14:creationId xmlns:p14="http://schemas.microsoft.com/office/powerpoint/2010/main" val="1656640997"/>
       </p:ext>
     </p:extLst>
   </p:cSld>
@@ -2097,43 +2305,10 @@
           <a:p>
             <a:r>
               <a:rPr lang="en-IE" dirty="0"/>
-              <a:t>Design / constraints</a:t>
-            </a:r>
-          </a:p>
-          <a:p>
-            <a:endParaRPr lang="en-IE" dirty="0"/>
-          </a:p>
-          <a:p>
-            <a:r>
-              <a:rPr lang="en-IE" dirty="0"/>
-              <a:t>To get the balance of the account we need to run a </a:t>
-            </a:r>
-            <a:r>
-              <a:rPr lang="en-IE" dirty="0">
-                <a:hlinkClick r:id="rId3"/>
-              </a:rPr>
-              <a:t>projection</a:t>
-            </a:r>
-            <a:r>
-              <a:rPr lang="en-IE" dirty="0"/>
-              <a:t> over the bank account event stream which handles the </a:t>
-            </a:r>
-            <a:r>
-              <a:rPr lang="en-IE" b="1" dirty="0"/>
-              <a:t>money deposited</a:t>
-            </a:r>
-            <a:r>
-              <a:rPr lang="en-IE" dirty="0"/>
-              <a:t> event and the </a:t>
-            </a:r>
-            <a:r>
-              <a:rPr lang="en-IE" b="1" dirty="0"/>
-              <a:t>money withdrawn</a:t>
-            </a:r>
-            <a:r>
-              <a:rPr lang="en-IE" dirty="0"/>
-              <a:t> event to give the balance as at a given point.</a:t>
-            </a:r>
+              <a:t>Azure function</a:t>
+            </a:r>
+          </a:p>
+          <a:p>
             <a:endParaRPr lang="en-US" dirty="0"/>
           </a:p>
         </p:txBody>
@@ -2164,7 +2339,7 @@
     </p:spTree>
     <p:extLst>
       <p:ext uri="{BB962C8B-B14F-4D97-AF65-F5344CB8AC3E}">
-        <p14:creationId xmlns:p14="http://schemas.microsoft.com/office/powerpoint/2010/main" val="383098737"/>
+        <p14:creationId xmlns:p14="http://schemas.microsoft.com/office/powerpoint/2010/main" val="2025540122"/>
       </p:ext>
     </p:extLst>
   </p:cSld>
@@ -2321,7 +2496,7 @@
           <a:p>
             <a:fld id="{6BECA975-103C-4A17-81B4-E71ADF563304}" type="datetimeFigureOut">
               <a:rPr lang="en-US" smtClean="0"/>
-              <a:t>6/19/2019</a:t>
+              <a:t>6/20/2019</a:t>
             </a:fld>
             <a:endParaRPr lang="en-US"/>
           </a:p>
@@ -2519,7 +2694,7 @@
           <a:p>
             <a:fld id="{6BECA975-103C-4A17-81B4-E71ADF563304}" type="datetimeFigureOut">
               <a:rPr lang="en-US" smtClean="0"/>
-              <a:t>6/19/2019</a:t>
+              <a:t>6/20/2019</a:t>
             </a:fld>
             <a:endParaRPr lang="en-US"/>
           </a:p>
@@ -2727,7 +2902,7 @@
           <a:p>
             <a:fld id="{6BECA975-103C-4A17-81B4-E71ADF563304}" type="datetimeFigureOut">
               <a:rPr lang="en-US" smtClean="0"/>
-              <a:t>6/19/2019</a:t>
+              <a:t>6/20/2019</a:t>
             </a:fld>
             <a:endParaRPr lang="en-US"/>
           </a:p>
@@ -2925,7 +3100,7 @@
           <a:p>
             <a:fld id="{6BECA975-103C-4A17-81B4-E71ADF563304}" type="datetimeFigureOut">
               <a:rPr lang="en-US" smtClean="0"/>
-              <a:t>6/19/2019</a:t>
+              <a:t>6/20/2019</a:t>
             </a:fld>
             <a:endParaRPr lang="en-US"/>
           </a:p>
@@ -3200,7 +3375,7 @@
           <a:p>
             <a:fld id="{6BECA975-103C-4A17-81B4-E71ADF563304}" type="datetimeFigureOut">
               <a:rPr lang="en-US" smtClean="0"/>
-              <a:t>6/19/2019</a:t>
+              <a:t>6/20/2019</a:t>
             </a:fld>
             <a:endParaRPr lang="en-US"/>
           </a:p>
@@ -3465,7 +3640,7 @@
           <a:p>
             <a:fld id="{6BECA975-103C-4A17-81B4-E71ADF563304}" type="datetimeFigureOut">
               <a:rPr lang="en-US" smtClean="0"/>
-              <a:t>6/19/2019</a:t>
+              <a:t>6/20/2019</a:t>
             </a:fld>
             <a:endParaRPr lang="en-US"/>
           </a:p>
@@ -3877,7 +4052,7 @@
           <a:p>
             <a:fld id="{6BECA975-103C-4A17-81B4-E71ADF563304}" type="datetimeFigureOut">
               <a:rPr lang="en-US" smtClean="0"/>
-              <a:t>6/19/2019</a:t>
+              <a:t>6/20/2019</a:t>
             </a:fld>
             <a:endParaRPr lang="en-US"/>
           </a:p>
@@ -4018,7 +4193,7 @@
           <a:p>
             <a:fld id="{6BECA975-103C-4A17-81B4-E71ADF563304}" type="datetimeFigureOut">
               <a:rPr lang="en-US" smtClean="0"/>
-              <a:t>6/19/2019</a:t>
+              <a:t>6/20/2019</a:t>
             </a:fld>
             <a:endParaRPr lang="en-US"/>
           </a:p>
@@ -4131,7 +4306,7 @@
           <a:p>
             <a:fld id="{6BECA975-103C-4A17-81B4-E71ADF563304}" type="datetimeFigureOut">
               <a:rPr lang="en-US" smtClean="0"/>
-              <a:t>6/19/2019</a:t>
+              <a:t>6/20/2019</a:t>
             </a:fld>
             <a:endParaRPr lang="en-US"/>
           </a:p>
@@ -4442,7 +4617,7 @@
           <a:p>
             <a:fld id="{6BECA975-103C-4A17-81B4-E71ADF563304}" type="datetimeFigureOut">
               <a:rPr lang="en-US" smtClean="0"/>
-              <a:t>6/19/2019</a:t>
+              <a:t>6/20/2019</a:t>
             </a:fld>
             <a:endParaRPr lang="en-US"/>
           </a:p>
@@ -4730,7 +4905,7 @@
           <a:p>
             <a:fld id="{6BECA975-103C-4A17-81B4-E71ADF563304}" type="datetimeFigureOut">
               <a:rPr lang="en-US" smtClean="0"/>
-              <a:t>6/19/2019</a:t>
+              <a:t>6/20/2019</a:t>
             </a:fld>
             <a:endParaRPr lang="en-US"/>
           </a:p>
@@ -4971,7 +5146,7 @@
           <a:p>
             <a:fld id="{6BECA975-103C-4A17-81B4-E71ADF563304}" type="datetimeFigureOut">
               <a:rPr lang="en-US" smtClean="0"/>
-              <a:t>6/19/2019</a:t>
+              <a:t>6/20/2019</a:t>
             </a:fld>
             <a:endParaRPr lang="en-US"/>
           </a:p>
@@ -5571,6 +5746,341 @@
           <a:p>
             <a:r>
               <a:rPr lang="en-IE" dirty="0"/>
+              <a:t>Make a deposit</a:t>
+            </a:r>
+            <a:endParaRPr lang="en-US" dirty="0"/>
+          </a:p>
+        </p:txBody>
+      </p:sp>
+      <p:pic>
+        <p:nvPicPr>
+          <p:cNvPr id="3" name="Picture 2">
+            <a:extLst>
+              <a:ext uri="{FF2B5EF4-FFF2-40B4-BE49-F238E27FC236}">
+                <a16:creationId xmlns:a16="http://schemas.microsoft.com/office/drawing/2014/main" id="{9C2D67F8-4A34-4A96-959A-97647EF188D8}"/>
+              </a:ext>
+            </a:extLst>
+          </p:cNvPr>
+          <p:cNvPicPr>
+            <a:picLocks noChangeAspect="1"/>
+          </p:cNvPicPr>
+          <p:nvPr/>
+        </p:nvPicPr>
+        <p:blipFill>
+          <a:blip r:embed="rId3">
+            <a:extLst>
+              <a:ext uri="{28A0092B-C50C-407E-A947-70E740481C1C}">
+                <a14:useLocalDpi xmlns:a14="http://schemas.microsoft.com/office/drawing/2010/main" val="0"/>
+              </a:ext>
+              <a:ext uri="{837473B0-CC2E-450A-ABE3-18F120FF3D39}">
+                <a1611:picAttrSrcUrl xmlns:a1611="http://schemas.microsoft.com/office/drawing/2016/11/main" r:id="rId4"/>
+              </a:ext>
+            </a:extLst>
+          </a:blip>
+          <a:stretch>
+            <a:fillRect/>
+          </a:stretch>
+        </p:blipFill>
+        <p:spPr>
+          <a:xfrm>
+            <a:off x="10949305" y="137344"/>
+            <a:ext cx="1148189" cy="1050593"/>
+          </a:xfrm>
+          <a:prstGeom prst="rect">
+            <a:avLst/>
+          </a:prstGeom>
+        </p:spPr>
+      </p:pic>
+      <p:pic>
+        <p:nvPicPr>
+          <p:cNvPr id="4" name="Picture 3">
+            <a:extLst>
+              <a:ext uri="{FF2B5EF4-FFF2-40B4-BE49-F238E27FC236}">
+                <a16:creationId xmlns:a16="http://schemas.microsoft.com/office/drawing/2014/main" id="{29830141-D514-4A20-87F1-3DEED16DA445}"/>
+              </a:ext>
+            </a:extLst>
+          </p:cNvPr>
+          <p:cNvPicPr>
+            <a:picLocks noChangeAspect="1"/>
+          </p:cNvPicPr>
+          <p:nvPr/>
+        </p:nvPicPr>
+        <p:blipFill>
+          <a:blip r:embed="rId5"/>
+          <a:stretch>
+            <a:fillRect/>
+          </a:stretch>
+        </p:blipFill>
+        <p:spPr>
+          <a:xfrm>
+            <a:off x="838200" y="1338527"/>
+            <a:ext cx="9882692" cy="5519473"/>
+          </a:xfrm>
+          <a:prstGeom prst="rect">
+            <a:avLst/>
+          </a:prstGeom>
+          <a:ln>
+            <a:solidFill>
+              <a:schemeClr val="tx1"/>
+            </a:solidFill>
+          </a:ln>
+        </p:spPr>
+      </p:pic>
+    </p:spTree>
+    <p:extLst>
+      <p:ext uri="{BB962C8B-B14F-4D97-AF65-F5344CB8AC3E}">
+        <p14:creationId xmlns:p14="http://schemas.microsoft.com/office/powerpoint/2010/main" val="4123607407"/>
+      </p:ext>
+    </p:extLst>
+  </p:cSld>
+  <p:clrMapOvr>
+    <a:masterClrMapping/>
+  </p:clrMapOvr>
+  <p:timing>
+    <p:tnLst>
+      <p:par>
+        <p:cTn id="1" dur="indefinite" restart="never" nodeType="tmRoot">
+          <p:childTnLst>
+            <p:seq concurrent="1" nextAc="seek">
+              <p:cTn id="2" dur="indefinite" nodeType="mainSeq">
+                <p:childTnLst>
+                  <p:par>
+                    <p:cTn id="3" fill="hold">
+                      <p:stCondLst>
+                        <p:cond delay="indefinite"/>
+                        <p:cond evt="onBegin" delay="0">
+                          <p:tn val="2"/>
+                        </p:cond>
+                      </p:stCondLst>
+                      <p:childTnLst>
+                        <p:par>
+                          <p:cTn id="4" fill="hold">
+                            <p:stCondLst>
+                              <p:cond delay="0"/>
+                            </p:stCondLst>
+                            <p:childTnLst>
+                              <p:par>
+                                <p:cTn id="5" presetID="1" presetClass="entr" presetSubtype="0" fill="hold" nodeType="withEffect">
+                                  <p:stCondLst>
+                                    <p:cond delay="0"/>
+                                  </p:stCondLst>
+                                  <p:childTnLst>
+                                    <p:set>
+                                      <p:cBhvr>
+                                        <p:cTn id="6" dur="1" fill="hold">
+                                          <p:stCondLst>
+                                            <p:cond delay="0"/>
+                                          </p:stCondLst>
+                                        </p:cTn>
+                                        <p:tgtEl>
+                                          <p:spTgt spid="3"/>
+                                        </p:tgtEl>
+                                        <p:attrNameLst>
+                                          <p:attrName>style.visibility</p:attrName>
+                                        </p:attrNameLst>
+                                      </p:cBhvr>
+                                      <p:to>
+                                        <p:strVal val="visible"/>
+                                      </p:to>
+                                    </p:set>
+                                  </p:childTnLst>
+                                </p:cTn>
+                              </p:par>
+                            </p:childTnLst>
+                          </p:cTn>
+                        </p:par>
+                      </p:childTnLst>
+                    </p:cTn>
+                  </p:par>
+                </p:childTnLst>
+              </p:cTn>
+              <p:prevCondLst>
+                <p:cond evt="onPrev" delay="0">
+                  <p:tgtEl>
+                    <p:sldTgt/>
+                  </p:tgtEl>
+                </p:cond>
+              </p:prevCondLst>
+              <p:nextCondLst>
+                <p:cond evt="onNext" delay="0">
+                  <p:tgtEl>
+                    <p:sldTgt/>
+                  </p:tgtEl>
+                </p:cond>
+              </p:nextCondLst>
+            </p:seq>
+          </p:childTnLst>
+        </p:cTn>
+      </p:par>
+    </p:tnLst>
+  </p:timing>
+</p:sld>
+</file>
+
+<file path=ppt/slides/slide11.xml><?xml version="1.0" encoding="utf-8"?>
+<p:sld xmlns:a="http://schemas.openxmlformats.org/drawingml/2006/main" xmlns:r="http://schemas.openxmlformats.org/officeDocument/2006/relationships" xmlns:p="http://schemas.openxmlformats.org/presentationml/2006/main">
+  <p:cSld>
+    <p:spTree>
+      <p:nvGrpSpPr>
+        <p:cNvPr id="1" name=""/>
+        <p:cNvGrpSpPr/>
+        <p:nvPr/>
+      </p:nvGrpSpPr>
+      <p:grpSpPr>
+        <a:xfrm>
+          <a:off x="0" y="0"/>
+          <a:ext cx="0" cy="0"/>
+          <a:chOff x="0" y="0"/>
+          <a:chExt cx="0" cy="0"/>
+        </a:xfrm>
+      </p:grpSpPr>
+      <p:sp>
+        <p:nvSpPr>
+          <p:cNvPr id="2" name="Title 1">
+            <a:extLst>
+              <a:ext uri="{FF2B5EF4-FFF2-40B4-BE49-F238E27FC236}">
+                <a16:creationId xmlns:a16="http://schemas.microsoft.com/office/drawing/2014/main" id="{E6F3015D-6EE8-4540-8606-15AAF5130827}"/>
+              </a:ext>
+            </a:extLst>
+          </p:cNvPr>
+          <p:cNvSpPr>
+            <a:spLocks noGrp="1"/>
+          </p:cNvSpPr>
+          <p:nvPr>
+            <p:ph type="title"/>
+          </p:nvPr>
+        </p:nvSpPr>
+        <p:spPr/>
+        <p:txBody>
+          <a:bodyPr/>
+          <a:lstStyle/>
+          <a:p>
+            <a:r>
+              <a:rPr lang="en-IE" dirty="0"/>
+              <a:t>Make a deposit</a:t>
+            </a:r>
+            <a:endParaRPr lang="en-US" dirty="0"/>
+          </a:p>
+        </p:txBody>
+      </p:sp>
+      <p:pic>
+        <p:nvPicPr>
+          <p:cNvPr id="4" name="Picture 3">
+            <a:extLst>
+              <a:ext uri="{FF2B5EF4-FFF2-40B4-BE49-F238E27FC236}">
+                <a16:creationId xmlns:a16="http://schemas.microsoft.com/office/drawing/2014/main" id="{CB244C52-33DC-4B95-91CD-FC3CE83F3DD2}"/>
+              </a:ext>
+            </a:extLst>
+          </p:cNvPr>
+          <p:cNvPicPr>
+            <a:picLocks noChangeAspect="1"/>
+          </p:cNvPicPr>
+          <p:nvPr/>
+        </p:nvPicPr>
+        <p:blipFill>
+          <a:blip r:embed="rId3"/>
+          <a:stretch>
+            <a:fillRect/>
+          </a:stretch>
+        </p:blipFill>
+        <p:spPr>
+          <a:xfrm>
+            <a:off x="10610850" y="35352"/>
+            <a:ext cx="1581150" cy="1704975"/>
+          </a:xfrm>
+          <a:prstGeom prst="rect">
+            <a:avLst/>
+          </a:prstGeom>
+        </p:spPr>
+      </p:pic>
+      <p:pic>
+        <p:nvPicPr>
+          <p:cNvPr id="3" name="Picture 2">
+            <a:extLst>
+              <a:ext uri="{FF2B5EF4-FFF2-40B4-BE49-F238E27FC236}">
+                <a16:creationId xmlns:a16="http://schemas.microsoft.com/office/drawing/2014/main" id="{1F634144-EADA-4D84-85D7-E91C17F3FAE0}"/>
+              </a:ext>
+            </a:extLst>
+          </p:cNvPr>
+          <p:cNvPicPr>
+            <a:picLocks noChangeAspect="1"/>
+          </p:cNvPicPr>
+          <p:nvPr/>
+        </p:nvPicPr>
+        <p:blipFill>
+          <a:blip r:embed="rId4"/>
+          <a:stretch>
+            <a:fillRect/>
+          </a:stretch>
+        </p:blipFill>
+        <p:spPr>
+          <a:xfrm>
+            <a:off x="2085060" y="1484910"/>
+            <a:ext cx="7600116" cy="5077321"/>
+          </a:xfrm>
+          <a:prstGeom prst="rect">
+            <a:avLst/>
+          </a:prstGeom>
+          <a:ln>
+            <a:solidFill>
+              <a:schemeClr val="tx1"/>
+            </a:solidFill>
+          </a:ln>
+        </p:spPr>
+      </p:pic>
+    </p:spTree>
+    <p:extLst>
+      <p:ext uri="{BB962C8B-B14F-4D97-AF65-F5344CB8AC3E}">
+        <p14:creationId xmlns:p14="http://schemas.microsoft.com/office/powerpoint/2010/main" val="2447301394"/>
+      </p:ext>
+    </p:extLst>
+  </p:cSld>
+  <p:clrMapOvr>
+    <a:masterClrMapping/>
+  </p:clrMapOvr>
+</p:sld>
+</file>
+
+<file path=ppt/slides/slide12.xml><?xml version="1.0" encoding="utf-8"?>
+<p:sld xmlns:a="http://schemas.openxmlformats.org/drawingml/2006/main" xmlns:r="http://schemas.openxmlformats.org/officeDocument/2006/relationships" xmlns:p="http://schemas.openxmlformats.org/presentationml/2006/main">
+  <p:cSld>
+    <p:spTree>
+      <p:nvGrpSpPr>
+        <p:cNvPr id="1" name=""/>
+        <p:cNvGrpSpPr/>
+        <p:nvPr/>
+      </p:nvGrpSpPr>
+      <p:grpSpPr>
+        <a:xfrm>
+          <a:off x="0" y="0"/>
+          <a:ext cx="0" cy="0"/>
+          <a:chOff x="0" y="0"/>
+          <a:chExt cx="0" cy="0"/>
+        </a:xfrm>
+      </p:grpSpPr>
+      <p:sp>
+        <p:nvSpPr>
+          <p:cNvPr id="2" name="Title 1">
+            <a:extLst>
+              <a:ext uri="{FF2B5EF4-FFF2-40B4-BE49-F238E27FC236}">
+                <a16:creationId xmlns:a16="http://schemas.microsoft.com/office/drawing/2014/main" id="{E6F3015D-6EE8-4540-8606-15AAF5130827}"/>
+              </a:ext>
+            </a:extLst>
+          </p:cNvPr>
+          <p:cNvSpPr>
+            <a:spLocks noGrp="1"/>
+          </p:cNvSpPr>
+          <p:nvPr>
+            <p:ph type="title"/>
+          </p:nvPr>
+        </p:nvSpPr>
+        <p:spPr/>
+        <p:txBody>
+          <a:bodyPr/>
+          <a:lstStyle/>
+          <a:p>
+            <a:r>
+              <a:rPr lang="en-IE" dirty="0"/>
               <a:t>Get the balance</a:t>
             </a:r>
             <a:endParaRPr lang="en-US" dirty="0"/>
@@ -5752,7 +6262,7 @@
 </p:sld>
 </file>
 
-<file path=ppt/slides/slide11.xml><?xml version="1.0" encoding="utf-8"?>
+<file path=ppt/slides/slide13.xml><?xml version="1.0" encoding="utf-8"?>
 <p:sld xmlns:a="http://schemas.openxmlformats.org/drawingml/2006/main" xmlns:r="http://schemas.openxmlformats.org/officeDocument/2006/relationships" xmlns:p="http://schemas.openxmlformats.org/presentationml/2006/main">
   <p:cSld>
     <p:spTree>
@@ -5963,7 +6473,7 @@
 </p:sld>
 </file>
 
-<file path=ppt/slides/slide12.xml><?xml version="1.0" encoding="utf-8"?>
+<file path=ppt/slides/slide14.xml><?xml version="1.0" encoding="utf-8"?>
 <p:sld xmlns:a="http://schemas.openxmlformats.org/drawingml/2006/main" xmlns:r="http://schemas.openxmlformats.org/officeDocument/2006/relationships" xmlns:p="http://schemas.openxmlformats.org/presentationml/2006/main">
   <p:cSld>
     <p:spTree>
@@ -6174,7 +6684,7 @@
 </p:sld>
 </file>
 
-<file path=ppt/slides/slide13.xml><?xml version="1.0" encoding="utf-8"?>
+<file path=ppt/slides/slide15.xml><?xml version="1.0" encoding="utf-8"?>
 <p:sld xmlns:a="http://schemas.openxmlformats.org/drawingml/2006/main" xmlns:r="http://schemas.openxmlformats.org/officeDocument/2006/relationships" xmlns:p="http://schemas.openxmlformats.org/presentationml/2006/main">
   <p:cSld>
     <p:spTree>
@@ -6385,7 +6895,7 @@
 </p:sld>
 </file>
 
-<file path=ppt/slides/slide14.xml><?xml version="1.0" encoding="utf-8"?>
+<file path=ppt/slides/slide16.xml><?xml version="1.0" encoding="utf-8"?>
 <p:sld xmlns:a="http://schemas.openxmlformats.org/drawingml/2006/main" xmlns:r="http://schemas.openxmlformats.org/officeDocument/2006/relationships" xmlns:p="http://schemas.openxmlformats.org/presentationml/2006/main">
   <p:cSld>
     <p:spTree>
@@ -6509,7 +7019,7 @@
 </p:sld>
 </file>
 
-<file path=ppt/slides/slide15.xml><?xml version="1.0" encoding="utf-8"?>
+<file path=ppt/slides/slide17.xml><?xml version="1.0" encoding="utf-8"?>
 <p:sld xmlns:a="http://schemas.openxmlformats.org/drawingml/2006/main" xmlns:r="http://schemas.openxmlformats.org/officeDocument/2006/relationships" xmlns:p="http://schemas.openxmlformats.org/presentationml/2006/main">
   <p:cSld>
     <p:spTree>
@@ -6975,7 +7485,7 @@
 </p:sld>
 </file>
 
-<file path=ppt/slides/slide16.xml><?xml version="1.0" encoding="utf-8"?>
+<file path=ppt/slides/slide18.xml><?xml version="1.0" encoding="utf-8"?>
 <p:sld xmlns:a="http://schemas.openxmlformats.org/drawingml/2006/main" xmlns:r="http://schemas.openxmlformats.org/officeDocument/2006/relationships" xmlns:p="http://schemas.openxmlformats.org/presentationml/2006/main">
   <p:cSld>
     <p:spTree>
@@ -7186,7 +7696,7 @@
 </p:sld>
 </file>
 
-<file path=ppt/slides/slide17.xml><?xml version="1.0" encoding="utf-8"?>
+<file path=ppt/slides/slide19.xml><?xml version="1.0" encoding="utf-8"?>
 <p:sld xmlns:a="http://schemas.openxmlformats.org/drawingml/2006/main" xmlns:r="http://schemas.openxmlformats.org/officeDocument/2006/relationships" xmlns:p="http://schemas.openxmlformats.org/presentationml/2006/main">
   <p:cSld>
     <p:spTree>
@@ -7556,7 +8066,294 @@
 </p:sld>
 </file>
 
-<file path=ppt/slides/slide18.xml><?xml version="1.0" encoding="utf-8"?>
+<file path=ppt/slides/slide2.xml><?xml version="1.0" encoding="utf-8"?>
+<p:sld xmlns:a="http://schemas.openxmlformats.org/drawingml/2006/main" xmlns:r="http://schemas.openxmlformats.org/officeDocument/2006/relationships" xmlns:p="http://schemas.openxmlformats.org/presentationml/2006/main">
+  <p:cSld>
+    <p:spTree>
+      <p:nvGrpSpPr>
+        <p:cNvPr id="1" name=""/>
+        <p:cNvGrpSpPr/>
+        <p:nvPr/>
+      </p:nvGrpSpPr>
+      <p:grpSpPr>
+        <a:xfrm>
+          <a:off x="0" y="0"/>
+          <a:ext cx="0" cy="0"/>
+          <a:chOff x="0" y="0"/>
+          <a:chExt cx="0" cy="0"/>
+        </a:xfrm>
+      </p:grpSpPr>
+      <p:sp>
+        <p:nvSpPr>
+          <p:cNvPr id="2" name="Title 1">
+            <a:extLst>
+              <a:ext uri="{FF2B5EF4-FFF2-40B4-BE49-F238E27FC236}">
+                <a16:creationId xmlns:a16="http://schemas.microsoft.com/office/drawing/2014/main" id="{E6F3015D-6EE8-4540-8606-15AAF5130827}"/>
+              </a:ext>
+            </a:extLst>
+          </p:cNvPr>
+          <p:cNvSpPr>
+            <a:spLocks noGrp="1"/>
+          </p:cNvSpPr>
+          <p:nvPr>
+            <p:ph type="title"/>
+          </p:nvPr>
+        </p:nvSpPr>
+        <p:spPr/>
+        <p:txBody>
+          <a:bodyPr/>
+          <a:lstStyle/>
+          <a:p>
+            <a:r>
+              <a:rPr lang="en-IE" dirty="0"/>
+              <a:t>Open a new account</a:t>
+            </a:r>
+            <a:endParaRPr lang="en-US" dirty="0"/>
+          </a:p>
+        </p:txBody>
+      </p:sp>
+      <p:pic>
+        <p:nvPicPr>
+          <p:cNvPr id="4" name="Picture 3">
+            <a:extLst>
+              <a:ext uri="{FF2B5EF4-FFF2-40B4-BE49-F238E27FC236}">
+                <a16:creationId xmlns:a16="http://schemas.microsoft.com/office/drawing/2014/main" id="{ECADDDDB-0834-4DB5-8FC9-55D9296D98CF}"/>
+              </a:ext>
+            </a:extLst>
+          </p:cNvPr>
+          <p:cNvPicPr>
+            <a:picLocks noChangeAspect="1"/>
+          </p:cNvPicPr>
+          <p:nvPr/>
+        </p:nvPicPr>
+        <p:blipFill>
+          <a:blip r:embed="rId3"/>
+          <a:stretch>
+            <a:fillRect/>
+          </a:stretch>
+        </p:blipFill>
+        <p:spPr>
+          <a:xfrm>
+            <a:off x="11149989" y="68751"/>
+            <a:ext cx="942975" cy="1171575"/>
+          </a:xfrm>
+          <a:prstGeom prst="rect">
+            <a:avLst/>
+          </a:prstGeom>
+        </p:spPr>
+      </p:pic>
+      <p:pic>
+        <p:nvPicPr>
+          <p:cNvPr id="3" name="Picture 2">
+            <a:extLst>
+              <a:ext uri="{FF2B5EF4-FFF2-40B4-BE49-F238E27FC236}">
+                <a16:creationId xmlns:a16="http://schemas.microsoft.com/office/drawing/2014/main" id="{540BE999-9F03-47EC-9123-2F23BCB13B18}"/>
+              </a:ext>
+            </a:extLst>
+          </p:cNvPr>
+          <p:cNvPicPr>
+            <a:picLocks noChangeAspect="1"/>
+          </p:cNvPicPr>
+          <p:nvPr/>
+        </p:nvPicPr>
+        <p:blipFill>
+          <a:blip r:embed="rId4"/>
+          <a:stretch>
+            <a:fillRect/>
+          </a:stretch>
+        </p:blipFill>
+        <p:spPr>
+          <a:xfrm>
+            <a:off x="955799" y="1987062"/>
+            <a:ext cx="626511" cy="828196"/>
+          </a:xfrm>
+          <a:prstGeom prst="rect">
+            <a:avLst/>
+          </a:prstGeom>
+        </p:spPr>
+      </p:pic>
+      <p:sp>
+        <p:nvSpPr>
+          <p:cNvPr id="5" name="TextBox 4">
+            <a:extLst>
+              <a:ext uri="{FF2B5EF4-FFF2-40B4-BE49-F238E27FC236}">
+                <a16:creationId xmlns:a16="http://schemas.microsoft.com/office/drawing/2014/main" id="{877C0F03-748E-40BC-93BC-A386E94AA041}"/>
+              </a:ext>
+            </a:extLst>
+          </p:cNvPr>
+          <p:cNvSpPr txBox="1"/>
+          <p:nvPr/>
+        </p:nvSpPr>
+        <p:spPr>
+          <a:xfrm>
+            <a:off x="1685676" y="2216494"/>
+            <a:ext cx="3740896" cy="369332"/>
+          </a:xfrm>
+          <a:prstGeom prst="rect">
+            <a:avLst/>
+          </a:prstGeom>
+          <a:noFill/>
+        </p:spPr>
+        <p:txBody>
+          <a:bodyPr wrap="none" rtlCol="0">
+            <a:spAutoFit/>
+          </a:bodyPr>
+          <a:lstStyle/>
+          <a:p>
+            <a:r>
+              <a:rPr lang="en-IE" dirty="0"/>
+              <a:t>Each account number must be unique</a:t>
+            </a:r>
+            <a:endParaRPr lang="en-GB" dirty="0"/>
+          </a:p>
+        </p:txBody>
+      </p:sp>
+      <p:pic>
+        <p:nvPicPr>
+          <p:cNvPr id="6" name="Picture 5">
+            <a:extLst>
+              <a:ext uri="{FF2B5EF4-FFF2-40B4-BE49-F238E27FC236}">
+                <a16:creationId xmlns:a16="http://schemas.microsoft.com/office/drawing/2014/main" id="{E018DBB9-173C-4791-B9A4-E6BAB57847EB}"/>
+              </a:ext>
+            </a:extLst>
+          </p:cNvPr>
+          <p:cNvPicPr>
+            <a:picLocks noChangeAspect="1"/>
+          </p:cNvPicPr>
+          <p:nvPr/>
+        </p:nvPicPr>
+        <p:blipFill>
+          <a:blip r:embed="rId5"/>
+          <a:stretch>
+            <a:fillRect/>
+          </a:stretch>
+        </p:blipFill>
+        <p:spPr>
+          <a:xfrm>
+            <a:off x="883237" y="3429000"/>
+            <a:ext cx="771633" cy="762106"/>
+          </a:xfrm>
+          <a:prstGeom prst="rect">
+            <a:avLst/>
+          </a:prstGeom>
+        </p:spPr>
+      </p:pic>
+      <p:sp>
+        <p:nvSpPr>
+          <p:cNvPr id="7" name="TextBox 6">
+            <a:extLst>
+              <a:ext uri="{FF2B5EF4-FFF2-40B4-BE49-F238E27FC236}">
+                <a16:creationId xmlns:a16="http://schemas.microsoft.com/office/drawing/2014/main" id="{573A4031-9B3E-4479-A792-1FF25F2A2F69}"/>
+              </a:ext>
+            </a:extLst>
+          </p:cNvPr>
+          <p:cNvSpPr txBox="1"/>
+          <p:nvPr/>
+        </p:nvSpPr>
+        <p:spPr>
+          <a:xfrm>
+            <a:off x="1685676" y="3625387"/>
+            <a:ext cx="3225627" cy="369332"/>
+          </a:xfrm>
+          <a:prstGeom prst="rect">
+            <a:avLst/>
+          </a:prstGeom>
+          <a:noFill/>
+        </p:spPr>
+        <p:txBody>
+          <a:bodyPr wrap="none" rtlCol="0">
+            <a:spAutoFit/>
+          </a:bodyPr>
+          <a:lstStyle/>
+          <a:p>
+            <a:r>
+              <a:rPr lang="en-IE" dirty="0"/>
+              <a:t>Initial deposit amount (optional)</a:t>
+            </a:r>
+            <a:endParaRPr lang="en-GB" dirty="0"/>
+          </a:p>
+        </p:txBody>
+      </p:sp>
+      <p:pic>
+        <p:nvPicPr>
+          <p:cNvPr id="8" name="Picture 7">
+            <a:extLst>
+              <a:ext uri="{FF2B5EF4-FFF2-40B4-BE49-F238E27FC236}">
+                <a16:creationId xmlns:a16="http://schemas.microsoft.com/office/drawing/2014/main" id="{C15B4EFD-EDA1-40FC-889C-245E52C04376}"/>
+              </a:ext>
+            </a:extLst>
+          </p:cNvPr>
+          <p:cNvPicPr>
+            <a:picLocks noChangeAspect="1"/>
+          </p:cNvPicPr>
+          <p:nvPr/>
+        </p:nvPicPr>
+        <p:blipFill>
+          <a:blip r:embed="rId5"/>
+          <a:stretch>
+            <a:fillRect/>
+          </a:stretch>
+        </p:blipFill>
+        <p:spPr>
+          <a:xfrm>
+            <a:off x="883237" y="4305357"/>
+            <a:ext cx="771633" cy="762106"/>
+          </a:xfrm>
+          <a:prstGeom prst="rect">
+            <a:avLst/>
+          </a:prstGeom>
+        </p:spPr>
+      </p:pic>
+      <p:sp>
+        <p:nvSpPr>
+          <p:cNvPr id="9" name="TextBox 8">
+            <a:extLst>
+              <a:ext uri="{FF2B5EF4-FFF2-40B4-BE49-F238E27FC236}">
+                <a16:creationId xmlns:a16="http://schemas.microsoft.com/office/drawing/2014/main" id="{038ED28D-B52A-43F2-8BF7-63F51A54E050}"/>
+              </a:ext>
+            </a:extLst>
+          </p:cNvPr>
+          <p:cNvSpPr txBox="1"/>
+          <p:nvPr/>
+        </p:nvSpPr>
+        <p:spPr>
+          <a:xfrm>
+            <a:off x="1685676" y="4501744"/>
+            <a:ext cx="2789225" cy="369332"/>
+          </a:xfrm>
+          <a:prstGeom prst="rect">
+            <a:avLst/>
+          </a:prstGeom>
+          <a:noFill/>
+        </p:spPr>
+        <p:txBody>
+          <a:bodyPr wrap="none" rtlCol="0">
+            <a:spAutoFit/>
+          </a:bodyPr>
+          <a:lstStyle/>
+          <a:p>
+            <a:r>
+              <a:rPr lang="en-IE" dirty="0"/>
+              <a:t>Beneficiary name (optional)</a:t>
+            </a:r>
+            <a:endParaRPr lang="en-GB" dirty="0"/>
+          </a:p>
+        </p:txBody>
+      </p:sp>
+    </p:spTree>
+    <p:extLst>
+      <p:ext uri="{BB962C8B-B14F-4D97-AF65-F5344CB8AC3E}">
+        <p14:creationId xmlns:p14="http://schemas.microsoft.com/office/powerpoint/2010/main" val="2652793678"/>
+      </p:ext>
+    </p:extLst>
+  </p:cSld>
+  <p:clrMapOvr>
+    <a:masterClrMapping/>
+  </p:clrMapOvr>
+</p:sld>
+</file>
+
+<file path=ppt/slides/slide20.xml><?xml version="1.0" encoding="utf-8"?>
 <p:sld xmlns:a="http://schemas.openxmlformats.org/drawingml/2006/main" xmlns:r="http://schemas.openxmlformats.org/officeDocument/2006/relationships" xmlns:p="http://schemas.openxmlformats.org/presentationml/2006/main">
   <p:cSld>
     <p:spTree>
@@ -7671,293 +8468,6 @@
     <p:extLst>
       <p:ext uri="{BB962C8B-B14F-4D97-AF65-F5344CB8AC3E}">
         <p14:creationId xmlns:p14="http://schemas.microsoft.com/office/powerpoint/2010/main" val="1923779133"/>
-      </p:ext>
-    </p:extLst>
-  </p:cSld>
-  <p:clrMapOvr>
-    <a:masterClrMapping/>
-  </p:clrMapOvr>
-</p:sld>
-</file>
-
-<file path=ppt/slides/slide2.xml><?xml version="1.0" encoding="utf-8"?>
-<p:sld xmlns:a="http://schemas.openxmlformats.org/drawingml/2006/main" xmlns:r="http://schemas.openxmlformats.org/officeDocument/2006/relationships" xmlns:p="http://schemas.openxmlformats.org/presentationml/2006/main">
-  <p:cSld>
-    <p:spTree>
-      <p:nvGrpSpPr>
-        <p:cNvPr id="1" name=""/>
-        <p:cNvGrpSpPr/>
-        <p:nvPr/>
-      </p:nvGrpSpPr>
-      <p:grpSpPr>
-        <a:xfrm>
-          <a:off x="0" y="0"/>
-          <a:ext cx="0" cy="0"/>
-          <a:chOff x="0" y="0"/>
-          <a:chExt cx="0" cy="0"/>
-        </a:xfrm>
-      </p:grpSpPr>
-      <p:sp>
-        <p:nvSpPr>
-          <p:cNvPr id="2" name="Title 1">
-            <a:extLst>
-              <a:ext uri="{FF2B5EF4-FFF2-40B4-BE49-F238E27FC236}">
-                <a16:creationId xmlns:a16="http://schemas.microsoft.com/office/drawing/2014/main" id="{E6F3015D-6EE8-4540-8606-15AAF5130827}"/>
-              </a:ext>
-            </a:extLst>
-          </p:cNvPr>
-          <p:cNvSpPr>
-            <a:spLocks noGrp="1"/>
-          </p:cNvSpPr>
-          <p:nvPr>
-            <p:ph type="title"/>
-          </p:nvPr>
-        </p:nvSpPr>
-        <p:spPr/>
-        <p:txBody>
-          <a:bodyPr/>
-          <a:lstStyle/>
-          <a:p>
-            <a:r>
-              <a:rPr lang="en-IE" dirty="0"/>
-              <a:t>Open a new account</a:t>
-            </a:r>
-            <a:endParaRPr lang="en-US" dirty="0"/>
-          </a:p>
-        </p:txBody>
-      </p:sp>
-      <p:pic>
-        <p:nvPicPr>
-          <p:cNvPr id="4" name="Picture 3">
-            <a:extLst>
-              <a:ext uri="{FF2B5EF4-FFF2-40B4-BE49-F238E27FC236}">
-                <a16:creationId xmlns:a16="http://schemas.microsoft.com/office/drawing/2014/main" id="{ECADDDDB-0834-4DB5-8FC9-55D9296D98CF}"/>
-              </a:ext>
-            </a:extLst>
-          </p:cNvPr>
-          <p:cNvPicPr>
-            <a:picLocks noChangeAspect="1"/>
-          </p:cNvPicPr>
-          <p:nvPr/>
-        </p:nvPicPr>
-        <p:blipFill>
-          <a:blip r:embed="rId3"/>
-          <a:stretch>
-            <a:fillRect/>
-          </a:stretch>
-        </p:blipFill>
-        <p:spPr>
-          <a:xfrm>
-            <a:off x="11149989" y="68751"/>
-            <a:ext cx="942975" cy="1171575"/>
-          </a:xfrm>
-          <a:prstGeom prst="rect">
-            <a:avLst/>
-          </a:prstGeom>
-        </p:spPr>
-      </p:pic>
-      <p:pic>
-        <p:nvPicPr>
-          <p:cNvPr id="3" name="Picture 2">
-            <a:extLst>
-              <a:ext uri="{FF2B5EF4-FFF2-40B4-BE49-F238E27FC236}">
-                <a16:creationId xmlns:a16="http://schemas.microsoft.com/office/drawing/2014/main" id="{540BE999-9F03-47EC-9123-2F23BCB13B18}"/>
-              </a:ext>
-            </a:extLst>
-          </p:cNvPr>
-          <p:cNvPicPr>
-            <a:picLocks noChangeAspect="1"/>
-          </p:cNvPicPr>
-          <p:nvPr/>
-        </p:nvPicPr>
-        <p:blipFill>
-          <a:blip r:embed="rId4"/>
-          <a:stretch>
-            <a:fillRect/>
-          </a:stretch>
-        </p:blipFill>
-        <p:spPr>
-          <a:xfrm>
-            <a:off x="955799" y="1987062"/>
-            <a:ext cx="626511" cy="828196"/>
-          </a:xfrm>
-          <a:prstGeom prst="rect">
-            <a:avLst/>
-          </a:prstGeom>
-        </p:spPr>
-      </p:pic>
-      <p:sp>
-        <p:nvSpPr>
-          <p:cNvPr id="5" name="TextBox 4">
-            <a:extLst>
-              <a:ext uri="{FF2B5EF4-FFF2-40B4-BE49-F238E27FC236}">
-                <a16:creationId xmlns:a16="http://schemas.microsoft.com/office/drawing/2014/main" id="{877C0F03-748E-40BC-93BC-A386E94AA041}"/>
-              </a:ext>
-            </a:extLst>
-          </p:cNvPr>
-          <p:cNvSpPr txBox="1"/>
-          <p:nvPr/>
-        </p:nvSpPr>
-        <p:spPr>
-          <a:xfrm>
-            <a:off x="1685676" y="2216494"/>
-            <a:ext cx="3740896" cy="369332"/>
-          </a:xfrm>
-          <a:prstGeom prst="rect">
-            <a:avLst/>
-          </a:prstGeom>
-          <a:noFill/>
-        </p:spPr>
-        <p:txBody>
-          <a:bodyPr wrap="none" rtlCol="0">
-            <a:spAutoFit/>
-          </a:bodyPr>
-          <a:lstStyle/>
-          <a:p>
-            <a:r>
-              <a:rPr lang="en-IE" dirty="0"/>
-              <a:t>Each account number must be unique</a:t>
-            </a:r>
-            <a:endParaRPr lang="en-GB" dirty="0"/>
-          </a:p>
-        </p:txBody>
-      </p:sp>
-      <p:pic>
-        <p:nvPicPr>
-          <p:cNvPr id="6" name="Picture 5">
-            <a:extLst>
-              <a:ext uri="{FF2B5EF4-FFF2-40B4-BE49-F238E27FC236}">
-                <a16:creationId xmlns:a16="http://schemas.microsoft.com/office/drawing/2014/main" id="{E018DBB9-173C-4791-B9A4-E6BAB57847EB}"/>
-              </a:ext>
-            </a:extLst>
-          </p:cNvPr>
-          <p:cNvPicPr>
-            <a:picLocks noChangeAspect="1"/>
-          </p:cNvPicPr>
-          <p:nvPr/>
-        </p:nvPicPr>
-        <p:blipFill>
-          <a:blip r:embed="rId5"/>
-          <a:stretch>
-            <a:fillRect/>
-          </a:stretch>
-        </p:blipFill>
-        <p:spPr>
-          <a:xfrm>
-            <a:off x="883237" y="3429000"/>
-            <a:ext cx="771633" cy="762106"/>
-          </a:xfrm>
-          <a:prstGeom prst="rect">
-            <a:avLst/>
-          </a:prstGeom>
-        </p:spPr>
-      </p:pic>
-      <p:sp>
-        <p:nvSpPr>
-          <p:cNvPr id="7" name="TextBox 6">
-            <a:extLst>
-              <a:ext uri="{FF2B5EF4-FFF2-40B4-BE49-F238E27FC236}">
-                <a16:creationId xmlns:a16="http://schemas.microsoft.com/office/drawing/2014/main" id="{573A4031-9B3E-4479-A792-1FF25F2A2F69}"/>
-              </a:ext>
-            </a:extLst>
-          </p:cNvPr>
-          <p:cNvSpPr txBox="1"/>
-          <p:nvPr/>
-        </p:nvSpPr>
-        <p:spPr>
-          <a:xfrm>
-            <a:off x="1685676" y="3625387"/>
-            <a:ext cx="3225627" cy="369332"/>
-          </a:xfrm>
-          <a:prstGeom prst="rect">
-            <a:avLst/>
-          </a:prstGeom>
-          <a:noFill/>
-        </p:spPr>
-        <p:txBody>
-          <a:bodyPr wrap="none" rtlCol="0">
-            <a:spAutoFit/>
-          </a:bodyPr>
-          <a:lstStyle/>
-          <a:p>
-            <a:r>
-              <a:rPr lang="en-IE" dirty="0"/>
-              <a:t>Initial deposit amount (optional)</a:t>
-            </a:r>
-            <a:endParaRPr lang="en-GB" dirty="0"/>
-          </a:p>
-        </p:txBody>
-      </p:sp>
-      <p:pic>
-        <p:nvPicPr>
-          <p:cNvPr id="8" name="Picture 7">
-            <a:extLst>
-              <a:ext uri="{FF2B5EF4-FFF2-40B4-BE49-F238E27FC236}">
-                <a16:creationId xmlns:a16="http://schemas.microsoft.com/office/drawing/2014/main" id="{C15B4EFD-EDA1-40FC-889C-245E52C04376}"/>
-              </a:ext>
-            </a:extLst>
-          </p:cNvPr>
-          <p:cNvPicPr>
-            <a:picLocks noChangeAspect="1"/>
-          </p:cNvPicPr>
-          <p:nvPr/>
-        </p:nvPicPr>
-        <p:blipFill>
-          <a:blip r:embed="rId5"/>
-          <a:stretch>
-            <a:fillRect/>
-          </a:stretch>
-        </p:blipFill>
-        <p:spPr>
-          <a:xfrm>
-            <a:off x="883237" y="4305357"/>
-            <a:ext cx="771633" cy="762106"/>
-          </a:xfrm>
-          <a:prstGeom prst="rect">
-            <a:avLst/>
-          </a:prstGeom>
-        </p:spPr>
-      </p:pic>
-      <p:sp>
-        <p:nvSpPr>
-          <p:cNvPr id="9" name="TextBox 8">
-            <a:extLst>
-              <a:ext uri="{FF2B5EF4-FFF2-40B4-BE49-F238E27FC236}">
-                <a16:creationId xmlns:a16="http://schemas.microsoft.com/office/drawing/2014/main" id="{038ED28D-B52A-43F2-8BF7-63F51A54E050}"/>
-              </a:ext>
-            </a:extLst>
-          </p:cNvPr>
-          <p:cNvSpPr txBox="1"/>
-          <p:nvPr/>
-        </p:nvSpPr>
-        <p:spPr>
-          <a:xfrm>
-            <a:off x="1685676" y="4501744"/>
-            <a:ext cx="2789225" cy="369332"/>
-          </a:xfrm>
-          <a:prstGeom prst="rect">
-            <a:avLst/>
-          </a:prstGeom>
-          <a:noFill/>
-        </p:spPr>
-        <p:txBody>
-          <a:bodyPr wrap="none" rtlCol="0">
-            <a:spAutoFit/>
-          </a:bodyPr>
-          <a:lstStyle/>
-          <a:p>
-            <a:r>
-              <a:rPr lang="en-IE" dirty="0"/>
-              <a:t>Beneficiary name (optional)</a:t>
-            </a:r>
-            <a:endParaRPr lang="en-GB" dirty="0"/>
-          </a:p>
-        </p:txBody>
-      </p:sp>
-    </p:spTree>
-    <p:extLst>
-      <p:ext uri="{BB962C8B-B14F-4D97-AF65-F5344CB8AC3E}">
-        <p14:creationId xmlns:p14="http://schemas.microsoft.com/office/powerpoint/2010/main" val="2652793678"/>
       </p:ext>
     </p:extLst>
   </p:cSld>
@@ -8982,6 +9492,130 @@
           </a:ln>
         </p:spPr>
       </p:pic>
+    </p:spTree>
+    <p:extLst>
+      <p:ext uri="{BB962C8B-B14F-4D97-AF65-F5344CB8AC3E}">
+        <p14:creationId xmlns:p14="http://schemas.microsoft.com/office/powerpoint/2010/main" val="4113381986"/>
+      </p:ext>
+    </p:extLst>
+  </p:cSld>
+  <p:clrMapOvr>
+    <a:masterClrMapping/>
+  </p:clrMapOvr>
+</p:sld>
+</file>
+
+<file path=ppt/slides/slide7.xml><?xml version="1.0" encoding="utf-8"?>
+<p:sld xmlns:a="http://schemas.openxmlformats.org/drawingml/2006/main" xmlns:r="http://schemas.openxmlformats.org/officeDocument/2006/relationships" xmlns:p="http://schemas.openxmlformats.org/presentationml/2006/main">
+  <p:cSld>
+    <p:spTree>
+      <p:nvGrpSpPr>
+        <p:cNvPr id="1" name=""/>
+        <p:cNvGrpSpPr/>
+        <p:nvPr/>
+      </p:nvGrpSpPr>
+      <p:grpSpPr>
+        <a:xfrm>
+          <a:off x="0" y="0"/>
+          <a:ext cx="0" cy="0"/>
+          <a:chOff x="0" y="0"/>
+          <a:chExt cx="0" cy="0"/>
+        </a:xfrm>
+      </p:grpSpPr>
+      <p:sp>
+        <p:nvSpPr>
+          <p:cNvPr id="2" name="Title 1">
+            <a:extLst>
+              <a:ext uri="{FF2B5EF4-FFF2-40B4-BE49-F238E27FC236}">
+                <a16:creationId xmlns:a16="http://schemas.microsoft.com/office/drawing/2014/main" id="{E6F3015D-6EE8-4540-8606-15AAF5130827}"/>
+              </a:ext>
+            </a:extLst>
+          </p:cNvPr>
+          <p:cNvSpPr>
+            <a:spLocks noGrp="1"/>
+          </p:cNvSpPr>
+          <p:nvPr>
+            <p:ph type="title"/>
+          </p:nvPr>
+        </p:nvSpPr>
+        <p:spPr/>
+        <p:txBody>
+          <a:bodyPr/>
+          <a:lstStyle/>
+          <a:p>
+            <a:r>
+              <a:rPr lang="en-IE" dirty="0"/>
+              <a:t>Open a new account</a:t>
+            </a:r>
+            <a:endParaRPr lang="en-US" dirty="0"/>
+          </a:p>
+        </p:txBody>
+      </p:sp>
+      <p:pic>
+        <p:nvPicPr>
+          <p:cNvPr id="4" name="Picture 3">
+            <a:extLst>
+              <a:ext uri="{FF2B5EF4-FFF2-40B4-BE49-F238E27FC236}">
+                <a16:creationId xmlns:a16="http://schemas.microsoft.com/office/drawing/2014/main" id="{CB244C52-33DC-4B95-91CD-FC3CE83F3DD2}"/>
+              </a:ext>
+            </a:extLst>
+          </p:cNvPr>
+          <p:cNvPicPr>
+            <a:picLocks noChangeAspect="1"/>
+          </p:cNvPicPr>
+          <p:nvPr/>
+        </p:nvPicPr>
+        <p:blipFill>
+          <a:blip r:embed="rId3"/>
+          <a:stretch>
+            <a:fillRect/>
+          </a:stretch>
+        </p:blipFill>
+        <p:spPr>
+          <a:xfrm>
+            <a:off x="10610850" y="35352"/>
+            <a:ext cx="1581150" cy="1704975"/>
+          </a:xfrm>
+          <a:prstGeom prst="rect">
+            <a:avLst/>
+          </a:prstGeom>
+        </p:spPr>
+      </p:pic>
+      <p:pic>
+        <p:nvPicPr>
+          <p:cNvPr id="3" name="Picture 2">
+            <a:extLst>
+              <a:ext uri="{FF2B5EF4-FFF2-40B4-BE49-F238E27FC236}">
+                <a16:creationId xmlns:a16="http://schemas.microsoft.com/office/drawing/2014/main" id="{B53C1333-EE80-4635-B13A-8E1DF0C463C1}"/>
+              </a:ext>
+            </a:extLst>
+          </p:cNvPr>
+          <p:cNvPicPr>
+            <a:picLocks noChangeAspect="1"/>
+          </p:cNvPicPr>
+          <p:nvPr/>
+        </p:nvPicPr>
+        <p:blipFill>
+          <a:blip r:embed="rId4"/>
+          <a:stretch>
+            <a:fillRect/>
+          </a:stretch>
+        </p:blipFill>
+        <p:spPr>
+          <a:xfrm>
+            <a:off x="88776" y="1916778"/>
+            <a:ext cx="11683014" cy="2898182"/>
+          </a:xfrm>
+          <a:prstGeom prst="rect">
+            <a:avLst/>
+          </a:prstGeom>
+          <a:ln>
+            <a:solidFill>
+              <a:schemeClr val="tx1"/>
+            </a:solidFill>
+          </a:ln>
+        </p:spPr>
+      </p:pic>
       <p:pic>
         <p:nvPicPr>
           <p:cNvPr id="5" name="Picture 4">
@@ -9017,452 +9651,10 @@
           </a:ln>
         </p:spPr>
       </p:pic>
-      <p:pic>
-        <p:nvPicPr>
-          <p:cNvPr id="7" name="Picture 6">
-            <a:extLst>
-              <a:ext uri="{FF2B5EF4-FFF2-40B4-BE49-F238E27FC236}">
-                <a16:creationId xmlns:a16="http://schemas.microsoft.com/office/drawing/2014/main" id="{16CFE587-767C-43C0-A908-2A2287FA1782}"/>
-              </a:ext>
-            </a:extLst>
-          </p:cNvPr>
-          <p:cNvPicPr>
-            <a:picLocks noChangeAspect="1"/>
-          </p:cNvPicPr>
-          <p:nvPr/>
-        </p:nvPicPr>
-        <p:blipFill>
-          <a:blip r:embed="rId6"/>
-          <a:stretch>
-            <a:fillRect/>
-          </a:stretch>
-        </p:blipFill>
-        <p:spPr>
-          <a:xfrm>
-            <a:off x="420210" y="1690688"/>
-            <a:ext cx="10753029" cy="4562963"/>
-          </a:xfrm>
-          <a:prstGeom prst="rect">
-            <a:avLst/>
-          </a:prstGeom>
-          <a:ln>
-            <a:solidFill>
-              <a:schemeClr val="tx1"/>
-            </a:solidFill>
-          </a:ln>
-        </p:spPr>
-      </p:pic>
     </p:spTree>
     <p:extLst>
       <p:ext uri="{BB962C8B-B14F-4D97-AF65-F5344CB8AC3E}">
-        <p14:creationId xmlns:p14="http://schemas.microsoft.com/office/powerpoint/2010/main" val="4113381986"/>
-      </p:ext>
-    </p:extLst>
-  </p:cSld>
-  <p:clrMapOvr>
-    <a:masterClrMapping/>
-  </p:clrMapOvr>
-  <p:timing>
-    <p:tnLst>
-      <p:par>
-        <p:cTn id="1" dur="indefinite" restart="never" nodeType="tmRoot">
-          <p:childTnLst>
-            <p:seq concurrent="1" nextAc="seek">
-              <p:cTn id="2" dur="indefinite" nodeType="mainSeq">
-                <p:childTnLst>
-                  <p:par>
-                    <p:cTn id="3" fill="hold">
-                      <p:stCondLst>
-                        <p:cond delay="indefinite"/>
-                      </p:stCondLst>
-                      <p:childTnLst>
-                        <p:par>
-                          <p:cTn id="4" fill="hold">
-                            <p:stCondLst>
-                              <p:cond delay="0"/>
-                            </p:stCondLst>
-                            <p:childTnLst>
-                              <p:par>
-                                <p:cTn id="5" presetID="1" presetClass="entr" presetSubtype="0" fill="hold" nodeType="clickEffect">
-                                  <p:stCondLst>
-                                    <p:cond delay="0"/>
-                                  </p:stCondLst>
-                                  <p:childTnLst>
-                                    <p:set>
-                                      <p:cBhvr>
-                                        <p:cTn id="6" dur="1" fill="hold">
-                                          <p:stCondLst>
-                                            <p:cond delay="0"/>
-                                          </p:stCondLst>
-                                        </p:cTn>
-                                        <p:tgtEl>
-                                          <p:spTgt spid="5"/>
-                                        </p:tgtEl>
-                                        <p:attrNameLst>
-                                          <p:attrName>style.visibility</p:attrName>
-                                        </p:attrNameLst>
-                                      </p:cBhvr>
-                                      <p:to>
-                                        <p:strVal val="visible"/>
-                                      </p:to>
-                                    </p:set>
-                                  </p:childTnLst>
-                                </p:cTn>
-                              </p:par>
-                            </p:childTnLst>
-                          </p:cTn>
-                        </p:par>
-                      </p:childTnLst>
-                    </p:cTn>
-                  </p:par>
-                  <p:par>
-                    <p:cTn id="7" fill="hold">
-                      <p:stCondLst>
-                        <p:cond delay="indefinite"/>
-                      </p:stCondLst>
-                      <p:childTnLst>
-                        <p:par>
-                          <p:cTn id="8" fill="hold">
-                            <p:stCondLst>
-                              <p:cond delay="0"/>
-                            </p:stCondLst>
-                            <p:childTnLst>
-                              <p:par>
-                                <p:cTn id="9" presetID="1" presetClass="entr" presetSubtype="0" fill="hold" nodeType="clickEffect">
-                                  <p:stCondLst>
-                                    <p:cond delay="0"/>
-                                  </p:stCondLst>
-                                  <p:childTnLst>
-                                    <p:set>
-                                      <p:cBhvr>
-                                        <p:cTn id="10" dur="1" fill="hold">
-                                          <p:stCondLst>
-                                            <p:cond delay="0"/>
-                                          </p:stCondLst>
-                                        </p:cTn>
-                                        <p:tgtEl>
-                                          <p:spTgt spid="7"/>
-                                        </p:tgtEl>
-                                        <p:attrNameLst>
-                                          <p:attrName>style.visibility</p:attrName>
-                                        </p:attrNameLst>
-                                      </p:cBhvr>
-                                      <p:to>
-                                        <p:strVal val="visible"/>
-                                      </p:to>
-                                    </p:set>
-                                  </p:childTnLst>
-                                </p:cTn>
-                              </p:par>
-                            </p:childTnLst>
-                          </p:cTn>
-                        </p:par>
-                      </p:childTnLst>
-                    </p:cTn>
-                  </p:par>
-                </p:childTnLst>
-              </p:cTn>
-              <p:prevCondLst>
-                <p:cond evt="onPrev" delay="0">
-                  <p:tgtEl>
-                    <p:sldTgt/>
-                  </p:tgtEl>
-                </p:cond>
-              </p:prevCondLst>
-              <p:nextCondLst>
-                <p:cond evt="onNext" delay="0">
-                  <p:tgtEl>
-                    <p:sldTgt/>
-                  </p:tgtEl>
-                </p:cond>
-              </p:nextCondLst>
-            </p:seq>
-          </p:childTnLst>
-        </p:cTn>
-      </p:par>
-    </p:tnLst>
-  </p:timing>
-</p:sld>
-</file>
-
-<file path=ppt/slides/slide7.xml><?xml version="1.0" encoding="utf-8"?>
-<p:sld xmlns:a="http://schemas.openxmlformats.org/drawingml/2006/main" xmlns:r="http://schemas.openxmlformats.org/officeDocument/2006/relationships" xmlns:p="http://schemas.openxmlformats.org/presentationml/2006/main">
-  <p:cSld>
-    <p:spTree>
-      <p:nvGrpSpPr>
-        <p:cNvPr id="1" name=""/>
-        <p:cNvGrpSpPr/>
-        <p:nvPr/>
-      </p:nvGrpSpPr>
-      <p:grpSpPr>
-        <a:xfrm>
-          <a:off x="0" y="0"/>
-          <a:ext cx="0" cy="0"/>
-          <a:chOff x="0" y="0"/>
-          <a:chExt cx="0" cy="0"/>
-        </a:xfrm>
-      </p:grpSpPr>
-      <p:sp>
-        <p:nvSpPr>
-          <p:cNvPr id="2" name="Title 1">
-            <a:extLst>
-              <a:ext uri="{FF2B5EF4-FFF2-40B4-BE49-F238E27FC236}">
-                <a16:creationId xmlns:a16="http://schemas.microsoft.com/office/drawing/2014/main" id="{E6F3015D-6EE8-4540-8606-15AAF5130827}"/>
-              </a:ext>
-            </a:extLst>
-          </p:cNvPr>
-          <p:cNvSpPr>
-            <a:spLocks noGrp="1"/>
-          </p:cNvSpPr>
-          <p:nvPr>
-            <p:ph type="title"/>
-          </p:nvPr>
-        </p:nvSpPr>
-        <p:spPr/>
-        <p:txBody>
-          <a:bodyPr/>
-          <a:lstStyle/>
-          <a:p>
-            <a:r>
-              <a:rPr lang="en-IE" dirty="0"/>
-              <a:t>Make a deposit</a:t>
-            </a:r>
-            <a:endParaRPr lang="en-US" dirty="0"/>
-          </a:p>
-        </p:txBody>
-      </p:sp>
-      <p:pic>
-        <p:nvPicPr>
-          <p:cNvPr id="4" name="Picture 3">
-            <a:extLst>
-              <a:ext uri="{FF2B5EF4-FFF2-40B4-BE49-F238E27FC236}">
-                <a16:creationId xmlns:a16="http://schemas.microsoft.com/office/drawing/2014/main" id="{ECADDDDB-0834-4DB5-8FC9-55D9296D98CF}"/>
-              </a:ext>
-            </a:extLst>
-          </p:cNvPr>
-          <p:cNvPicPr>
-            <a:picLocks noChangeAspect="1"/>
-          </p:cNvPicPr>
-          <p:nvPr/>
-        </p:nvPicPr>
-        <p:blipFill>
-          <a:blip r:embed="rId3"/>
-          <a:stretch>
-            <a:fillRect/>
-          </a:stretch>
-        </p:blipFill>
-        <p:spPr>
-          <a:xfrm>
-            <a:off x="11149989" y="68751"/>
-            <a:ext cx="942975" cy="1171575"/>
-          </a:xfrm>
-          <a:prstGeom prst="rect">
-            <a:avLst/>
-          </a:prstGeom>
-        </p:spPr>
-      </p:pic>
-      <p:pic>
-        <p:nvPicPr>
-          <p:cNvPr id="5" name="Picture 4">
-            <a:extLst>
-              <a:ext uri="{FF2B5EF4-FFF2-40B4-BE49-F238E27FC236}">
-                <a16:creationId xmlns:a16="http://schemas.microsoft.com/office/drawing/2014/main" id="{D03CFB2F-930B-4128-948C-EF9FB357F0E2}"/>
-              </a:ext>
-            </a:extLst>
-          </p:cNvPr>
-          <p:cNvPicPr>
-            <a:picLocks noChangeAspect="1"/>
-          </p:cNvPicPr>
-          <p:nvPr/>
-        </p:nvPicPr>
-        <p:blipFill>
-          <a:blip r:embed="rId4"/>
-          <a:stretch>
-            <a:fillRect/>
-          </a:stretch>
-        </p:blipFill>
-        <p:spPr>
-          <a:xfrm>
-            <a:off x="955799" y="1987062"/>
-            <a:ext cx="626511" cy="828196"/>
-          </a:xfrm>
-          <a:prstGeom prst="rect">
-            <a:avLst/>
-          </a:prstGeom>
-        </p:spPr>
-      </p:pic>
-      <p:sp>
-        <p:nvSpPr>
-          <p:cNvPr id="6" name="TextBox 5">
-            <a:extLst>
-              <a:ext uri="{FF2B5EF4-FFF2-40B4-BE49-F238E27FC236}">
-                <a16:creationId xmlns:a16="http://schemas.microsoft.com/office/drawing/2014/main" id="{819D8E7B-1D9C-48EC-9FD7-4B64C17A6DC3}"/>
-              </a:ext>
-            </a:extLst>
-          </p:cNvPr>
-          <p:cNvSpPr txBox="1"/>
-          <p:nvPr/>
-        </p:nvSpPr>
-        <p:spPr>
-          <a:xfrm>
-            <a:off x="1685676" y="2216494"/>
-            <a:ext cx="4007700" cy="369332"/>
-          </a:xfrm>
-          <a:prstGeom prst="rect">
-            <a:avLst/>
-          </a:prstGeom>
-          <a:noFill/>
-        </p:spPr>
-        <p:txBody>
-          <a:bodyPr wrap="none" rtlCol="0">
-            <a:spAutoFit/>
-          </a:bodyPr>
-          <a:lstStyle/>
-          <a:p>
-            <a:r>
-              <a:rPr lang="en-IE" dirty="0"/>
-              <a:t>Target account for the deposit must exist</a:t>
-            </a:r>
-            <a:endParaRPr lang="en-GB" dirty="0"/>
-          </a:p>
-        </p:txBody>
-      </p:sp>
-      <p:pic>
-        <p:nvPicPr>
-          <p:cNvPr id="7" name="Picture 6">
-            <a:extLst>
-              <a:ext uri="{FF2B5EF4-FFF2-40B4-BE49-F238E27FC236}">
-                <a16:creationId xmlns:a16="http://schemas.microsoft.com/office/drawing/2014/main" id="{2619EF60-19E8-48B5-B55A-A59FC8796C59}"/>
-              </a:ext>
-            </a:extLst>
-          </p:cNvPr>
-          <p:cNvPicPr>
-            <a:picLocks noChangeAspect="1"/>
-          </p:cNvPicPr>
-          <p:nvPr/>
-        </p:nvPicPr>
-        <p:blipFill>
-          <a:blip r:embed="rId5"/>
-          <a:stretch>
-            <a:fillRect/>
-          </a:stretch>
-        </p:blipFill>
-        <p:spPr>
-          <a:xfrm>
-            <a:off x="883237" y="3429000"/>
-            <a:ext cx="771633" cy="762106"/>
-          </a:xfrm>
-          <a:prstGeom prst="rect">
-            <a:avLst/>
-          </a:prstGeom>
-        </p:spPr>
-      </p:pic>
-      <p:sp>
-        <p:nvSpPr>
-          <p:cNvPr id="8" name="TextBox 7">
-            <a:extLst>
-              <a:ext uri="{FF2B5EF4-FFF2-40B4-BE49-F238E27FC236}">
-                <a16:creationId xmlns:a16="http://schemas.microsoft.com/office/drawing/2014/main" id="{10F8AE99-7F51-4892-8909-D638947736D7}"/>
-              </a:ext>
-            </a:extLst>
-          </p:cNvPr>
-          <p:cNvSpPr txBox="1"/>
-          <p:nvPr/>
-        </p:nvSpPr>
-        <p:spPr>
-          <a:xfrm>
-            <a:off x="1685676" y="3625387"/>
-            <a:ext cx="1747081" cy="369332"/>
-          </a:xfrm>
-          <a:prstGeom prst="rect">
-            <a:avLst/>
-          </a:prstGeom>
-          <a:noFill/>
-        </p:spPr>
-        <p:txBody>
-          <a:bodyPr wrap="none" rtlCol="0">
-            <a:spAutoFit/>
-          </a:bodyPr>
-          <a:lstStyle/>
-          <a:p>
-            <a:r>
-              <a:rPr lang="en-IE" dirty="0"/>
-              <a:t>Deposit amount</a:t>
-            </a:r>
-            <a:endParaRPr lang="en-GB" dirty="0"/>
-          </a:p>
-        </p:txBody>
-      </p:sp>
-      <p:pic>
-        <p:nvPicPr>
-          <p:cNvPr id="9" name="Picture 8">
-            <a:extLst>
-              <a:ext uri="{FF2B5EF4-FFF2-40B4-BE49-F238E27FC236}">
-                <a16:creationId xmlns:a16="http://schemas.microsoft.com/office/drawing/2014/main" id="{1FE41DB3-0965-492A-81C4-566B9D04FAF2}"/>
-              </a:ext>
-            </a:extLst>
-          </p:cNvPr>
-          <p:cNvPicPr>
-            <a:picLocks noChangeAspect="1"/>
-          </p:cNvPicPr>
-          <p:nvPr/>
-        </p:nvPicPr>
-        <p:blipFill>
-          <a:blip r:embed="rId5"/>
-          <a:stretch>
-            <a:fillRect/>
-          </a:stretch>
-        </p:blipFill>
-        <p:spPr>
-          <a:xfrm>
-            <a:off x="883237" y="4553570"/>
-            <a:ext cx="771633" cy="762106"/>
-          </a:xfrm>
-          <a:prstGeom prst="rect">
-            <a:avLst/>
-          </a:prstGeom>
-        </p:spPr>
-      </p:pic>
-      <p:sp>
-        <p:nvSpPr>
-          <p:cNvPr id="10" name="TextBox 9">
-            <a:extLst>
-              <a:ext uri="{FF2B5EF4-FFF2-40B4-BE49-F238E27FC236}">
-                <a16:creationId xmlns:a16="http://schemas.microsoft.com/office/drawing/2014/main" id="{C36F8906-27A3-46CB-A755-61BDDAD44B27}"/>
-              </a:ext>
-            </a:extLst>
-          </p:cNvPr>
-          <p:cNvSpPr txBox="1"/>
-          <p:nvPr/>
-        </p:nvSpPr>
-        <p:spPr>
-          <a:xfrm>
-            <a:off x="1685676" y="4749957"/>
-            <a:ext cx="3163430" cy="369332"/>
-          </a:xfrm>
-          <a:prstGeom prst="rect">
-            <a:avLst/>
-          </a:prstGeom>
-          <a:noFill/>
-        </p:spPr>
-        <p:txBody>
-          <a:bodyPr wrap="none" rtlCol="0">
-            <a:spAutoFit/>
-          </a:bodyPr>
-          <a:lstStyle/>
-          <a:p>
-            <a:r>
-              <a:rPr lang="en-IE" dirty="0"/>
-              <a:t>Source of the deposit (optional)</a:t>
-            </a:r>
-            <a:endParaRPr lang="en-GB" dirty="0"/>
-          </a:p>
-        </p:txBody>
-      </p:sp>
-    </p:spTree>
-    <p:extLst>
-      <p:ext uri="{BB962C8B-B14F-4D97-AF65-F5344CB8AC3E}">
-        <p14:creationId xmlns:p14="http://schemas.microsoft.com/office/powerpoint/2010/main" val="3049804004"/>
+        <p14:creationId xmlns:p14="http://schemas.microsoft.com/office/powerpoint/2010/main" val="2508611950"/>
       </p:ext>
     </p:extLst>
   </p:cSld>
@@ -9489,41 +9681,12 @@
           <a:chExt cx="0" cy="0"/>
         </a:xfrm>
       </p:grpSpPr>
-      <p:sp>
-        <p:nvSpPr>
-          <p:cNvPr id="2" name="Title 1">
-            <a:extLst>
-              <a:ext uri="{FF2B5EF4-FFF2-40B4-BE49-F238E27FC236}">
-                <a16:creationId xmlns:a16="http://schemas.microsoft.com/office/drawing/2014/main" id="{E6F3015D-6EE8-4540-8606-15AAF5130827}"/>
-              </a:ext>
-            </a:extLst>
-          </p:cNvPr>
-          <p:cNvSpPr>
-            <a:spLocks noGrp="1"/>
-          </p:cNvSpPr>
-          <p:nvPr>
-            <p:ph type="title"/>
-          </p:nvPr>
-        </p:nvSpPr>
-        <p:spPr/>
-        <p:txBody>
-          <a:bodyPr/>
-          <a:lstStyle/>
-          <a:p>
-            <a:r>
-              <a:rPr lang="en-IE" dirty="0"/>
-              <a:t>Make a deposit</a:t>
-            </a:r>
-            <a:endParaRPr lang="en-US" dirty="0"/>
-          </a:p>
-        </p:txBody>
-      </p:sp>
       <p:pic>
         <p:nvPicPr>
-          <p:cNvPr id="3" name="Picture 2">
-            <a:extLst>
-              <a:ext uri="{FF2B5EF4-FFF2-40B4-BE49-F238E27FC236}">
-                <a16:creationId xmlns:a16="http://schemas.microsoft.com/office/drawing/2014/main" id="{9C2D67F8-4A34-4A96-959A-97647EF188D8}"/>
+          <p:cNvPr id="7" name="Picture 6">
+            <a:extLst>
+              <a:ext uri="{FF2B5EF4-FFF2-40B4-BE49-F238E27FC236}">
+                <a16:creationId xmlns:a16="http://schemas.microsoft.com/office/drawing/2014/main" id="{16CFE587-767C-43C0-A908-2A2287FA1782}"/>
               </a:ext>
             </a:extLst>
           </p:cNvPr>
@@ -9533,54 +9696,15 @@
           <p:nvPr/>
         </p:nvPicPr>
         <p:blipFill>
-          <a:blip r:embed="rId3">
-            <a:extLst>
-              <a:ext uri="{28A0092B-C50C-407E-A947-70E740481C1C}">
-                <a14:useLocalDpi xmlns:a14="http://schemas.microsoft.com/office/drawing/2010/main" val="0"/>
-              </a:ext>
-              <a:ext uri="{837473B0-CC2E-450A-ABE3-18F120FF3D39}">
-                <a1611:picAttrSrcUrl xmlns:a1611="http://schemas.microsoft.com/office/drawing/2016/11/main" r:id="rId4"/>
-              </a:ext>
-            </a:extLst>
-          </a:blip>
+          <a:blip r:embed="rId3"/>
           <a:stretch>
             <a:fillRect/>
           </a:stretch>
         </p:blipFill>
         <p:spPr>
           <a:xfrm>
-            <a:off x="10949305" y="137344"/>
-            <a:ext cx="1148189" cy="1050593"/>
-          </a:xfrm>
-          <a:prstGeom prst="rect">
-            <a:avLst/>
-          </a:prstGeom>
-        </p:spPr>
-      </p:pic>
-      <p:pic>
-        <p:nvPicPr>
-          <p:cNvPr id="4" name="Picture 3">
-            <a:extLst>
-              <a:ext uri="{FF2B5EF4-FFF2-40B4-BE49-F238E27FC236}">
-                <a16:creationId xmlns:a16="http://schemas.microsoft.com/office/drawing/2014/main" id="{29830141-D514-4A20-87F1-3DEED16DA445}"/>
-              </a:ext>
-            </a:extLst>
-          </p:cNvPr>
-          <p:cNvPicPr>
-            <a:picLocks noChangeAspect="1"/>
-          </p:cNvPicPr>
-          <p:nvPr/>
-        </p:nvPicPr>
-        <p:blipFill>
-          <a:blip r:embed="rId5"/>
-          <a:stretch>
-            <a:fillRect/>
-          </a:stretch>
-        </p:blipFill>
-        <p:spPr>
-          <a:xfrm>
-            <a:off x="838200" y="1338527"/>
-            <a:ext cx="9882692" cy="5519473"/>
+            <a:off x="420210" y="1690688"/>
+            <a:ext cx="10753029" cy="4562963"/>
           </a:xfrm>
           <a:prstGeom prst="rect">
             <a:avLst/>
@@ -9592,94 +9716,75 @@
           </a:ln>
         </p:spPr>
       </p:pic>
+      <p:sp>
+        <p:nvSpPr>
+          <p:cNvPr id="2" name="Title 1">
+            <a:extLst>
+              <a:ext uri="{FF2B5EF4-FFF2-40B4-BE49-F238E27FC236}">
+                <a16:creationId xmlns:a16="http://schemas.microsoft.com/office/drawing/2014/main" id="{E6F3015D-6EE8-4540-8606-15AAF5130827}"/>
+              </a:ext>
+            </a:extLst>
+          </p:cNvPr>
+          <p:cNvSpPr>
+            <a:spLocks noGrp="1"/>
+          </p:cNvSpPr>
+          <p:nvPr>
+            <p:ph type="title"/>
+          </p:nvPr>
+        </p:nvSpPr>
+        <p:spPr/>
+        <p:txBody>
+          <a:bodyPr/>
+          <a:lstStyle/>
+          <a:p>
+            <a:r>
+              <a:rPr lang="en-IE" dirty="0"/>
+              <a:t>Open a new account</a:t>
+            </a:r>
+            <a:endParaRPr lang="en-US" dirty="0"/>
+          </a:p>
+        </p:txBody>
+      </p:sp>
+      <p:pic>
+        <p:nvPicPr>
+          <p:cNvPr id="4" name="Picture 3">
+            <a:extLst>
+              <a:ext uri="{FF2B5EF4-FFF2-40B4-BE49-F238E27FC236}">
+                <a16:creationId xmlns:a16="http://schemas.microsoft.com/office/drawing/2014/main" id="{CB244C52-33DC-4B95-91CD-FC3CE83F3DD2}"/>
+              </a:ext>
+            </a:extLst>
+          </p:cNvPr>
+          <p:cNvPicPr>
+            <a:picLocks noChangeAspect="1"/>
+          </p:cNvPicPr>
+          <p:nvPr/>
+        </p:nvPicPr>
+        <p:blipFill>
+          <a:blip r:embed="rId4"/>
+          <a:stretch>
+            <a:fillRect/>
+          </a:stretch>
+        </p:blipFill>
+        <p:spPr>
+          <a:xfrm>
+            <a:off x="10610850" y="35352"/>
+            <a:ext cx="1581150" cy="1704975"/>
+          </a:xfrm>
+          <a:prstGeom prst="rect">
+            <a:avLst/>
+          </a:prstGeom>
+        </p:spPr>
+      </p:pic>
     </p:spTree>
     <p:extLst>
       <p:ext uri="{BB962C8B-B14F-4D97-AF65-F5344CB8AC3E}">
-        <p14:creationId xmlns:p14="http://schemas.microsoft.com/office/powerpoint/2010/main" val="4123607407"/>
+        <p14:creationId xmlns:p14="http://schemas.microsoft.com/office/powerpoint/2010/main" val="1711254809"/>
       </p:ext>
     </p:extLst>
   </p:cSld>
   <p:clrMapOvr>
     <a:masterClrMapping/>
   </p:clrMapOvr>
-  <p:timing>
-    <p:tnLst>
-      <p:par>
-        <p:cTn id="1" dur="indefinite" restart="never" nodeType="tmRoot">
-          <p:childTnLst>
-            <p:seq concurrent="1" nextAc="seek">
-              <p:cTn id="2" dur="indefinite" nodeType="mainSeq">
-                <p:childTnLst>
-                  <p:par>
-                    <p:cTn id="3" fill="hold">
-                      <p:stCondLst>
-                        <p:cond delay="indefinite"/>
-                        <p:cond evt="onBegin" delay="0">
-                          <p:tn val="2"/>
-                        </p:cond>
-                      </p:stCondLst>
-                      <p:childTnLst>
-                        <p:par>
-                          <p:cTn id="4" fill="hold">
-                            <p:stCondLst>
-                              <p:cond delay="0"/>
-                            </p:stCondLst>
-                            <p:childTnLst>
-                              <p:par>
-                                <p:cTn id="5" presetID="1" presetClass="entr" presetSubtype="0" fill="hold" nodeType="withEffect">
-                                  <p:stCondLst>
-                                    <p:cond delay="0"/>
-                                  </p:stCondLst>
-                                  <p:childTnLst>
-                                    <p:set>
-                                      <p:cBhvr>
-                                        <p:cTn id="6" dur="1" fill="hold">
-                                          <p:stCondLst>
-                                            <p:cond delay="0"/>
-                                          </p:stCondLst>
-                                        </p:cTn>
-                                        <p:tgtEl>
-                                          <p:spTgt spid="3"/>
-                                        </p:tgtEl>
-                                        <p:attrNameLst>
-                                          <p:attrName>style.visibility</p:attrName>
-                                        </p:attrNameLst>
-                                      </p:cBhvr>
-                                      <p:to>
-                                        <p:strVal val="visible"/>
-                                      </p:to>
-                                    </p:set>
-                                  </p:childTnLst>
-                                </p:cTn>
-                              </p:par>
-                            </p:childTnLst>
-                          </p:cTn>
-                        </p:par>
-                      </p:childTnLst>
-                    </p:cTn>
-                  </p:par>
-                </p:childTnLst>
-              </p:cTn>
-              <p:prevCondLst>
-                <p:cond evt="onPrev" delay="0">
-                  <p:tgtEl>
-                    <p:sldTgt/>
-                  </p:tgtEl>
-                </p:cond>
-              </p:prevCondLst>
-              <p:nextCondLst>
-                <p:cond evt="onNext" delay="0">
-                  <p:tgtEl>
-                    <p:sldTgt/>
-                  </p:tgtEl>
-                </p:cond>
-              </p:nextCondLst>
-            </p:seq>
-          </p:childTnLst>
-        </p:cTn>
-      </p:par>
-    </p:tnLst>
-  </p:timing>
 </p:sld>
 </file>
 
@@ -9734,7 +9839,7 @@
           <p:cNvPr id="4" name="Picture 3">
             <a:extLst>
               <a:ext uri="{FF2B5EF4-FFF2-40B4-BE49-F238E27FC236}">
-                <a16:creationId xmlns:a16="http://schemas.microsoft.com/office/drawing/2014/main" id="{CB244C52-33DC-4B95-91CD-FC3CE83F3DD2}"/>
+                <a16:creationId xmlns:a16="http://schemas.microsoft.com/office/drawing/2014/main" id="{ECADDDDB-0834-4DB5-8FC9-55D9296D98CF}"/>
               </a:ext>
             </a:extLst>
           </p:cNvPr>
@@ -9751,8 +9856,8 @@
         </p:blipFill>
         <p:spPr>
           <a:xfrm>
-            <a:off x="10610850" y="35352"/>
-            <a:ext cx="1581150" cy="1704975"/>
+            <a:off x="11149989" y="68751"/>
+            <a:ext cx="942975" cy="1171575"/>
           </a:xfrm>
           <a:prstGeom prst="rect">
             <a:avLst/>
@@ -9761,10 +9866,10 @@
       </p:pic>
       <p:pic>
         <p:nvPicPr>
-          <p:cNvPr id="3" name="Picture 2">
-            <a:extLst>
-              <a:ext uri="{FF2B5EF4-FFF2-40B4-BE49-F238E27FC236}">
-                <a16:creationId xmlns:a16="http://schemas.microsoft.com/office/drawing/2014/main" id="{1F634144-EADA-4D84-85D7-E91C17F3FAE0}"/>
+          <p:cNvPr id="5" name="Picture 4">
+            <a:extLst>
+              <a:ext uri="{FF2B5EF4-FFF2-40B4-BE49-F238E27FC236}">
+                <a16:creationId xmlns:a16="http://schemas.microsoft.com/office/drawing/2014/main" id="{D03CFB2F-930B-4128-948C-EF9FB357F0E2}"/>
               </a:ext>
             </a:extLst>
           </p:cNvPr>
@@ -9781,23 +9886,186 @@
         </p:blipFill>
         <p:spPr>
           <a:xfrm>
-            <a:off x="2085060" y="1484910"/>
-            <a:ext cx="7600116" cy="5077321"/>
+            <a:off x="955799" y="1987062"/>
+            <a:ext cx="626511" cy="828196"/>
           </a:xfrm>
           <a:prstGeom prst="rect">
             <a:avLst/>
           </a:prstGeom>
-          <a:ln>
-            <a:solidFill>
-              <a:schemeClr val="tx1"/>
-            </a:solidFill>
-          </a:ln>
         </p:spPr>
       </p:pic>
+      <p:sp>
+        <p:nvSpPr>
+          <p:cNvPr id="6" name="TextBox 5">
+            <a:extLst>
+              <a:ext uri="{FF2B5EF4-FFF2-40B4-BE49-F238E27FC236}">
+                <a16:creationId xmlns:a16="http://schemas.microsoft.com/office/drawing/2014/main" id="{819D8E7B-1D9C-48EC-9FD7-4B64C17A6DC3}"/>
+              </a:ext>
+            </a:extLst>
+          </p:cNvPr>
+          <p:cNvSpPr txBox="1"/>
+          <p:nvPr/>
+        </p:nvSpPr>
+        <p:spPr>
+          <a:xfrm>
+            <a:off x="1685676" y="2216494"/>
+            <a:ext cx="4007700" cy="369332"/>
+          </a:xfrm>
+          <a:prstGeom prst="rect">
+            <a:avLst/>
+          </a:prstGeom>
+          <a:noFill/>
+        </p:spPr>
+        <p:txBody>
+          <a:bodyPr wrap="none" rtlCol="0">
+            <a:spAutoFit/>
+          </a:bodyPr>
+          <a:lstStyle/>
+          <a:p>
+            <a:r>
+              <a:rPr lang="en-IE" dirty="0"/>
+              <a:t>Target account for the deposit must exist</a:t>
+            </a:r>
+            <a:endParaRPr lang="en-GB" dirty="0"/>
+          </a:p>
+        </p:txBody>
+      </p:sp>
+      <p:pic>
+        <p:nvPicPr>
+          <p:cNvPr id="7" name="Picture 6">
+            <a:extLst>
+              <a:ext uri="{FF2B5EF4-FFF2-40B4-BE49-F238E27FC236}">
+                <a16:creationId xmlns:a16="http://schemas.microsoft.com/office/drawing/2014/main" id="{2619EF60-19E8-48B5-B55A-A59FC8796C59}"/>
+              </a:ext>
+            </a:extLst>
+          </p:cNvPr>
+          <p:cNvPicPr>
+            <a:picLocks noChangeAspect="1"/>
+          </p:cNvPicPr>
+          <p:nvPr/>
+        </p:nvPicPr>
+        <p:blipFill>
+          <a:blip r:embed="rId5"/>
+          <a:stretch>
+            <a:fillRect/>
+          </a:stretch>
+        </p:blipFill>
+        <p:spPr>
+          <a:xfrm>
+            <a:off x="883237" y="3429000"/>
+            <a:ext cx="771633" cy="762106"/>
+          </a:xfrm>
+          <a:prstGeom prst="rect">
+            <a:avLst/>
+          </a:prstGeom>
+        </p:spPr>
+      </p:pic>
+      <p:sp>
+        <p:nvSpPr>
+          <p:cNvPr id="8" name="TextBox 7">
+            <a:extLst>
+              <a:ext uri="{FF2B5EF4-FFF2-40B4-BE49-F238E27FC236}">
+                <a16:creationId xmlns:a16="http://schemas.microsoft.com/office/drawing/2014/main" id="{10F8AE99-7F51-4892-8909-D638947736D7}"/>
+              </a:ext>
+            </a:extLst>
+          </p:cNvPr>
+          <p:cNvSpPr txBox="1"/>
+          <p:nvPr/>
+        </p:nvSpPr>
+        <p:spPr>
+          <a:xfrm>
+            <a:off x="1685676" y="3625387"/>
+            <a:ext cx="1747081" cy="369332"/>
+          </a:xfrm>
+          <a:prstGeom prst="rect">
+            <a:avLst/>
+          </a:prstGeom>
+          <a:noFill/>
+        </p:spPr>
+        <p:txBody>
+          <a:bodyPr wrap="none" rtlCol="0">
+            <a:spAutoFit/>
+          </a:bodyPr>
+          <a:lstStyle/>
+          <a:p>
+            <a:r>
+              <a:rPr lang="en-IE" dirty="0"/>
+              <a:t>Deposit amount</a:t>
+            </a:r>
+            <a:endParaRPr lang="en-GB" dirty="0"/>
+          </a:p>
+        </p:txBody>
+      </p:sp>
+      <p:pic>
+        <p:nvPicPr>
+          <p:cNvPr id="9" name="Picture 8">
+            <a:extLst>
+              <a:ext uri="{FF2B5EF4-FFF2-40B4-BE49-F238E27FC236}">
+                <a16:creationId xmlns:a16="http://schemas.microsoft.com/office/drawing/2014/main" id="{1FE41DB3-0965-492A-81C4-566B9D04FAF2}"/>
+              </a:ext>
+            </a:extLst>
+          </p:cNvPr>
+          <p:cNvPicPr>
+            <a:picLocks noChangeAspect="1"/>
+          </p:cNvPicPr>
+          <p:nvPr/>
+        </p:nvPicPr>
+        <p:blipFill>
+          <a:blip r:embed="rId5"/>
+          <a:stretch>
+            <a:fillRect/>
+          </a:stretch>
+        </p:blipFill>
+        <p:spPr>
+          <a:xfrm>
+            <a:off x="883237" y="4553570"/>
+            <a:ext cx="771633" cy="762106"/>
+          </a:xfrm>
+          <a:prstGeom prst="rect">
+            <a:avLst/>
+          </a:prstGeom>
+        </p:spPr>
+      </p:pic>
+      <p:sp>
+        <p:nvSpPr>
+          <p:cNvPr id="10" name="TextBox 9">
+            <a:extLst>
+              <a:ext uri="{FF2B5EF4-FFF2-40B4-BE49-F238E27FC236}">
+                <a16:creationId xmlns:a16="http://schemas.microsoft.com/office/drawing/2014/main" id="{C36F8906-27A3-46CB-A755-61BDDAD44B27}"/>
+              </a:ext>
+            </a:extLst>
+          </p:cNvPr>
+          <p:cNvSpPr txBox="1"/>
+          <p:nvPr/>
+        </p:nvSpPr>
+        <p:spPr>
+          <a:xfrm>
+            <a:off x="1685676" y="4749957"/>
+            <a:ext cx="3163430" cy="369332"/>
+          </a:xfrm>
+          <a:prstGeom prst="rect">
+            <a:avLst/>
+          </a:prstGeom>
+          <a:noFill/>
+        </p:spPr>
+        <p:txBody>
+          <a:bodyPr wrap="none" rtlCol="0">
+            <a:spAutoFit/>
+          </a:bodyPr>
+          <a:lstStyle/>
+          <a:p>
+            <a:r>
+              <a:rPr lang="en-IE" dirty="0"/>
+              <a:t>Source of the deposit (optional)</a:t>
+            </a:r>
+            <a:endParaRPr lang="en-GB" dirty="0"/>
+          </a:p>
+        </p:txBody>
+      </p:sp>
     </p:spTree>
     <p:extLst>
       <p:ext uri="{BB962C8B-B14F-4D97-AF65-F5344CB8AC3E}">
-        <p14:creationId xmlns:p14="http://schemas.microsoft.com/office/powerpoint/2010/main" val="2447301394"/>
+        <p14:creationId xmlns:p14="http://schemas.microsoft.com/office/powerpoint/2010/main" val="3049804004"/>
       </p:ext>
     </p:extLst>
   </p:cSld>

</xml_diff>

<commit_message>
Serverless London code in slides
</commit_message>
<xml_diff>
--- a/Event sourcing on Azure functions code example.pptx
+++ b/Event sourcing on Azure functions code example.pptx
@@ -216,7 +216,7 @@
           <a:p>
             <a:fld id="{D70517CA-646E-4F92-BC77-FB90659F3FBD}" type="datetimeFigureOut">
               <a:rPr lang="en-US" smtClean="0"/>
-              <a:t>6/20/2019</a:t>
+              <a:t>6/26/2019</a:t>
             </a:fld>
             <a:endParaRPr lang="en-US"/>
           </a:p>
@@ -2496,7 +2496,7 @@
           <a:p>
             <a:fld id="{6BECA975-103C-4A17-81B4-E71ADF563304}" type="datetimeFigureOut">
               <a:rPr lang="en-US" smtClean="0"/>
-              <a:t>6/20/2019</a:t>
+              <a:t>6/26/2019</a:t>
             </a:fld>
             <a:endParaRPr lang="en-US"/>
           </a:p>
@@ -2694,7 +2694,7 @@
           <a:p>
             <a:fld id="{6BECA975-103C-4A17-81B4-E71ADF563304}" type="datetimeFigureOut">
               <a:rPr lang="en-US" smtClean="0"/>
-              <a:t>6/20/2019</a:t>
+              <a:t>6/26/2019</a:t>
             </a:fld>
             <a:endParaRPr lang="en-US"/>
           </a:p>
@@ -2902,7 +2902,7 @@
           <a:p>
             <a:fld id="{6BECA975-103C-4A17-81B4-E71ADF563304}" type="datetimeFigureOut">
               <a:rPr lang="en-US" smtClean="0"/>
-              <a:t>6/20/2019</a:t>
+              <a:t>6/26/2019</a:t>
             </a:fld>
             <a:endParaRPr lang="en-US"/>
           </a:p>
@@ -3100,7 +3100,7 @@
           <a:p>
             <a:fld id="{6BECA975-103C-4A17-81B4-E71ADF563304}" type="datetimeFigureOut">
               <a:rPr lang="en-US" smtClean="0"/>
-              <a:t>6/20/2019</a:t>
+              <a:t>6/26/2019</a:t>
             </a:fld>
             <a:endParaRPr lang="en-US"/>
           </a:p>
@@ -3375,7 +3375,7 @@
           <a:p>
             <a:fld id="{6BECA975-103C-4A17-81B4-E71ADF563304}" type="datetimeFigureOut">
               <a:rPr lang="en-US" smtClean="0"/>
-              <a:t>6/20/2019</a:t>
+              <a:t>6/26/2019</a:t>
             </a:fld>
             <a:endParaRPr lang="en-US"/>
           </a:p>
@@ -3640,7 +3640,7 @@
           <a:p>
             <a:fld id="{6BECA975-103C-4A17-81B4-E71ADF563304}" type="datetimeFigureOut">
               <a:rPr lang="en-US" smtClean="0"/>
-              <a:t>6/20/2019</a:t>
+              <a:t>6/26/2019</a:t>
             </a:fld>
             <a:endParaRPr lang="en-US"/>
           </a:p>
@@ -4052,7 +4052,7 @@
           <a:p>
             <a:fld id="{6BECA975-103C-4A17-81B4-E71ADF563304}" type="datetimeFigureOut">
               <a:rPr lang="en-US" smtClean="0"/>
-              <a:t>6/20/2019</a:t>
+              <a:t>6/26/2019</a:t>
             </a:fld>
             <a:endParaRPr lang="en-US"/>
           </a:p>
@@ -4193,7 +4193,7 @@
           <a:p>
             <a:fld id="{6BECA975-103C-4A17-81B4-E71ADF563304}" type="datetimeFigureOut">
               <a:rPr lang="en-US" smtClean="0"/>
-              <a:t>6/20/2019</a:t>
+              <a:t>6/26/2019</a:t>
             </a:fld>
             <a:endParaRPr lang="en-US"/>
           </a:p>
@@ -4306,7 +4306,7 @@
           <a:p>
             <a:fld id="{6BECA975-103C-4A17-81B4-E71ADF563304}" type="datetimeFigureOut">
               <a:rPr lang="en-US" smtClean="0"/>
-              <a:t>6/20/2019</a:t>
+              <a:t>6/26/2019</a:t>
             </a:fld>
             <a:endParaRPr lang="en-US"/>
           </a:p>
@@ -4617,7 +4617,7 @@
           <a:p>
             <a:fld id="{6BECA975-103C-4A17-81B4-E71ADF563304}" type="datetimeFigureOut">
               <a:rPr lang="en-US" smtClean="0"/>
-              <a:t>6/20/2019</a:t>
+              <a:t>6/26/2019</a:t>
             </a:fld>
             <a:endParaRPr lang="en-US"/>
           </a:p>
@@ -4905,7 +4905,7 @@
           <a:p>
             <a:fld id="{6BECA975-103C-4A17-81B4-E71ADF563304}" type="datetimeFigureOut">
               <a:rPr lang="en-US" smtClean="0"/>
-              <a:t>6/20/2019</a:t>
+              <a:t>6/26/2019</a:t>
             </a:fld>
             <a:endParaRPr lang="en-US"/>
           </a:p>
@@ -5146,7 +5146,7 @@
           <a:p>
             <a:fld id="{6BECA975-103C-4A17-81B4-E71ADF563304}" type="datetimeFigureOut">
               <a:rPr lang="en-US" smtClean="0"/>
-              <a:t>6/20/2019</a:t>
+              <a:t>6/26/2019</a:t>
             </a:fld>
             <a:endParaRPr lang="en-US"/>
           </a:p>
@@ -5693,6 +5693,42 @@
           </a:sp3d>
         </p:spPr>
       </p:pic>
+      <p:pic>
+        <p:nvPicPr>
+          <p:cNvPr id="3" name="Picture 2" descr="A picture containing object&#10;&#10;Description automatically generated">
+            <a:extLst>
+              <a:ext uri="{FF2B5EF4-FFF2-40B4-BE49-F238E27FC236}">
+                <a16:creationId xmlns:a16="http://schemas.microsoft.com/office/drawing/2014/main" id="{4107BBBA-C479-4C66-975D-407B66E8BDB3}"/>
+              </a:ext>
+            </a:extLst>
+          </p:cNvPr>
+          <p:cNvPicPr>
+            <a:picLocks noChangeAspect="1"/>
+          </p:cNvPicPr>
+          <p:nvPr/>
+        </p:nvPicPr>
+        <p:blipFill>
+          <a:blip r:embed="rId3">
+            <a:extLst>
+              <a:ext uri="{28A0092B-C50C-407E-A947-70E740481C1C}">
+                <a14:useLocalDpi xmlns:a14="http://schemas.microsoft.com/office/drawing/2010/main" val="0"/>
+              </a:ext>
+            </a:extLst>
+          </a:blip>
+          <a:stretch>
+            <a:fillRect/>
+          </a:stretch>
+        </p:blipFill>
+        <p:spPr>
+          <a:xfrm>
+            <a:off x="378689" y="1723335"/>
+            <a:ext cx="11434622" cy="3411329"/>
+          </a:xfrm>
+          <a:prstGeom prst="rect">
+            <a:avLst/>
+          </a:prstGeom>
+        </p:spPr>
+      </p:pic>
     </p:spTree>
     <p:extLst>
       <p:ext uri="{BB962C8B-B14F-4D97-AF65-F5344CB8AC3E}">
@@ -5703,6 +5739,116 @@
   <p:clrMapOvr>
     <a:masterClrMapping/>
   </p:clrMapOvr>
+  <p:timing>
+    <p:tnLst>
+      <p:par>
+        <p:cTn id="1" dur="indefinite" restart="never" nodeType="tmRoot">
+          <p:childTnLst>
+            <p:seq concurrent="1" nextAc="seek">
+              <p:cTn id="2" dur="indefinite" nodeType="mainSeq">
+                <p:childTnLst>
+                  <p:par>
+                    <p:cTn id="3" fill="hold">
+                      <p:stCondLst>
+                        <p:cond delay="indefinite"/>
+                      </p:stCondLst>
+                      <p:childTnLst>
+                        <p:par>
+                          <p:cTn id="4" fill="hold">
+                            <p:stCondLst>
+                              <p:cond delay="0"/>
+                            </p:stCondLst>
+                            <p:childTnLst>
+                              <p:par>
+                                <p:cTn id="5" presetID="10" presetClass="exit" presetSubtype="0" fill="hold" nodeType="clickEffect">
+                                  <p:stCondLst>
+                                    <p:cond delay="0"/>
+                                  </p:stCondLst>
+                                  <p:childTnLst>
+                                    <p:animEffect transition="out" filter="fade">
+                                      <p:cBhvr>
+                                        <p:cTn id="6" dur="500"/>
+                                        <p:tgtEl>
+                                          <p:spTgt spid="3"/>
+                                        </p:tgtEl>
+                                      </p:cBhvr>
+                                    </p:animEffect>
+                                    <p:set>
+                                      <p:cBhvr>
+                                        <p:cTn id="7" dur="1" fill="hold">
+                                          <p:stCondLst>
+                                            <p:cond delay="499"/>
+                                          </p:stCondLst>
+                                        </p:cTn>
+                                        <p:tgtEl>
+                                          <p:spTgt spid="3"/>
+                                        </p:tgtEl>
+                                        <p:attrNameLst>
+                                          <p:attrName>style.visibility</p:attrName>
+                                        </p:attrNameLst>
+                                      </p:cBhvr>
+                                      <p:to>
+                                        <p:strVal val="hidden"/>
+                                      </p:to>
+                                    </p:set>
+                                  </p:childTnLst>
+                                </p:cTn>
+                              </p:par>
+                              <p:par>
+                                <p:cTn id="8" presetID="1" presetClass="entr" presetSubtype="0" fill="hold" nodeType="withEffect">
+                                  <p:stCondLst>
+                                    <p:cond delay="0"/>
+                                  </p:stCondLst>
+                                  <p:childTnLst>
+                                    <p:set>
+                                      <p:cBhvr>
+                                        <p:cTn id="9" dur="1" fill="hold">
+                                          <p:stCondLst>
+                                            <p:cond delay="0"/>
+                                          </p:stCondLst>
+                                        </p:cTn>
+                                        <p:tgtEl>
+                                          <p:spTgt spid="5"/>
+                                        </p:tgtEl>
+                                        <p:attrNameLst>
+                                          <p:attrName>style.visibility</p:attrName>
+                                        </p:attrNameLst>
+                                      </p:cBhvr>
+                                      <p:to>
+                                        <p:strVal val="visible"/>
+                                      </p:to>
+                                    </p:set>
+                                  </p:childTnLst>
+                                </p:cTn>
+                              </p:par>
+                            </p:childTnLst>
+                          </p:cTn>
+                        </p:par>
+                      </p:childTnLst>
+                    </p:cTn>
+                  </p:par>
+                </p:childTnLst>
+              </p:cTn>
+              <p:prevCondLst>
+                <p:cond evt="onPrev" delay="0">
+                  <p:tgtEl>
+                    <p:sldTgt/>
+                  </p:tgtEl>
+                </p:cond>
+              </p:prevCondLst>
+              <p:nextCondLst>
+                <p:cond evt="onNext" delay="0">
+                  <p:tgtEl>
+                    <p:sldTgt/>
+                  </p:tgtEl>
+                </p:cond>
+              </p:nextCondLst>
+            </p:seq>
+          </p:childTnLst>
+        </p:cTn>
+      </p:par>
+    </p:tnLst>
+  </p:timing>
 </p:sld>
 </file>
 

</xml_diff>